<commit_message>
updated CE301 Open Day Poster Template.pptx
</commit_message>
<xml_diff>
--- a/docs/open_day/CE301 Open Day Poster Template.pptx
+++ b/docs/open_day/CE301 Open Day Poster Template.pptx
@@ -331,6 +331,3436 @@
 </pc:chgInfo>
 </file>
 
+<file path=ppt/diagrams/colors1.xml><?xml version="1.0" encoding="utf-8"?>
+<dgm:colorsDef xmlns:dgm="http://schemas.openxmlformats.org/drawingml/2006/diagram" xmlns:a="http://schemas.openxmlformats.org/drawingml/2006/main" uniqueId="urn:microsoft.com/office/officeart/2005/8/colors/accent1_2">
+  <dgm:title val=""/>
+  <dgm:desc val=""/>
+  <dgm:catLst>
+    <dgm:cat type="accent1" pri="11200"/>
+  </dgm:catLst>
+  <dgm:styleLbl name="node0">
+    <dgm:fillClrLst meth="repeat">
+      <a:schemeClr val="accent1"/>
+    </dgm:fillClrLst>
+    <dgm:linClrLst meth="repeat">
+      <a:schemeClr val="lt1"/>
+    </dgm:linClrLst>
+    <dgm:effectClrLst/>
+    <dgm:txLinClrLst/>
+    <dgm:txFillClrLst/>
+    <dgm:txEffectClrLst/>
+  </dgm:styleLbl>
+  <dgm:styleLbl name="alignNode1">
+    <dgm:fillClrLst meth="repeat">
+      <a:schemeClr val="accent1"/>
+    </dgm:fillClrLst>
+    <dgm:linClrLst meth="repeat">
+      <a:schemeClr val="accent1"/>
+    </dgm:linClrLst>
+    <dgm:effectClrLst/>
+    <dgm:txLinClrLst/>
+    <dgm:txFillClrLst/>
+    <dgm:txEffectClrLst/>
+  </dgm:styleLbl>
+  <dgm:styleLbl name="node1">
+    <dgm:fillClrLst meth="repeat">
+      <a:schemeClr val="accent1"/>
+    </dgm:fillClrLst>
+    <dgm:linClrLst meth="repeat">
+      <a:schemeClr val="lt1"/>
+    </dgm:linClrLst>
+    <dgm:effectClrLst/>
+    <dgm:txLinClrLst/>
+    <dgm:txFillClrLst/>
+    <dgm:txEffectClrLst/>
+  </dgm:styleLbl>
+  <dgm:styleLbl name="lnNode1">
+    <dgm:fillClrLst meth="repeat">
+      <a:schemeClr val="accent1"/>
+    </dgm:fillClrLst>
+    <dgm:linClrLst meth="repeat">
+      <a:schemeClr val="lt1"/>
+    </dgm:linClrLst>
+    <dgm:effectClrLst/>
+    <dgm:txLinClrLst/>
+    <dgm:txFillClrLst/>
+    <dgm:txEffectClrLst/>
+  </dgm:styleLbl>
+  <dgm:styleLbl name="vennNode1">
+    <dgm:fillClrLst meth="repeat">
+      <a:schemeClr val="accent1">
+        <a:alpha val="50000"/>
+      </a:schemeClr>
+    </dgm:fillClrLst>
+    <dgm:linClrLst meth="repeat">
+      <a:schemeClr val="lt1"/>
+    </dgm:linClrLst>
+    <dgm:effectClrLst/>
+    <dgm:txLinClrLst/>
+    <dgm:txFillClrLst/>
+    <dgm:txEffectClrLst/>
+  </dgm:styleLbl>
+  <dgm:styleLbl name="node2">
+    <dgm:fillClrLst meth="repeat">
+      <a:schemeClr val="accent1"/>
+    </dgm:fillClrLst>
+    <dgm:linClrLst meth="repeat">
+      <a:schemeClr val="lt1"/>
+    </dgm:linClrLst>
+    <dgm:effectClrLst/>
+    <dgm:txLinClrLst/>
+    <dgm:txFillClrLst/>
+    <dgm:txEffectClrLst/>
+  </dgm:styleLbl>
+  <dgm:styleLbl name="node3">
+    <dgm:fillClrLst meth="repeat">
+      <a:schemeClr val="accent1"/>
+    </dgm:fillClrLst>
+    <dgm:linClrLst meth="repeat">
+      <a:schemeClr val="lt1"/>
+    </dgm:linClrLst>
+    <dgm:effectClrLst/>
+    <dgm:txLinClrLst/>
+    <dgm:txFillClrLst/>
+    <dgm:txEffectClrLst/>
+  </dgm:styleLbl>
+  <dgm:styleLbl name="node4">
+    <dgm:fillClrLst meth="repeat">
+      <a:schemeClr val="accent1"/>
+    </dgm:fillClrLst>
+    <dgm:linClrLst meth="repeat">
+      <a:schemeClr val="lt1"/>
+    </dgm:linClrLst>
+    <dgm:effectClrLst/>
+    <dgm:txLinClrLst/>
+    <dgm:txFillClrLst/>
+    <dgm:txEffectClrLst/>
+  </dgm:styleLbl>
+  <dgm:styleLbl name="fgImgPlace1">
+    <dgm:fillClrLst meth="repeat">
+      <a:schemeClr val="accent1">
+        <a:tint val="50000"/>
+      </a:schemeClr>
+    </dgm:fillClrLst>
+    <dgm:linClrLst meth="repeat">
+      <a:schemeClr val="lt1"/>
+    </dgm:linClrLst>
+    <dgm:effectClrLst/>
+    <dgm:txLinClrLst/>
+    <dgm:txFillClrLst meth="repeat">
+      <a:schemeClr val="lt1"/>
+    </dgm:txFillClrLst>
+    <dgm:txEffectClrLst/>
+  </dgm:styleLbl>
+  <dgm:styleLbl name="alignImgPlace1">
+    <dgm:fillClrLst meth="repeat">
+      <a:schemeClr val="accent1">
+        <a:tint val="50000"/>
+      </a:schemeClr>
+    </dgm:fillClrLst>
+    <dgm:linClrLst meth="repeat">
+      <a:schemeClr val="lt1"/>
+    </dgm:linClrLst>
+    <dgm:effectClrLst/>
+    <dgm:txLinClrLst/>
+    <dgm:txFillClrLst meth="repeat">
+      <a:schemeClr val="lt1"/>
+    </dgm:txFillClrLst>
+    <dgm:txEffectClrLst/>
+  </dgm:styleLbl>
+  <dgm:styleLbl name="bgImgPlace1">
+    <dgm:fillClrLst meth="repeat">
+      <a:schemeClr val="accent1">
+        <a:tint val="50000"/>
+      </a:schemeClr>
+    </dgm:fillClrLst>
+    <dgm:linClrLst meth="repeat">
+      <a:schemeClr val="lt1"/>
+    </dgm:linClrLst>
+    <dgm:effectClrLst/>
+    <dgm:txLinClrLst/>
+    <dgm:txFillClrLst meth="repeat">
+      <a:schemeClr val="lt1"/>
+    </dgm:txFillClrLst>
+    <dgm:txEffectClrLst/>
+  </dgm:styleLbl>
+  <dgm:styleLbl name="sibTrans2D1">
+    <dgm:fillClrLst meth="repeat">
+      <a:schemeClr val="accent1">
+        <a:tint val="60000"/>
+      </a:schemeClr>
+    </dgm:fillClrLst>
+    <dgm:linClrLst meth="repeat">
+      <a:schemeClr val="accent1">
+        <a:tint val="60000"/>
+      </a:schemeClr>
+    </dgm:linClrLst>
+    <dgm:effectClrLst/>
+    <dgm:txLinClrLst/>
+    <dgm:txFillClrLst/>
+    <dgm:txEffectClrLst/>
+  </dgm:styleLbl>
+  <dgm:styleLbl name="fgSibTrans2D1">
+    <dgm:fillClrLst meth="repeat">
+      <a:schemeClr val="accent1">
+        <a:tint val="60000"/>
+      </a:schemeClr>
+    </dgm:fillClrLst>
+    <dgm:linClrLst meth="repeat">
+      <a:schemeClr val="accent1">
+        <a:tint val="60000"/>
+      </a:schemeClr>
+    </dgm:linClrLst>
+    <dgm:effectClrLst/>
+    <dgm:txLinClrLst/>
+    <dgm:txFillClrLst/>
+    <dgm:txEffectClrLst/>
+  </dgm:styleLbl>
+  <dgm:styleLbl name="bgSibTrans2D1">
+    <dgm:fillClrLst meth="repeat">
+      <a:schemeClr val="accent1">
+        <a:tint val="60000"/>
+      </a:schemeClr>
+    </dgm:fillClrLst>
+    <dgm:linClrLst meth="repeat">
+      <a:schemeClr val="accent1">
+        <a:tint val="60000"/>
+      </a:schemeClr>
+    </dgm:linClrLst>
+    <dgm:effectClrLst/>
+    <dgm:txLinClrLst/>
+    <dgm:txFillClrLst/>
+    <dgm:txEffectClrLst/>
+  </dgm:styleLbl>
+  <dgm:styleLbl name="sibTrans1D1">
+    <dgm:fillClrLst meth="repeat">
+      <a:schemeClr val="accent1"/>
+    </dgm:fillClrLst>
+    <dgm:linClrLst meth="repeat">
+      <a:schemeClr val="accent1"/>
+    </dgm:linClrLst>
+    <dgm:effectClrLst/>
+    <dgm:txLinClrLst/>
+    <dgm:txFillClrLst meth="repeat">
+      <a:schemeClr val="tx1"/>
+    </dgm:txFillClrLst>
+    <dgm:txEffectClrLst/>
+  </dgm:styleLbl>
+  <dgm:styleLbl name="callout">
+    <dgm:fillClrLst meth="repeat">
+      <a:schemeClr val="accent1"/>
+    </dgm:fillClrLst>
+    <dgm:linClrLst meth="repeat">
+      <a:schemeClr val="accent1">
+        <a:tint val="50000"/>
+      </a:schemeClr>
+    </dgm:linClrLst>
+    <dgm:effectClrLst/>
+    <dgm:txLinClrLst/>
+    <dgm:txFillClrLst meth="repeat">
+      <a:schemeClr val="tx1"/>
+    </dgm:txFillClrLst>
+    <dgm:txEffectClrLst/>
+  </dgm:styleLbl>
+  <dgm:styleLbl name="asst0">
+    <dgm:fillClrLst meth="repeat">
+      <a:schemeClr val="accent1"/>
+    </dgm:fillClrLst>
+    <dgm:linClrLst meth="repeat">
+      <a:schemeClr val="lt1"/>
+    </dgm:linClrLst>
+    <dgm:effectClrLst/>
+    <dgm:txLinClrLst/>
+    <dgm:txFillClrLst/>
+    <dgm:txEffectClrLst/>
+  </dgm:styleLbl>
+  <dgm:styleLbl name="asst1">
+    <dgm:fillClrLst meth="repeat">
+      <a:schemeClr val="accent1"/>
+    </dgm:fillClrLst>
+    <dgm:linClrLst meth="repeat">
+      <a:schemeClr val="lt1"/>
+    </dgm:linClrLst>
+    <dgm:effectClrLst/>
+    <dgm:txLinClrLst/>
+    <dgm:txFillClrLst/>
+    <dgm:txEffectClrLst/>
+  </dgm:styleLbl>
+  <dgm:styleLbl name="asst2">
+    <dgm:fillClrLst meth="repeat">
+      <a:schemeClr val="accent1"/>
+    </dgm:fillClrLst>
+    <dgm:linClrLst meth="repeat">
+      <a:schemeClr val="lt1"/>
+    </dgm:linClrLst>
+    <dgm:effectClrLst/>
+    <dgm:txLinClrLst/>
+    <dgm:txFillClrLst/>
+    <dgm:txEffectClrLst/>
+  </dgm:styleLbl>
+  <dgm:styleLbl name="asst3">
+    <dgm:fillClrLst meth="repeat">
+      <a:schemeClr val="accent1"/>
+    </dgm:fillClrLst>
+    <dgm:linClrLst meth="repeat">
+      <a:schemeClr val="lt1"/>
+    </dgm:linClrLst>
+    <dgm:effectClrLst/>
+    <dgm:txLinClrLst/>
+    <dgm:txFillClrLst/>
+    <dgm:txEffectClrLst/>
+  </dgm:styleLbl>
+  <dgm:styleLbl name="asst4">
+    <dgm:fillClrLst meth="repeat">
+      <a:schemeClr val="accent1"/>
+    </dgm:fillClrLst>
+    <dgm:linClrLst meth="repeat">
+      <a:schemeClr val="lt1"/>
+    </dgm:linClrLst>
+    <dgm:effectClrLst/>
+    <dgm:txLinClrLst/>
+    <dgm:txFillClrLst/>
+    <dgm:txEffectClrLst/>
+  </dgm:styleLbl>
+  <dgm:styleLbl name="parChTrans2D1">
+    <dgm:fillClrLst meth="repeat">
+      <a:schemeClr val="accent1">
+        <a:tint val="60000"/>
+      </a:schemeClr>
+    </dgm:fillClrLst>
+    <dgm:linClrLst meth="repeat">
+      <a:schemeClr val="accent1">
+        <a:tint val="60000"/>
+      </a:schemeClr>
+    </dgm:linClrLst>
+    <dgm:effectClrLst/>
+    <dgm:txLinClrLst/>
+    <dgm:txFillClrLst meth="repeat">
+      <a:schemeClr val="lt1"/>
+    </dgm:txFillClrLst>
+    <dgm:txEffectClrLst/>
+  </dgm:styleLbl>
+  <dgm:styleLbl name="parChTrans2D2">
+    <dgm:fillClrLst meth="repeat">
+      <a:schemeClr val="accent1"/>
+    </dgm:fillClrLst>
+    <dgm:linClrLst meth="repeat">
+      <a:schemeClr val="accent1"/>
+    </dgm:linClrLst>
+    <dgm:effectClrLst/>
+    <dgm:txLinClrLst/>
+    <dgm:txFillClrLst meth="repeat">
+      <a:schemeClr val="lt1"/>
+    </dgm:txFillClrLst>
+    <dgm:txEffectClrLst/>
+  </dgm:styleLbl>
+  <dgm:styleLbl name="parChTrans2D3">
+    <dgm:fillClrLst meth="repeat">
+      <a:schemeClr val="accent1"/>
+    </dgm:fillClrLst>
+    <dgm:linClrLst meth="repeat">
+      <a:schemeClr val="accent1"/>
+    </dgm:linClrLst>
+    <dgm:effectClrLst/>
+    <dgm:txLinClrLst/>
+    <dgm:txFillClrLst meth="repeat">
+      <a:schemeClr val="lt1"/>
+    </dgm:txFillClrLst>
+    <dgm:txEffectClrLst/>
+  </dgm:styleLbl>
+  <dgm:styleLbl name="parChTrans2D4">
+    <dgm:fillClrLst meth="repeat">
+      <a:schemeClr val="accent1"/>
+    </dgm:fillClrLst>
+    <dgm:linClrLst meth="repeat">
+      <a:schemeClr val="accent1"/>
+    </dgm:linClrLst>
+    <dgm:effectClrLst/>
+    <dgm:txLinClrLst/>
+    <dgm:txFillClrLst meth="repeat">
+      <a:schemeClr val="lt1"/>
+    </dgm:txFillClrLst>
+    <dgm:txEffectClrLst/>
+  </dgm:styleLbl>
+  <dgm:styleLbl name="parChTrans1D1">
+    <dgm:fillClrLst meth="repeat">
+      <a:schemeClr val="accent1"/>
+    </dgm:fillClrLst>
+    <dgm:linClrLst meth="repeat">
+      <a:schemeClr val="accent1">
+        <a:shade val="60000"/>
+      </a:schemeClr>
+    </dgm:linClrLst>
+    <dgm:effectClrLst/>
+    <dgm:txLinClrLst/>
+    <dgm:txFillClrLst meth="repeat">
+      <a:schemeClr val="tx1"/>
+    </dgm:txFillClrLst>
+    <dgm:txEffectClrLst/>
+  </dgm:styleLbl>
+  <dgm:styleLbl name="parChTrans1D2">
+    <dgm:fillClrLst meth="repeat">
+      <a:schemeClr val="accent1"/>
+    </dgm:fillClrLst>
+    <dgm:linClrLst meth="repeat">
+      <a:schemeClr val="accent1">
+        <a:shade val="60000"/>
+      </a:schemeClr>
+    </dgm:linClrLst>
+    <dgm:effectClrLst/>
+    <dgm:txLinClrLst/>
+    <dgm:txFillClrLst meth="repeat">
+      <a:schemeClr val="tx1"/>
+    </dgm:txFillClrLst>
+    <dgm:txEffectClrLst/>
+  </dgm:styleLbl>
+  <dgm:styleLbl name="parChTrans1D3">
+    <dgm:fillClrLst meth="repeat">
+      <a:schemeClr val="accent1"/>
+    </dgm:fillClrLst>
+    <dgm:linClrLst meth="repeat">
+      <a:schemeClr val="accent1">
+        <a:shade val="80000"/>
+      </a:schemeClr>
+    </dgm:linClrLst>
+    <dgm:effectClrLst/>
+    <dgm:txLinClrLst/>
+    <dgm:txFillClrLst meth="repeat">
+      <a:schemeClr val="tx1"/>
+    </dgm:txFillClrLst>
+    <dgm:txEffectClrLst/>
+  </dgm:styleLbl>
+  <dgm:styleLbl name="parChTrans1D4">
+    <dgm:fillClrLst meth="repeat">
+      <a:schemeClr val="accent1"/>
+    </dgm:fillClrLst>
+    <dgm:linClrLst meth="repeat">
+      <a:schemeClr val="accent1">
+        <a:shade val="80000"/>
+      </a:schemeClr>
+    </dgm:linClrLst>
+    <dgm:effectClrLst/>
+    <dgm:txLinClrLst/>
+    <dgm:txFillClrLst meth="repeat">
+      <a:schemeClr val="tx1"/>
+    </dgm:txFillClrLst>
+    <dgm:txEffectClrLst/>
+  </dgm:styleLbl>
+  <dgm:styleLbl name="fgAcc1">
+    <dgm:fillClrLst meth="repeat">
+      <a:schemeClr val="lt1">
+        <a:alpha val="90000"/>
+      </a:schemeClr>
+    </dgm:fillClrLst>
+    <dgm:linClrLst meth="repeat">
+      <a:schemeClr val="accent1"/>
+    </dgm:linClrLst>
+    <dgm:effectClrLst/>
+    <dgm:txLinClrLst/>
+    <dgm:txFillClrLst meth="repeat">
+      <a:schemeClr val="dk1"/>
+    </dgm:txFillClrLst>
+    <dgm:txEffectClrLst/>
+  </dgm:styleLbl>
+  <dgm:styleLbl name="conFgAcc1">
+    <dgm:fillClrLst meth="repeat">
+      <a:schemeClr val="lt1">
+        <a:alpha val="90000"/>
+      </a:schemeClr>
+    </dgm:fillClrLst>
+    <dgm:linClrLst meth="repeat">
+      <a:schemeClr val="accent1"/>
+    </dgm:linClrLst>
+    <dgm:effectClrLst/>
+    <dgm:txLinClrLst/>
+    <dgm:txFillClrLst meth="repeat">
+      <a:schemeClr val="dk1"/>
+    </dgm:txFillClrLst>
+    <dgm:txEffectClrLst/>
+  </dgm:styleLbl>
+  <dgm:styleLbl name="alignAcc1">
+    <dgm:fillClrLst meth="repeat">
+      <a:schemeClr val="lt1">
+        <a:alpha val="90000"/>
+      </a:schemeClr>
+    </dgm:fillClrLst>
+    <dgm:linClrLst meth="repeat">
+      <a:schemeClr val="accent1"/>
+    </dgm:linClrLst>
+    <dgm:effectClrLst/>
+    <dgm:txLinClrLst/>
+    <dgm:txFillClrLst meth="repeat">
+      <a:schemeClr val="dk1"/>
+    </dgm:txFillClrLst>
+    <dgm:txEffectClrLst/>
+  </dgm:styleLbl>
+  <dgm:styleLbl name="trAlignAcc1">
+    <dgm:fillClrLst meth="repeat">
+      <a:schemeClr val="lt1">
+        <a:alpha val="40000"/>
+      </a:schemeClr>
+    </dgm:fillClrLst>
+    <dgm:linClrLst meth="repeat">
+      <a:schemeClr val="accent1"/>
+    </dgm:linClrLst>
+    <dgm:effectClrLst/>
+    <dgm:txLinClrLst/>
+    <dgm:txFillClrLst meth="repeat">
+      <a:schemeClr val="dk1"/>
+    </dgm:txFillClrLst>
+    <dgm:txEffectClrLst/>
+  </dgm:styleLbl>
+  <dgm:styleLbl name="bgAcc1">
+    <dgm:fillClrLst meth="repeat">
+      <a:schemeClr val="lt1">
+        <a:alpha val="90000"/>
+      </a:schemeClr>
+    </dgm:fillClrLst>
+    <dgm:linClrLst meth="repeat">
+      <a:schemeClr val="accent1"/>
+    </dgm:linClrLst>
+    <dgm:effectClrLst/>
+    <dgm:txLinClrLst/>
+    <dgm:txFillClrLst meth="repeat">
+      <a:schemeClr val="dk1"/>
+    </dgm:txFillClrLst>
+    <dgm:txEffectClrLst/>
+  </dgm:styleLbl>
+  <dgm:styleLbl name="solidFgAcc1">
+    <dgm:fillClrLst meth="repeat">
+      <a:schemeClr val="lt1"/>
+    </dgm:fillClrLst>
+    <dgm:linClrLst meth="repeat">
+      <a:schemeClr val="accent1"/>
+    </dgm:linClrLst>
+    <dgm:effectClrLst/>
+    <dgm:txLinClrLst/>
+    <dgm:txFillClrLst meth="repeat">
+      <a:schemeClr val="dk1"/>
+    </dgm:txFillClrLst>
+    <dgm:txEffectClrLst/>
+  </dgm:styleLbl>
+  <dgm:styleLbl name="solidAlignAcc1">
+    <dgm:fillClrLst meth="repeat">
+      <a:schemeClr val="lt1"/>
+    </dgm:fillClrLst>
+    <dgm:linClrLst meth="repeat">
+      <a:schemeClr val="accent1"/>
+    </dgm:linClrLst>
+    <dgm:effectClrLst/>
+    <dgm:txLinClrLst/>
+    <dgm:txFillClrLst meth="repeat">
+      <a:schemeClr val="dk1"/>
+    </dgm:txFillClrLst>
+    <dgm:txEffectClrLst/>
+  </dgm:styleLbl>
+  <dgm:styleLbl name="solidBgAcc1">
+    <dgm:fillClrLst meth="repeat">
+      <a:schemeClr val="lt1"/>
+    </dgm:fillClrLst>
+    <dgm:linClrLst meth="repeat">
+      <a:schemeClr val="accent1"/>
+    </dgm:linClrLst>
+    <dgm:effectClrLst/>
+    <dgm:txLinClrLst/>
+    <dgm:txFillClrLst meth="repeat">
+      <a:schemeClr val="dk1"/>
+    </dgm:txFillClrLst>
+    <dgm:txEffectClrLst/>
+  </dgm:styleLbl>
+  <dgm:styleLbl name="fgAccFollowNode1">
+    <dgm:fillClrLst meth="repeat">
+      <a:schemeClr val="accent1">
+        <a:alpha val="90000"/>
+        <a:tint val="40000"/>
+      </a:schemeClr>
+    </dgm:fillClrLst>
+    <dgm:linClrLst meth="repeat">
+      <a:schemeClr val="accent1">
+        <a:alpha val="90000"/>
+        <a:tint val="40000"/>
+      </a:schemeClr>
+    </dgm:linClrLst>
+    <dgm:effectClrLst/>
+    <dgm:txLinClrLst/>
+    <dgm:txFillClrLst meth="repeat">
+      <a:schemeClr val="dk1"/>
+    </dgm:txFillClrLst>
+    <dgm:txEffectClrLst/>
+  </dgm:styleLbl>
+  <dgm:styleLbl name="alignAccFollowNode1">
+    <dgm:fillClrLst meth="repeat">
+      <a:schemeClr val="accent1">
+        <a:alpha val="90000"/>
+        <a:tint val="40000"/>
+      </a:schemeClr>
+    </dgm:fillClrLst>
+    <dgm:linClrLst meth="repeat">
+      <a:schemeClr val="accent1">
+        <a:alpha val="90000"/>
+        <a:tint val="40000"/>
+      </a:schemeClr>
+    </dgm:linClrLst>
+    <dgm:effectClrLst/>
+    <dgm:txLinClrLst/>
+    <dgm:txFillClrLst meth="repeat">
+      <a:schemeClr val="dk1"/>
+    </dgm:txFillClrLst>
+    <dgm:txEffectClrLst/>
+  </dgm:styleLbl>
+  <dgm:styleLbl name="bgAccFollowNode1">
+    <dgm:fillClrLst meth="repeat">
+      <a:schemeClr val="accent1">
+        <a:alpha val="90000"/>
+        <a:tint val="40000"/>
+      </a:schemeClr>
+    </dgm:fillClrLst>
+    <dgm:linClrLst meth="repeat">
+      <a:schemeClr val="accent1">
+        <a:alpha val="90000"/>
+        <a:tint val="40000"/>
+      </a:schemeClr>
+    </dgm:linClrLst>
+    <dgm:effectClrLst/>
+    <dgm:txLinClrLst/>
+    <dgm:txFillClrLst meth="repeat">
+      <a:schemeClr val="dk1"/>
+    </dgm:txFillClrLst>
+    <dgm:txEffectClrLst/>
+  </dgm:styleLbl>
+  <dgm:styleLbl name="fgAcc0">
+    <dgm:fillClrLst meth="repeat">
+      <a:schemeClr val="lt1">
+        <a:alpha val="90000"/>
+      </a:schemeClr>
+    </dgm:fillClrLst>
+    <dgm:linClrLst meth="repeat">
+      <a:schemeClr val="accent1"/>
+    </dgm:linClrLst>
+    <dgm:effectClrLst/>
+    <dgm:txLinClrLst/>
+    <dgm:txFillClrLst meth="repeat">
+      <a:schemeClr val="dk1"/>
+    </dgm:txFillClrLst>
+    <dgm:txEffectClrLst/>
+  </dgm:styleLbl>
+  <dgm:styleLbl name="fgAcc2">
+    <dgm:fillClrLst meth="repeat">
+      <a:schemeClr val="lt1">
+        <a:alpha val="90000"/>
+      </a:schemeClr>
+    </dgm:fillClrLst>
+    <dgm:linClrLst meth="repeat">
+      <a:schemeClr val="accent1"/>
+    </dgm:linClrLst>
+    <dgm:effectClrLst/>
+    <dgm:txLinClrLst/>
+    <dgm:txFillClrLst meth="repeat">
+      <a:schemeClr val="dk1"/>
+    </dgm:txFillClrLst>
+    <dgm:txEffectClrLst/>
+  </dgm:styleLbl>
+  <dgm:styleLbl name="fgAcc3">
+    <dgm:fillClrLst meth="repeat">
+      <a:schemeClr val="lt1">
+        <a:alpha val="90000"/>
+      </a:schemeClr>
+    </dgm:fillClrLst>
+    <dgm:linClrLst meth="repeat">
+      <a:schemeClr val="accent1"/>
+    </dgm:linClrLst>
+    <dgm:effectClrLst/>
+    <dgm:txLinClrLst/>
+    <dgm:txFillClrLst meth="repeat">
+      <a:schemeClr val="dk1"/>
+    </dgm:txFillClrLst>
+    <dgm:txEffectClrLst/>
+  </dgm:styleLbl>
+  <dgm:styleLbl name="fgAcc4">
+    <dgm:fillClrLst meth="repeat">
+      <a:schemeClr val="lt1">
+        <a:alpha val="90000"/>
+      </a:schemeClr>
+    </dgm:fillClrLst>
+    <dgm:linClrLst meth="repeat">
+      <a:schemeClr val="accent1"/>
+    </dgm:linClrLst>
+    <dgm:effectClrLst/>
+    <dgm:txLinClrLst/>
+    <dgm:txFillClrLst meth="repeat">
+      <a:schemeClr val="dk1"/>
+    </dgm:txFillClrLst>
+    <dgm:txEffectClrLst/>
+  </dgm:styleLbl>
+  <dgm:styleLbl name="bgShp">
+    <dgm:fillClrLst meth="repeat">
+      <a:schemeClr val="accent1">
+        <a:tint val="40000"/>
+      </a:schemeClr>
+    </dgm:fillClrLst>
+    <dgm:linClrLst meth="repeat">
+      <a:schemeClr val="accent1"/>
+    </dgm:linClrLst>
+    <dgm:effectClrLst/>
+    <dgm:txLinClrLst/>
+    <dgm:txFillClrLst meth="repeat">
+      <a:schemeClr val="dk1"/>
+    </dgm:txFillClrLst>
+    <dgm:txEffectClrLst/>
+  </dgm:styleLbl>
+  <dgm:styleLbl name="dkBgShp">
+    <dgm:fillClrLst meth="repeat">
+      <a:schemeClr val="accent1">
+        <a:shade val="80000"/>
+      </a:schemeClr>
+    </dgm:fillClrLst>
+    <dgm:linClrLst meth="repeat">
+      <a:schemeClr val="accent1"/>
+    </dgm:linClrLst>
+    <dgm:effectClrLst/>
+    <dgm:txLinClrLst/>
+    <dgm:txFillClrLst meth="repeat">
+      <a:schemeClr val="lt1"/>
+    </dgm:txFillClrLst>
+    <dgm:txEffectClrLst/>
+  </dgm:styleLbl>
+  <dgm:styleLbl name="trBgShp">
+    <dgm:fillClrLst meth="repeat">
+      <a:schemeClr val="accent1">
+        <a:tint val="50000"/>
+        <a:alpha val="40000"/>
+      </a:schemeClr>
+    </dgm:fillClrLst>
+    <dgm:linClrLst meth="repeat">
+      <a:schemeClr val="accent1"/>
+    </dgm:linClrLst>
+    <dgm:effectClrLst/>
+    <dgm:txLinClrLst/>
+    <dgm:txFillClrLst meth="repeat">
+      <a:schemeClr val="lt1"/>
+    </dgm:txFillClrLst>
+    <dgm:txEffectClrLst/>
+  </dgm:styleLbl>
+  <dgm:styleLbl name="fgShp">
+    <dgm:fillClrLst meth="repeat">
+      <a:schemeClr val="accent1">
+        <a:tint val="60000"/>
+      </a:schemeClr>
+    </dgm:fillClrLst>
+    <dgm:linClrLst meth="repeat">
+      <a:schemeClr val="lt1"/>
+    </dgm:linClrLst>
+    <dgm:effectClrLst/>
+    <dgm:txLinClrLst/>
+    <dgm:txFillClrLst meth="repeat">
+      <a:schemeClr val="dk1"/>
+    </dgm:txFillClrLst>
+    <dgm:txEffectClrLst/>
+  </dgm:styleLbl>
+  <dgm:styleLbl name="revTx">
+    <dgm:fillClrLst meth="repeat">
+      <a:schemeClr val="lt1">
+        <a:alpha val="0"/>
+      </a:schemeClr>
+    </dgm:fillClrLst>
+    <dgm:linClrLst meth="repeat">
+      <a:schemeClr val="dk1">
+        <a:alpha val="0"/>
+      </a:schemeClr>
+    </dgm:linClrLst>
+    <dgm:effectClrLst/>
+    <dgm:txLinClrLst/>
+    <dgm:txFillClrLst meth="repeat">
+      <a:schemeClr val="tx1"/>
+    </dgm:txFillClrLst>
+    <dgm:txEffectClrLst/>
+  </dgm:styleLbl>
+</dgm:colorsDef>
+</file>
+
+<file path=ppt/diagrams/data1.xml><?xml version="1.0" encoding="utf-8"?>
+<dgm:dataModel xmlns:dgm="http://schemas.openxmlformats.org/drawingml/2006/diagram" xmlns:a="http://schemas.openxmlformats.org/drawingml/2006/main">
+  <dgm:ptLst>
+    <dgm:pt modelId="{E2721282-85AB-4A8A-9091-FE84D5211B1B}" type="doc">
+      <dgm:prSet loTypeId="urn:microsoft.com/office/officeart/2008/layout/CircularPictureCallout" loCatId="picture" qsTypeId="urn:microsoft.com/office/officeart/2005/8/quickstyle/simple1" qsCatId="simple" csTypeId="urn:microsoft.com/office/officeart/2005/8/colors/accent1_2" csCatId="accent1" phldr="1"/>
+      <dgm:spPr/>
+    </dgm:pt>
+    <dgm:pt modelId="{C8F75019-4A13-482E-9E65-01F97FA9E70E}">
+      <dgm:prSet phldrT="[Text]" phldr="1"/>
+      <dgm:spPr/>
+      <dgm:t>
+        <a:bodyPr/>
+        <a:lstStyle/>
+        <a:p>
+          <a:endParaRPr lang="en-GB"/>
+        </a:p>
+      </dgm:t>
+    </dgm:pt>
+    <dgm:pt modelId="{01D05D03-0CFA-4670-95FF-17C153DBB736}" type="parTrans" cxnId="{24B46BE3-EB86-4137-8414-85373CF21C79}">
+      <dgm:prSet/>
+      <dgm:spPr/>
+      <dgm:t>
+        <a:bodyPr/>
+        <a:lstStyle/>
+        <a:p>
+          <a:endParaRPr lang="en-GB"/>
+        </a:p>
+      </dgm:t>
+    </dgm:pt>
+    <dgm:pt modelId="{ECFA26F9-B486-42B0-AF67-F6B79A5432CB}" type="sibTrans" cxnId="{24B46BE3-EB86-4137-8414-85373CF21C79}">
+      <dgm:prSet/>
+      <dgm:spPr>
+        <a:blipFill>
+          <a:blip xmlns:r="http://schemas.openxmlformats.org/officeDocument/2006/relationships" r:embed="rId1">
+            <a:extLst>
+              <a:ext uri="{28A0092B-C50C-407E-A947-70E740481C1C}">
+                <a14:useLocalDpi xmlns:a14="http://schemas.microsoft.com/office/drawing/2010/main" val="0"/>
+              </a:ext>
+            </a:extLst>
+          </a:blip>
+          <a:srcRect/>
+          <a:stretch>
+            <a:fillRect/>
+          </a:stretch>
+        </a:blipFill>
+      </dgm:spPr>
+      <dgm:t>
+        <a:bodyPr/>
+        <a:lstStyle/>
+        <a:p>
+          <a:endParaRPr lang="en-GB"/>
+        </a:p>
+      </dgm:t>
+      <dgm:extLst>
+        <a:ext uri="{E40237B7-FDA0-4F09-8148-C483321AD2D9}">
+          <dgm14:cNvPr xmlns:dgm14="http://schemas.microsoft.com/office/drawing/2010/diagram" id="0" name="" descr="DoorSine app icon">
+            <a:extLst>
+              <a:ext uri="{FF2B5EF4-FFF2-40B4-BE49-F238E27FC236}">
+                <a16:creationId xmlns:a16="http://schemas.microsoft.com/office/drawing/2014/main" id="{524DF0E7-A831-4322-B6E2-C48E8926C9FE}"/>
+              </a:ext>
+            </a:extLst>
+          </dgm14:cNvPr>
+        </a:ext>
+      </dgm:extLst>
+    </dgm:pt>
+    <dgm:pt modelId="{B7CFD492-3A65-4A4E-9B55-A7F0F7EB4822}" type="pres">
+      <dgm:prSet presAssocID="{E2721282-85AB-4A8A-9091-FE84D5211B1B}" presName="Name0" presStyleCnt="0">
+        <dgm:presLayoutVars>
+          <dgm:chMax val="7"/>
+          <dgm:chPref val="7"/>
+          <dgm:dir/>
+        </dgm:presLayoutVars>
+      </dgm:prSet>
+      <dgm:spPr/>
+    </dgm:pt>
+    <dgm:pt modelId="{C1DDCBBF-CC9C-4616-B688-6BDF3DC0FDF1}" type="pres">
+      <dgm:prSet presAssocID="{E2721282-85AB-4A8A-9091-FE84D5211B1B}" presName="Name1" presStyleCnt="0"/>
+      <dgm:spPr/>
+    </dgm:pt>
+    <dgm:pt modelId="{A90F9A83-372B-4C96-B042-750E0DF40014}" type="pres">
+      <dgm:prSet presAssocID="{ECFA26F9-B486-42B0-AF67-F6B79A5432CB}" presName="picture_1" presStyleCnt="0"/>
+      <dgm:spPr/>
+    </dgm:pt>
+    <dgm:pt modelId="{02F3159F-24CA-441C-8E10-201DBADB7D24}" type="pres">
+      <dgm:prSet presAssocID="{ECFA26F9-B486-42B0-AF67-F6B79A5432CB}" presName="pictureRepeatNode" presStyleLbl="alignImgPlace1" presStyleIdx="0" presStyleCnt="1" custScaleX="200000" custScaleY="198635" custLinFactNeighborX="804" custLinFactNeighborY="699"/>
+      <dgm:spPr/>
+    </dgm:pt>
+    <dgm:pt modelId="{4EB9D189-E9A7-4CBC-9546-1109F11EA9D3}" type="pres">
+      <dgm:prSet presAssocID="{C8F75019-4A13-482E-9E65-01F97FA9E70E}" presName="text_1" presStyleLbl="node1" presStyleIdx="0" presStyleCnt="0">
+        <dgm:presLayoutVars>
+          <dgm:bulletEnabled val="1"/>
+        </dgm:presLayoutVars>
+      </dgm:prSet>
+      <dgm:spPr/>
+    </dgm:pt>
+  </dgm:ptLst>
+  <dgm:cxnLst>
+    <dgm:cxn modelId="{92AD136D-45FE-4BEB-942F-FB5D989D87B2}" type="presOf" srcId="{C8F75019-4A13-482E-9E65-01F97FA9E70E}" destId="{4EB9D189-E9A7-4CBC-9546-1109F11EA9D3}" srcOrd="0" destOrd="0" presId="urn:microsoft.com/office/officeart/2008/layout/CircularPictureCallout"/>
+    <dgm:cxn modelId="{8E41C350-528A-46B4-B619-0F9E8B391702}" type="presOf" srcId="{E2721282-85AB-4A8A-9091-FE84D5211B1B}" destId="{B7CFD492-3A65-4A4E-9B55-A7F0F7EB4822}" srcOrd="0" destOrd="0" presId="urn:microsoft.com/office/officeart/2008/layout/CircularPictureCallout"/>
+    <dgm:cxn modelId="{705A66CE-DEE3-41CA-A958-51844A340088}" type="presOf" srcId="{ECFA26F9-B486-42B0-AF67-F6B79A5432CB}" destId="{02F3159F-24CA-441C-8E10-201DBADB7D24}" srcOrd="0" destOrd="0" presId="urn:microsoft.com/office/officeart/2008/layout/CircularPictureCallout"/>
+    <dgm:cxn modelId="{24B46BE3-EB86-4137-8414-85373CF21C79}" srcId="{E2721282-85AB-4A8A-9091-FE84D5211B1B}" destId="{C8F75019-4A13-482E-9E65-01F97FA9E70E}" srcOrd="0" destOrd="0" parTransId="{01D05D03-0CFA-4670-95FF-17C153DBB736}" sibTransId="{ECFA26F9-B486-42B0-AF67-F6B79A5432CB}"/>
+    <dgm:cxn modelId="{CEE4C663-AA14-4C81-8D6C-827ACB085C65}" type="presParOf" srcId="{B7CFD492-3A65-4A4E-9B55-A7F0F7EB4822}" destId="{C1DDCBBF-CC9C-4616-B688-6BDF3DC0FDF1}" srcOrd="0" destOrd="0" presId="urn:microsoft.com/office/officeart/2008/layout/CircularPictureCallout"/>
+    <dgm:cxn modelId="{DAB7E975-5C70-4E80-AD82-197EC593279F}" type="presParOf" srcId="{C1DDCBBF-CC9C-4616-B688-6BDF3DC0FDF1}" destId="{A90F9A83-372B-4C96-B042-750E0DF40014}" srcOrd="0" destOrd="0" presId="urn:microsoft.com/office/officeart/2008/layout/CircularPictureCallout"/>
+    <dgm:cxn modelId="{2B16B80A-FBAD-416A-B79A-36E3DD15B0E0}" type="presParOf" srcId="{A90F9A83-372B-4C96-B042-750E0DF40014}" destId="{02F3159F-24CA-441C-8E10-201DBADB7D24}" srcOrd="0" destOrd="0" presId="urn:microsoft.com/office/officeart/2008/layout/CircularPictureCallout"/>
+    <dgm:cxn modelId="{6DAB0CC7-39CD-4582-99CA-6AC45C124ECF}" type="presParOf" srcId="{C1DDCBBF-CC9C-4616-B688-6BDF3DC0FDF1}" destId="{4EB9D189-E9A7-4CBC-9546-1109F11EA9D3}" srcOrd="1" destOrd="0" presId="urn:microsoft.com/office/officeart/2008/layout/CircularPictureCallout"/>
+  </dgm:cxnLst>
+  <dgm:bg/>
+  <dgm:whole/>
+  <dgm:extLst>
+    <a:ext uri="http://schemas.microsoft.com/office/drawing/2008/diagram">
+      <dsp:dataModelExt xmlns:dsp="http://schemas.microsoft.com/office/drawing/2008/diagram" relId="rId14" minVer="http://schemas.openxmlformats.org/drawingml/2006/diagram"/>
+    </a:ext>
+  </dgm:extLst>
+</dgm:dataModel>
+</file>
+
+<file path=ppt/diagrams/drawing1.xml><?xml version="1.0" encoding="utf-8"?>
+<dsp:drawing xmlns:dgm="http://schemas.openxmlformats.org/drawingml/2006/diagram" xmlns:dsp="http://schemas.microsoft.com/office/drawing/2008/diagram" xmlns:a="http://schemas.openxmlformats.org/drawingml/2006/main">
+  <dsp:spTree>
+    <dsp:nvGrpSpPr>
+      <dsp:cNvPr id="0" name=""/>
+      <dsp:cNvGrpSpPr/>
+    </dsp:nvGrpSpPr>
+    <dsp:grpSpPr/>
+    <dsp:sp modelId="{02F3159F-24CA-441C-8E10-201DBADB7D24}">
+      <dsp:nvSpPr>
+        <dsp:cNvPr id="0" name=""/>
+        <dsp:cNvSpPr/>
+      </dsp:nvSpPr>
+      <dsp:spPr>
+        <a:xfrm>
+          <a:off x="0" y="-1"/>
+          <a:ext cx="1512735" cy="1502410"/>
+        </a:xfrm>
+        <a:prstGeom prst="ellipse">
+          <a:avLst/>
+        </a:prstGeom>
+        <a:blipFill>
+          <a:blip xmlns:r="http://schemas.openxmlformats.org/officeDocument/2006/relationships" r:embed="rId1">
+            <a:extLst>
+              <a:ext uri="{28A0092B-C50C-407E-A947-70E740481C1C}">
+                <a14:useLocalDpi xmlns:a14="http://schemas.microsoft.com/office/drawing/2010/main" val="0"/>
+              </a:ext>
+            </a:extLst>
+          </a:blip>
+          <a:srcRect/>
+          <a:stretch>
+            <a:fillRect/>
+          </a:stretch>
+        </a:blipFill>
+        <a:ln w="25400" cap="flat" cmpd="sng" algn="ctr">
+          <a:solidFill>
+            <a:schemeClr val="lt1">
+              <a:hueOff val="0"/>
+              <a:satOff val="0"/>
+              <a:lumOff val="0"/>
+              <a:alphaOff val="0"/>
+            </a:schemeClr>
+          </a:solidFill>
+          <a:prstDash val="solid"/>
+        </a:ln>
+        <a:effectLst/>
+      </dsp:spPr>
+      <dsp:style>
+        <a:lnRef idx="2">
+          <a:scrgbClr r="0" g="0" b="0"/>
+        </a:lnRef>
+        <a:fillRef idx="1">
+          <a:scrgbClr r="0" g="0" b="0"/>
+        </a:fillRef>
+        <a:effectRef idx="0">
+          <a:scrgbClr r="0" g="0" b="0"/>
+        </a:effectRef>
+        <a:fontRef idx="minor"/>
+      </dsp:style>
+    </dsp:sp>
+    <dsp:sp modelId="{4EB9D189-E9A7-4CBC-9546-1109F11EA9D3}">
+      <dsp:nvSpPr>
+        <dsp:cNvPr id="0" name=""/>
+        <dsp:cNvSpPr/>
+      </dsp:nvSpPr>
+      <dsp:spPr>
+        <a:xfrm>
+          <a:off x="514329" y="774650"/>
+          <a:ext cx="484075" cy="249601"/>
+        </a:xfrm>
+        <a:prstGeom prst="rect">
+          <a:avLst/>
+        </a:prstGeom>
+        <a:noFill/>
+        <a:ln w="25400" cap="flat" cmpd="sng" algn="ctr">
+          <a:noFill/>
+          <a:prstDash val="solid"/>
+        </a:ln>
+        <a:effectLst/>
+        <a:sp3d/>
+      </dsp:spPr>
+      <dsp:style>
+        <a:lnRef idx="2">
+          <a:scrgbClr r="0" g="0" b="0"/>
+        </a:lnRef>
+        <a:fillRef idx="1">
+          <a:scrgbClr r="0" g="0" b="0"/>
+        </a:fillRef>
+        <a:effectRef idx="0">
+          <a:scrgbClr r="0" g="0" b="0"/>
+        </a:effectRef>
+        <a:fontRef idx="minor">
+          <a:schemeClr val="lt1"/>
+        </a:fontRef>
+      </dsp:style>
+      <dsp:txBody>
+        <a:bodyPr spcFirstLastPara="0" vert="horz" wrap="square" lIns="0" tIns="0" rIns="0" bIns="0" numCol="1" spcCol="1270" anchor="b" anchorCtr="0">
+          <a:noAutofit/>
+        </a:bodyPr>
+        <a:lstStyle/>
+        <a:p>
+          <a:pPr marL="0" lvl="0" indent="0" algn="ctr" defTabSz="666750">
+            <a:lnSpc>
+              <a:spcPct val="90000"/>
+            </a:lnSpc>
+            <a:spcBef>
+              <a:spcPct val="0"/>
+            </a:spcBef>
+            <a:spcAft>
+              <a:spcPct val="35000"/>
+            </a:spcAft>
+            <a:buNone/>
+          </a:pPr>
+          <a:endParaRPr lang="en-GB" sz="1500" kern="1200"/>
+        </a:p>
+      </dsp:txBody>
+      <dsp:txXfrm>
+        <a:off x="514329" y="774650"/>
+        <a:ext cx="484075" cy="249601"/>
+      </dsp:txXfrm>
+    </dsp:sp>
+  </dsp:spTree>
+</dsp:drawing>
+</file>
+
+<file path=ppt/diagrams/layout1.xml><?xml version="1.0" encoding="utf-8"?>
+<dgm:layoutDef xmlns:dgm="http://schemas.openxmlformats.org/drawingml/2006/diagram" xmlns:a="http://schemas.openxmlformats.org/drawingml/2006/main" uniqueId="urn:microsoft.com/office/officeart/2008/layout/CircularPictureCallout">
+  <dgm:title val=""/>
+  <dgm:desc val=""/>
+  <dgm:catLst>
+    <dgm:cat type="picture" pri="2000"/>
+    <dgm:cat type="pictureconvert" pri="2000"/>
+  </dgm:catLst>
+  <dgm:sampData>
+    <dgm:dataModel>
+      <dgm:ptLst>
+        <dgm:pt modelId="0" type="doc"/>
+        <dgm:pt modelId="1"/>
+        <dgm:pt modelId="2">
+          <dgm:prSet phldr="1"/>
+        </dgm:pt>
+        <dgm:pt modelId="3">
+          <dgm:prSet phldr="1"/>
+        </dgm:pt>
+        <dgm:pt modelId="4">
+          <dgm:prSet phldr="1"/>
+        </dgm:pt>
+      </dgm:ptLst>
+      <dgm:cxnLst>
+        <dgm:cxn modelId="5" srcId="0" destId="1" srcOrd="0" destOrd="0"/>
+        <dgm:cxn modelId="6" srcId="0" destId="2" srcOrd="1" destOrd="0"/>
+        <dgm:cxn modelId="7" srcId="0" destId="3" srcOrd="2" destOrd="0"/>
+        <dgm:cxn modelId="8" srcId="0" destId="4" srcOrd="3" destOrd="0"/>
+      </dgm:cxnLst>
+      <dgm:bg/>
+      <dgm:whole/>
+    </dgm:dataModel>
+  </dgm:sampData>
+  <dgm:styleData>
+    <dgm:dataModel>
+      <dgm:ptLst>
+        <dgm:pt modelId="0" type="doc"/>
+        <dgm:pt modelId="1">
+          <dgm:prSet phldr="1"/>
+        </dgm:pt>
+        <dgm:pt modelId="2">
+          <dgm:prSet phldr="1"/>
+        </dgm:pt>
+        <dgm:pt modelId="3">
+          <dgm:prSet phldr="1"/>
+        </dgm:pt>
+        <dgm:pt modelId="4">
+          <dgm:prSet phldr="1"/>
+        </dgm:pt>
+      </dgm:ptLst>
+      <dgm:cxnLst>
+        <dgm:cxn modelId="5" srcId="0" destId="1" srcOrd="0" destOrd="0"/>
+        <dgm:cxn modelId="6" srcId="0" destId="2" srcOrd="1" destOrd="0"/>
+        <dgm:cxn modelId="7" srcId="0" destId="3" srcOrd="2" destOrd="0"/>
+        <dgm:cxn modelId="8" srcId="0" destId="4" srcOrd="3" destOrd="0"/>
+      </dgm:cxnLst>
+      <dgm:bg/>
+      <dgm:whole/>
+    </dgm:dataModel>
+  </dgm:styleData>
+  <dgm:clrData>
+    <dgm:dataModel>
+      <dgm:ptLst>
+        <dgm:pt modelId="0" type="doc"/>
+        <dgm:pt modelId="1">
+          <dgm:prSet phldr="1"/>
+        </dgm:pt>
+        <dgm:pt modelId="2">
+          <dgm:prSet phldr="1"/>
+        </dgm:pt>
+        <dgm:pt modelId="3">
+          <dgm:prSet phldr="1"/>
+        </dgm:pt>
+        <dgm:pt modelId="4">
+          <dgm:prSet phldr="1"/>
+        </dgm:pt>
+      </dgm:ptLst>
+      <dgm:cxnLst>
+        <dgm:cxn modelId="5" srcId="0" destId="1" srcOrd="0" destOrd="0"/>
+        <dgm:cxn modelId="6" srcId="0" destId="2" srcOrd="1" destOrd="0"/>
+        <dgm:cxn modelId="7" srcId="0" destId="3" srcOrd="2" destOrd="0"/>
+        <dgm:cxn modelId="8" srcId="0" destId="4" srcOrd="3" destOrd="0"/>
+      </dgm:cxnLst>
+      <dgm:bg/>
+      <dgm:whole/>
+    </dgm:dataModel>
+  </dgm:clrData>
+  <dgm:layoutNode name="Name0">
+    <dgm:varLst>
+      <dgm:chMax val="7"/>
+      <dgm:chPref val="7"/>
+      <dgm:dir/>
+    </dgm:varLst>
+    <dgm:alg type="composite"/>
+    <dgm:shape xmlns:r="http://schemas.openxmlformats.org/officeDocument/2006/relationships" r:blip="">
+      <dgm:adjLst/>
+    </dgm:shape>
+    <dgm:constrLst>
+      <dgm:constr type="w" for="ch" refType="h" refFor="ch" op="gte" fact="2"/>
+    </dgm:constrLst>
+    <dgm:layoutNode name="Name1">
+      <dgm:alg type="composite"/>
+      <dgm:shape xmlns:r="http://schemas.openxmlformats.org/officeDocument/2006/relationships" r:blip="">
+        <dgm:adjLst/>
+      </dgm:shape>
+      <dgm:choose name="Name2">
+        <dgm:if name="Name3" axis="ch" ptType="node" func="cnt" op="lte" val="1">
+          <dgm:constrLst>
+            <dgm:constr type="h" for="ch" forName="picture_1" refType="h"/>
+            <dgm:constr type="w" for="ch" forName="picture_1" refType="h" refFor="ch" refForName="picture_1" op="equ"/>
+            <dgm:constr type="l" for="ch" forName="picture_1"/>
+            <dgm:constr type="t" for="ch" forName="picture_1"/>
+            <dgm:constr type="w" for="ch" forName="text_1" refType="w" refFor="ch" refForName="picture_1" fact="0.64"/>
+            <dgm:constr type="h" for="ch" forName="text_1" refType="h" refFor="ch" refForName="picture_1" fact="0.33"/>
+            <dgm:constr type="l" for="ch" forName="text_1" refType="w" refFor="ch" refForName="picture_1" fact="0.18"/>
+            <dgm:constr type="t" for="ch" forName="text_1" refType="h" refFor="ch" refForName="picture_1" fact="0.531"/>
+          </dgm:constrLst>
+        </dgm:if>
+        <dgm:if name="Name4" axis="ch" ptType="node" func="cnt" op="lte" val="2">
+          <dgm:choose name="Name5">
+            <dgm:if name="Name6" func="var" arg="dir" op="equ" val="norm">
+              <dgm:constrLst>
+                <dgm:constr type="h" for="ch" forName="picture_1" refType="h"/>
+                <dgm:constr type="w" for="ch" forName="picture_1" refType="h" refFor="ch" refForName="picture_1" op="equ"/>
+                <dgm:constr type="l" for="ch" forName="picture_1"/>
+                <dgm:constr type="t" for="ch" forName="picture_1"/>
+                <dgm:constr type="w" for="ch" forName="text_1" refType="w" refFor="ch" refForName="picture_1" fact="0.64"/>
+                <dgm:constr type="h" for="ch" forName="text_1" refType="h" refFor="ch" refForName="picture_1" fact="0.33"/>
+                <dgm:constr type="l" for="ch" forName="text_1" refType="l" refFor="ch" refForName="picture_1"/>
+                <dgm:constr type="lOff" for="ch" forName="text_1" refType="w" refFor="ch" refForName="picture_1" fact="0.18"/>
+                <dgm:constr type="t" for="ch" forName="text_1" refType="h" refFor="ch" refForName="picture_1" fact="0.531"/>
+                <dgm:constr type="w" for="ch" forName="picture_2" refType="w" refFor="ch" refForName="picture_1" fact="0.5"/>
+                <dgm:constr type="h" for="ch" forName="picture_2" refType="h" refFor="ch" refForName="picture_1" fact="0.5"/>
+                <dgm:constr type="l" for="ch" forName="picture_2" refType="w" refFor="ch" refForName="picture_1" fact="1.21"/>
+                <dgm:constr type="ctrY" for="ch" forName="picture_2" refType="h" refFor="ch" refForName="picture_1" fact="0.5"/>
+                <dgm:constr type="l" for="ch" forName="line_2" refType="ctrX" refFor="ch" refForName="picture_1"/>
+                <dgm:constr type="h" for="ch" forName="line_2"/>
+                <dgm:constr type="r" for="ch" forName="line_2" refType="ctrX" refFor="ch" refForName="picture_2"/>
+                <dgm:constr type="ctrY" for="ch" forName="line_2" refType="ctrY" refFor="ch" refForName="picture_2"/>
+                <dgm:constr type="r" for="ch" forName="textparent_2" refType="w"/>
+                <dgm:constr type="h" for="ch" forName="textparent_2" refType="h" refFor="ch" refForName="picture_2"/>
+                <dgm:constr type="l" for="ch" forName="textparent_2" refType="r" refFor="ch" refForName="picture_2"/>
+                <dgm:constr type="ctrY" for="ch" forName="textparent_2" refType="ctrY" refFor="ch" refForName="picture_2"/>
+                <dgm:constr type="primFontSz" for="des" forName="text_2" val="65"/>
+              </dgm:constrLst>
+            </dgm:if>
+            <dgm:else name="Name7">
+              <dgm:constrLst>
+                <dgm:constr type="h" for="ch" forName="picture_1" refType="h"/>
+                <dgm:constr type="w" for="ch" forName="picture_1" refType="h" refFor="ch" refForName="picture_1" op="equ"/>
+                <dgm:constr type="r" for="ch" forName="picture_1" refType="w"/>
+                <dgm:constr type="t" for="ch" forName="picture_1"/>
+                <dgm:constr type="w" for="ch" forName="text_1" refType="w" refFor="ch" refForName="picture_1" fact="0.64"/>
+                <dgm:constr type="h" for="ch" forName="text_1" refType="h" refFor="ch" refForName="picture_1" fact="0.33"/>
+                <dgm:constr type="l" for="ch" forName="text_1" refType="l" refFor="ch" refForName="picture_1"/>
+                <dgm:constr type="lOff" for="ch" forName="text_1" refType="w" refFor="ch" refForName="picture_1" fact="0.18"/>
+                <dgm:constr type="t" for="ch" forName="text_1" refType="h" refFor="ch" refForName="picture_1" fact="0.531"/>
+                <dgm:constr type="w" for="ch" forName="picture_2" refType="w" refFor="ch" refForName="picture_1" fact="0.5"/>
+                <dgm:constr type="h" for="ch" forName="picture_2" refType="h" refFor="ch" refForName="picture_1" fact="0.5"/>
+                <dgm:constr type="r" for="ch" forName="picture_2" refType="w"/>
+                <dgm:constr type="rOff" for="ch" forName="picture_2" refType="w" refFor="ch" refForName="picture_1" fact="-1.21"/>
+                <dgm:constr type="ctrY" for="ch" forName="picture_2" refType="h" refFor="ch" refForName="picture_1" fact="0.5"/>
+                <dgm:constr type="r" for="ch" forName="line_2" refType="ctrX" refFor="ch" refForName="picture_1"/>
+                <dgm:constr type="h" for="ch" forName="line_2"/>
+                <dgm:constr type="l" for="ch" forName="line_2" refType="ctrX" refFor="ch" refForName="picture_2"/>
+                <dgm:constr type="ctrY" for="ch" forName="line_2" refType="ctrY" refFor="ch" refForName="picture_2"/>
+                <dgm:constr type="l" for="ch" forName="textparent_2"/>
+                <dgm:constr type="h" for="ch" forName="textparent_2" refType="h" refFor="ch" refForName="picture_2"/>
+                <dgm:constr type="r" for="ch" forName="textparent_2" refType="l" refFor="ch" refForName="picture_2"/>
+                <dgm:constr type="ctrY" for="ch" forName="textparent_2" refType="ctrY" refFor="ch" refForName="picture_2"/>
+                <dgm:constr type="primFontSz" for="des" forName="text_2" val="65"/>
+              </dgm:constrLst>
+            </dgm:else>
+          </dgm:choose>
+        </dgm:if>
+        <dgm:if name="Name8" axis="ch" ptType="node" func="cnt" op="lte" val="3">
+          <dgm:choose name="Name9">
+            <dgm:if name="Name10" func="var" arg="dir" op="equ" val="norm">
+              <dgm:constrLst>
+                <dgm:constr type="h" for="ch" forName="picture_1" refType="h"/>
+                <dgm:constr type="w" for="ch" forName="picture_1" refType="h" refFor="ch" refForName="picture_1" op="equ"/>
+                <dgm:constr type="l" for="ch" forName="picture_1"/>
+                <dgm:constr type="t" for="ch" forName="picture_1"/>
+                <dgm:constr type="w" for="ch" forName="text_1" refType="w" refFor="ch" refForName="picture_1" fact="0.64"/>
+                <dgm:constr type="h" for="ch" forName="text_1" refType="h" refFor="ch" refForName="picture_1" fact="0.33"/>
+                <dgm:constr type="l" for="ch" forName="text_1" refType="l" refFor="ch" refForName="picture_1"/>
+                <dgm:constr type="lOff" for="ch" forName="text_1" refType="w" refFor="ch" refForName="picture_1" fact="0.18"/>
+                <dgm:constr type="t" for="ch" forName="text_1" refType="h" refFor="ch" refForName="picture_1" fact="0.531"/>
+                <dgm:constr type="w" for="ch" forName="picture_2" refType="w" refFor="ch" refForName="picture_1" fact="0.375"/>
+                <dgm:constr type="h" for="ch" forName="picture_2" refType="h" refFor="ch" refForName="picture_1" fact="0.375"/>
+                <dgm:constr type="l" for="ch" forName="picture_2" refType="w" refFor="ch" refForName="picture_1" fact="1.21"/>
+                <dgm:constr type="ctrY" for="ch" forName="picture_2" refType="h" refFor="ch" refForName="picture_1" fact="0.1875"/>
+                <dgm:constr type="l" for="ch" forName="line_2" refType="ctrX" refFor="ch" refForName="picture_1"/>
+                <dgm:constr type="h" for="ch" forName="line_2"/>
+                <dgm:constr type="r" for="ch" forName="line_2" refType="ctrX" refFor="ch" refForName="picture_2"/>
+                <dgm:constr type="ctrY" for="ch" forName="line_2" refType="ctrY" refFor="ch" refForName="picture_2"/>
+                <dgm:constr type="r" for="ch" forName="textparent_2" refType="w"/>
+                <dgm:constr type="h" for="ch" forName="textparent_2" refType="h" refFor="ch" refForName="picture_2"/>
+                <dgm:constr type="l" for="ch" forName="textparent_2" refType="r" refFor="ch" refForName="picture_2"/>
+                <dgm:constr type="ctrY" for="ch" forName="textparent_2" refType="ctrY" refFor="ch" refForName="picture_2"/>
+                <dgm:constr type="primFontSz" for="des" forName="text_2" val="65"/>
+                <dgm:constr type="w" for="ch" forName="picture_3" refType="w" refFor="ch" refForName="picture_1" fact="0.375"/>
+                <dgm:constr type="h" for="ch" forName="picture_3" refType="h" refFor="ch" refForName="picture_1" fact="0.375"/>
+                <dgm:constr type="l" for="ch" forName="picture_3" refType="w" refFor="ch" refForName="picture_1" fact="1.21"/>
+                <dgm:constr type="ctrY" for="ch" forName="picture_3" refType="h" refFor="ch" refForName="picture_1" fact="0.8125"/>
+                <dgm:constr type="l" for="ch" forName="line_3" refType="ctrX" refFor="ch" refForName="picture_1"/>
+                <dgm:constr type="h" for="ch" forName="line_3"/>
+                <dgm:constr type="r" for="ch" forName="line_3" refType="ctrX" refFor="ch" refForName="picture_3"/>
+                <dgm:constr type="ctrY" for="ch" forName="line_3" refType="ctrY" refFor="ch" refForName="picture_3"/>
+                <dgm:constr type="r" for="ch" forName="textparent_3" refType="w"/>
+                <dgm:constr type="h" for="ch" forName="textparent_3" refType="h" refFor="ch" refForName="picture_3"/>
+                <dgm:constr type="l" for="ch" forName="textparent_3" refType="r" refFor="ch" refForName="picture_3"/>
+                <dgm:constr type="ctrY" for="ch" forName="textparent_3" refType="ctrY" refFor="ch" refForName="picture_3"/>
+                <dgm:constr type="primFontSz" for="des" forName="text_3" refType="primFontSz" refFor="des" refForName="text_2" op="equ"/>
+              </dgm:constrLst>
+            </dgm:if>
+            <dgm:else name="Name11">
+              <dgm:constrLst>
+                <dgm:constr type="h" for="ch" forName="picture_1" refType="h"/>
+                <dgm:constr type="w" for="ch" forName="picture_1" refType="h" refFor="ch" refForName="picture_1" op="equ"/>
+                <dgm:constr type="r" for="ch" forName="picture_1" refType="w"/>
+                <dgm:constr type="t" for="ch" forName="picture_1"/>
+                <dgm:constr type="w" for="ch" forName="text_1" refType="w" refFor="ch" refForName="picture_1" fact="0.64"/>
+                <dgm:constr type="h" for="ch" forName="text_1" refType="h" refFor="ch" refForName="picture_1" fact="0.33"/>
+                <dgm:constr type="l" for="ch" forName="text_1" refType="l" refFor="ch" refForName="picture_1"/>
+                <dgm:constr type="lOff" for="ch" forName="text_1" refType="w" refFor="ch" refForName="picture_1" fact="0.18"/>
+                <dgm:constr type="t" for="ch" forName="text_1" refType="h" refFor="ch" refForName="picture_1" fact="0.531"/>
+                <dgm:constr type="w" for="ch" forName="picture_2" refType="w" refFor="ch" refForName="picture_1" fact="0.375"/>
+                <dgm:constr type="h" for="ch" forName="picture_2" refType="h" refFor="ch" refForName="picture_1" fact="0.375"/>
+                <dgm:constr type="r" for="ch" forName="picture_2" refType="w"/>
+                <dgm:constr type="rOff" for="ch" forName="picture_2" refType="w" refFor="ch" refForName="picture_1" fact="-1.21"/>
+                <dgm:constr type="ctrY" for="ch" forName="picture_2" refType="h" refFor="ch" refForName="picture_1" fact="0.1875"/>
+                <dgm:constr type="r" for="ch" forName="line_2" refType="ctrX" refFor="ch" refForName="picture_1"/>
+                <dgm:constr type="h" for="ch" forName="line_2"/>
+                <dgm:constr type="l" for="ch" forName="line_2" refType="ctrX" refFor="ch" refForName="picture_2"/>
+                <dgm:constr type="ctrY" for="ch" forName="line_2" refType="ctrY" refFor="ch" refForName="picture_2"/>
+                <dgm:constr type="l" for="ch" forName="textparent_2"/>
+                <dgm:constr type="h" for="ch" forName="textparent_2" refType="h" refFor="ch" refForName="picture_2"/>
+                <dgm:constr type="r" for="ch" forName="textparent_2" refType="l" refFor="ch" refForName="picture_2"/>
+                <dgm:constr type="ctrY" for="ch" forName="textparent_2" refType="ctrY" refFor="ch" refForName="picture_2"/>
+                <dgm:constr type="primFontSz" for="des" forName="text_2" val="65"/>
+                <dgm:constr type="w" for="ch" forName="picture_3" refType="w" refFor="ch" refForName="picture_1" fact="0.375"/>
+                <dgm:constr type="h" for="ch" forName="picture_3" refType="h" refFor="ch" refForName="picture_1" fact="0.375"/>
+                <dgm:constr type="r" for="ch" forName="picture_3" refType="w"/>
+                <dgm:constr type="rOff" for="ch" forName="picture_3" refType="w" refFor="ch" refForName="picture_1" fact="-1.21"/>
+                <dgm:constr type="ctrY" for="ch" forName="picture_3" refType="h" refFor="ch" refForName="picture_1" fact="0.8125"/>
+                <dgm:constr type="r" for="ch" forName="line_3" refType="ctrX" refFor="ch" refForName="picture_1"/>
+                <dgm:constr type="h" for="ch" forName="line_3"/>
+                <dgm:constr type="l" for="ch" forName="line_3" refType="ctrX" refFor="ch" refForName="picture_3"/>
+                <dgm:constr type="ctrY" for="ch" forName="line_3" refType="ctrY" refFor="ch" refForName="picture_3"/>
+                <dgm:constr type="l" for="ch" forName="textparent_3"/>
+                <dgm:constr type="h" for="ch" forName="textparent_3" refType="h" refFor="ch" refForName="picture_3"/>
+                <dgm:constr type="r" for="ch" forName="textparent_3" refType="l" refFor="ch" refForName="picture_3"/>
+                <dgm:constr type="ctrY" for="ch" forName="textparent_3" refType="ctrY" refFor="ch" refForName="picture_3"/>
+                <dgm:constr type="primFontSz" for="des" forName="text_3" refType="primFontSz" refFor="des" refForName="text_2" op="equ"/>
+              </dgm:constrLst>
+            </dgm:else>
+          </dgm:choose>
+        </dgm:if>
+        <dgm:if name="Name12" axis="ch" ptType="node" func="cnt" op="lte" val="4">
+          <dgm:choose name="Name13">
+            <dgm:if name="Name14" func="var" arg="dir" op="equ" val="norm">
+              <dgm:constrLst>
+                <dgm:constr type="h" for="ch" forName="picture_1" refType="h"/>
+                <dgm:constr type="w" for="ch" forName="picture_1" refType="h" refFor="ch" refForName="picture_1" op="equ"/>
+                <dgm:constr type="l" for="ch" forName="picture_1"/>
+                <dgm:constr type="t" for="ch" forName="picture_1"/>
+                <dgm:constr type="w" for="ch" forName="text_1" refType="w" refFor="ch" refForName="picture_1" fact="0.64"/>
+                <dgm:constr type="h" for="ch" forName="text_1" refType="h" refFor="ch" refForName="picture_1" fact="0.33"/>
+                <dgm:constr type="l" for="ch" forName="text_1" refType="l" refFor="ch" refForName="picture_1"/>
+                <dgm:constr type="lOff" for="ch" forName="text_1" refType="w" refFor="ch" refForName="picture_1" fact="0.18"/>
+                <dgm:constr type="t" for="ch" forName="text_1" refType="h" refFor="ch" refForName="picture_1" fact="0.531"/>
+                <dgm:constr type="w" for="ch" forName="picture_2" refType="w" refFor="ch" refForName="picture_1" fact="0.3"/>
+                <dgm:constr type="h" for="ch" forName="picture_2" refType="h" refFor="ch" refForName="picture_1" fact="0.3"/>
+                <dgm:constr type="l" for="ch" forName="picture_2" refType="w" refFor="ch" refForName="picture_1" fact="1.354"/>
+                <dgm:constr type="ctrY" for="ch" forName="picture_2" refType="h" refFor="ch" refForName="picture_1" fact="0.15"/>
+                <dgm:constr type="l" for="ch" forName="line_2" refType="ctrX" refFor="ch" refForName="picture_1"/>
+                <dgm:constr type="h" for="ch" forName="line_2"/>
+                <dgm:constr type="r" for="ch" forName="line_2" refType="ctrX" refFor="ch" refForName="picture_2"/>
+                <dgm:constr type="ctrY" for="ch" forName="line_2" refType="ctrY" refFor="ch" refForName="picture_2"/>
+                <dgm:constr type="r" for="ch" forName="textparent_2" refType="w"/>
+                <dgm:constr type="h" for="ch" forName="textparent_2" refType="h" refFor="ch" refForName="picture_2"/>
+                <dgm:constr type="l" for="ch" forName="textparent_2" refType="r" refFor="ch" refForName="picture_2"/>
+                <dgm:constr type="ctrY" for="ch" forName="textparent_2" refType="ctrY" refFor="ch" refForName="picture_2"/>
+                <dgm:constr type="primFontSz" for="des" forName="text_2" val="65"/>
+                <dgm:constr type="w" for="ch" forName="picture_3" refType="w" refFor="ch" refForName="picture_1" fact="0.3"/>
+                <dgm:constr type="h" for="ch" forName="picture_3" refType="h" refFor="ch" refForName="picture_1" fact="0.3"/>
+                <dgm:constr type="l" for="ch" forName="picture_3" refType="w" refFor="ch" refForName="picture_1" fact="1.21"/>
+                <dgm:constr type="ctrY" for="ch" forName="picture_3" refType="h" refFor="ch" refForName="picture_1" fact="0.5"/>
+                <dgm:constr type="l" for="ch" forName="line_3" refType="ctrX" refFor="ch" refForName="picture_1"/>
+                <dgm:constr type="h" for="ch" forName="line_3"/>
+                <dgm:constr type="r" for="ch" forName="line_3" refType="ctrX" refFor="ch" refForName="picture_3"/>
+                <dgm:constr type="ctrY" for="ch" forName="line_3" refType="ctrY" refFor="ch" refForName="picture_3"/>
+                <dgm:constr type="r" for="ch" forName="textparent_3" refType="w"/>
+                <dgm:constr type="h" for="ch" forName="textparent_3" refType="h" refFor="ch" refForName="picture_3"/>
+                <dgm:constr type="l" for="ch" forName="textparent_3" refType="r" refFor="ch" refForName="picture_3"/>
+                <dgm:constr type="ctrY" for="ch" forName="textparent_3" refType="ctrY" refFor="ch" refForName="picture_3"/>
+                <dgm:constr type="primFontSz" for="des" forName="text_3" refType="primFontSz" refFor="des" refForName="text_2" op="equ"/>
+                <dgm:constr type="w" for="ch" forName="picture_4" refType="w" refFor="ch" refForName="picture_1" fact="0.3"/>
+                <dgm:constr type="h" for="ch" forName="picture_4" refType="h" refFor="ch" refForName="picture_1" fact="0.3"/>
+                <dgm:constr type="l" for="ch" forName="picture_4" refType="w" refFor="ch" refForName="picture_1" fact="1.354"/>
+                <dgm:constr type="ctrY" for="ch" forName="picture_4" refType="h" refFor="ch" refForName="picture_1" fact="0.85"/>
+                <dgm:constr type="l" for="ch" forName="line_4" refType="ctrX" refFor="ch" refForName="picture_1"/>
+                <dgm:constr type="h" for="ch" forName="line_4"/>
+                <dgm:constr type="r" for="ch" forName="line_4" refType="ctrX" refFor="ch" refForName="picture_4"/>
+                <dgm:constr type="ctrY" for="ch" forName="line_4" refType="ctrY" refFor="ch" refForName="picture_4"/>
+                <dgm:constr type="r" for="ch" forName="textparent_4" refType="w"/>
+                <dgm:constr type="h" for="ch" forName="textparent_4" refType="h" refFor="ch" refForName="picture_4"/>
+                <dgm:constr type="l" for="ch" forName="textparent_4" refType="r" refFor="ch" refForName="picture_4"/>
+                <dgm:constr type="ctrY" for="ch" forName="textparent_4" refType="ctrY" refFor="ch" refForName="picture_4"/>
+                <dgm:constr type="primFontSz" for="des" forName="text_4" refType="primFontSz" refFor="des" refForName="text_2" op="equ"/>
+              </dgm:constrLst>
+            </dgm:if>
+            <dgm:else name="Name15">
+              <dgm:constrLst>
+                <dgm:constr type="h" for="ch" forName="picture_1" refType="h"/>
+                <dgm:constr type="w" for="ch" forName="picture_1" refType="h" refFor="ch" refForName="picture_1" op="equ"/>
+                <dgm:constr type="r" for="ch" forName="picture_1" refType="w"/>
+                <dgm:constr type="t" for="ch" forName="picture_1"/>
+                <dgm:constr type="w" for="ch" forName="text_1" refType="w" refFor="ch" refForName="picture_1" fact="0.64"/>
+                <dgm:constr type="h" for="ch" forName="text_1" refType="h" refFor="ch" refForName="picture_1" fact="0.33"/>
+                <dgm:constr type="l" for="ch" forName="text_1" refType="l" refFor="ch" refForName="picture_1"/>
+                <dgm:constr type="lOff" for="ch" forName="text_1" refType="w" refFor="ch" refForName="picture_1" fact="0.18"/>
+                <dgm:constr type="t" for="ch" forName="text_1" refType="h" refFor="ch" refForName="picture_1" fact="0.531"/>
+                <dgm:constr type="w" for="ch" forName="picture_2" refType="w" refFor="ch" refForName="picture_1" fact="0.3"/>
+                <dgm:constr type="h" for="ch" forName="picture_2" refType="h" refFor="ch" refForName="picture_1" fact="0.3"/>
+                <dgm:constr type="r" for="ch" forName="picture_2" refType="w"/>
+                <dgm:constr type="rOff" for="ch" forName="picture_2" refType="w" refFor="ch" refForName="picture_1" fact="-1.354"/>
+                <dgm:constr type="ctrY" for="ch" forName="picture_2" refType="h" refFor="ch" refForName="picture_1" fact="0.15"/>
+                <dgm:constr type="r" for="ch" forName="line_2" refType="ctrX" refFor="ch" refForName="picture_1"/>
+                <dgm:constr type="h" for="ch" forName="line_2"/>
+                <dgm:constr type="l" for="ch" forName="line_2" refType="ctrX" refFor="ch" refForName="picture_2"/>
+                <dgm:constr type="ctrY" for="ch" forName="line_2" refType="ctrY" refFor="ch" refForName="picture_2"/>
+                <dgm:constr type="l" for="ch" forName="textparent_2"/>
+                <dgm:constr type="h" for="ch" forName="textparent_2" refType="h" refFor="ch" refForName="picture_2"/>
+                <dgm:constr type="r" for="ch" forName="textparent_2" refType="l" refFor="ch" refForName="picture_2"/>
+                <dgm:constr type="ctrY" for="ch" forName="textparent_2" refType="ctrY" refFor="ch" refForName="picture_2"/>
+                <dgm:constr type="primFontSz" for="des" forName="text_2" val="65"/>
+                <dgm:constr type="w" for="ch" forName="picture_3" refType="w" refFor="ch" refForName="picture_1" fact="0.3"/>
+                <dgm:constr type="h" for="ch" forName="picture_3" refType="h" refFor="ch" refForName="picture_1" fact="0.3"/>
+                <dgm:constr type="r" for="ch" forName="picture_3" refType="w"/>
+                <dgm:constr type="rOff" for="ch" forName="picture_3" refType="w" refFor="ch" refForName="picture_1" fact="-1.21"/>
+                <dgm:constr type="ctrY" for="ch" forName="picture_3" refType="h" refFor="ch" refForName="picture_1" fact="0.5"/>
+                <dgm:constr type="r" for="ch" forName="line_3" refType="ctrX" refFor="ch" refForName="picture_1"/>
+                <dgm:constr type="h" for="ch" forName="line_3"/>
+                <dgm:constr type="l" for="ch" forName="line_3" refType="ctrX" refFor="ch" refForName="picture_3"/>
+                <dgm:constr type="ctrY" for="ch" forName="line_3" refType="ctrY" refFor="ch" refForName="picture_3"/>
+                <dgm:constr type="l" for="ch" forName="textparent_3"/>
+                <dgm:constr type="h" for="ch" forName="textparent_3" refType="h" refFor="ch" refForName="picture_3"/>
+                <dgm:constr type="r" for="ch" forName="textparent_3" refType="l" refFor="ch" refForName="picture_3"/>
+                <dgm:constr type="ctrY" for="ch" forName="textparent_3" refType="ctrY" refFor="ch" refForName="picture_3"/>
+                <dgm:constr type="primFontSz" for="des" forName="text_3" refType="primFontSz" refFor="des" refForName="text_2" op="equ"/>
+                <dgm:constr type="w" for="ch" forName="picture_4" refType="w" refFor="ch" refForName="picture_1" fact="0.3"/>
+                <dgm:constr type="h" for="ch" forName="picture_4" refType="h" refFor="ch" refForName="picture_1" fact="0.3"/>
+                <dgm:constr type="r" for="ch" forName="picture_4" refType="w"/>
+                <dgm:constr type="rOff" for="ch" forName="picture_4" refType="w" refFor="ch" refForName="picture_1" fact="-1.354"/>
+                <dgm:constr type="ctrY" for="ch" forName="picture_4" refType="h" refFor="ch" refForName="picture_1" fact="0.85"/>
+                <dgm:constr type="r" for="ch" forName="line_4" refType="ctrX" refFor="ch" refForName="picture_1"/>
+                <dgm:constr type="h" for="ch" forName="line_4"/>
+                <dgm:constr type="l" for="ch" forName="line_4" refType="ctrX" refFor="ch" refForName="picture_4"/>
+                <dgm:constr type="ctrY" for="ch" forName="line_4" refType="ctrY" refFor="ch" refForName="picture_4"/>
+                <dgm:constr type="l" for="ch" forName="textparent_4"/>
+                <dgm:constr type="h" for="ch" forName="textparent_4" refType="h" refFor="ch" refForName="picture_4"/>
+                <dgm:constr type="r" for="ch" forName="textparent_4" refType="l" refFor="ch" refForName="picture_4"/>
+                <dgm:constr type="ctrY" for="ch" forName="textparent_4" refType="ctrY" refFor="ch" refForName="picture_4"/>
+                <dgm:constr type="primFontSz" for="des" forName="text_4" refType="primFontSz" refFor="des" refForName="text_2" op="equ"/>
+              </dgm:constrLst>
+            </dgm:else>
+          </dgm:choose>
+        </dgm:if>
+        <dgm:if name="Name16" axis="ch" ptType="node" func="cnt" op="lte" val="5">
+          <dgm:choose name="Name17">
+            <dgm:if name="Name18" func="var" arg="dir" op="equ" val="norm">
+              <dgm:constrLst>
+                <dgm:constr type="h" for="ch" forName="picture_1" refType="h"/>
+                <dgm:constr type="w" for="ch" forName="picture_1" refType="h" refFor="ch" refForName="picture_1" op="equ"/>
+                <dgm:constr type="l" for="ch" forName="picture_1"/>
+                <dgm:constr type="t" for="ch" forName="picture_1"/>
+                <dgm:constr type="w" for="ch" forName="text_1" refType="w" refFor="ch" refForName="picture_1" fact="0.64"/>
+                <dgm:constr type="h" for="ch" forName="text_1" refType="h" refFor="ch" refForName="picture_1" fact="0.33"/>
+                <dgm:constr type="l" for="ch" forName="text_1" refType="l" refFor="ch" refForName="picture_1"/>
+                <dgm:constr type="lOff" for="ch" forName="text_1" refType="w" refFor="ch" refForName="picture_1" fact="0.18"/>
+                <dgm:constr type="t" for="ch" forName="text_1" refType="h" refFor="ch" refForName="picture_1" fact="0.531"/>
+                <dgm:constr type="w" for="ch" forName="picture_2" refType="w" refFor="ch" refForName="picture_1" fact="0.22"/>
+                <dgm:constr type="h" for="ch" forName="picture_2" refType="h" refFor="ch" refForName="picture_1" fact="0.22"/>
+                <dgm:constr type="l" for="ch" forName="picture_2" refType="w" refFor="ch" refForName="picture_1" fact="1.375"/>
+                <dgm:constr type="ctrY" for="ch" forName="picture_2" refType="h" refFor="ch" refForName="picture_1" fact="0.11"/>
+                <dgm:constr type="l" for="ch" forName="line_2" refType="ctrX" refFor="ch" refForName="picture_1"/>
+                <dgm:constr type="h" for="ch" forName="line_2"/>
+                <dgm:constr type="r" for="ch" forName="line_2" refType="ctrX" refFor="ch" refForName="picture_2"/>
+                <dgm:constr type="ctrY" for="ch" forName="line_2" refType="ctrY" refFor="ch" refForName="picture_2"/>
+                <dgm:constr type="r" for="ch" forName="textparent_2" refType="w"/>
+                <dgm:constr type="h" for="ch" forName="textparent_2" refType="h" refFor="ch" refForName="picture_2"/>
+                <dgm:constr type="l" for="ch" forName="textparent_2" refType="r" refFor="ch" refForName="picture_2"/>
+                <dgm:constr type="ctrY" for="ch" forName="textparent_2" refType="ctrY" refFor="ch" refForName="picture_2"/>
+                <dgm:constr type="primFontSz" for="des" forName="text_2" val="65"/>
+                <dgm:constr type="w" for="ch" forName="picture_3" refType="w" refFor="ch" refForName="picture_1" fact="0.22"/>
+                <dgm:constr type="h" for="ch" forName="picture_3" refType="h" refFor="ch" refForName="picture_1" fact="0.22"/>
+                <dgm:constr type="l" for="ch" forName="picture_3" refType="w" refFor="ch" refForName="picture_1" fact="1.21"/>
+                <dgm:constr type="ctrY" for="ch" forName="picture_3" refType="h" refFor="ch" refForName="picture_1" fact="0.353"/>
+                <dgm:constr type="l" for="ch" forName="line_3" refType="ctrX" refFor="ch" refForName="picture_1"/>
+                <dgm:constr type="h" for="ch" forName="line_3"/>
+                <dgm:constr type="r" for="ch" forName="line_3" refType="ctrX" refFor="ch" refForName="picture_3"/>
+                <dgm:constr type="ctrY" for="ch" forName="line_3" refType="ctrY" refFor="ch" refForName="picture_3"/>
+                <dgm:constr type="r" for="ch" forName="textparent_3" refType="w"/>
+                <dgm:constr type="h" for="ch" forName="textparent_3" refType="h" refFor="ch" refForName="picture_3"/>
+                <dgm:constr type="l" for="ch" forName="textparent_3" refType="r" refFor="ch" refForName="picture_3"/>
+                <dgm:constr type="ctrY" for="ch" forName="textparent_3" refType="ctrY" refFor="ch" refForName="picture_3"/>
+                <dgm:constr type="primFontSz" for="des" forName="text_3" refType="primFontSz" refFor="des" refForName="text_2" op="equ"/>
+                <dgm:constr type="w" for="ch" forName="picture_4" refType="w" refFor="ch" refForName="picture_1" fact="0.22"/>
+                <dgm:constr type="h" for="ch" forName="picture_4" refType="h" refFor="ch" refForName="picture_1" fact="0.22"/>
+                <dgm:constr type="l" for="ch" forName="picture_4" refType="w" refFor="ch" refForName="picture_1" fact="1.21"/>
+                <dgm:constr type="ctrY" for="ch" forName="picture_4" refType="h" refFor="ch" refForName="picture_1" fact="0.647"/>
+                <dgm:constr type="l" for="ch" forName="line_4" refType="ctrX" refFor="ch" refForName="picture_1"/>
+                <dgm:constr type="h" for="ch" forName="line_4"/>
+                <dgm:constr type="r" for="ch" forName="line_4" refType="ctrX" refFor="ch" refForName="picture_4"/>
+                <dgm:constr type="ctrY" for="ch" forName="line_4" refType="ctrY" refFor="ch" refForName="picture_4"/>
+                <dgm:constr type="r" for="ch" forName="textparent_4" refType="w"/>
+                <dgm:constr type="h" for="ch" forName="textparent_4" refType="h" refFor="ch" refForName="picture_4"/>
+                <dgm:constr type="l" for="ch" forName="textparent_4" refType="r" refFor="ch" refForName="picture_4"/>
+                <dgm:constr type="ctrY" for="ch" forName="textparent_4" refType="ctrY" refFor="ch" refForName="picture_4"/>
+                <dgm:constr type="primFontSz" for="des" forName="text_4" refType="primFontSz" refFor="des" refForName="text_2" op="equ"/>
+                <dgm:constr type="w" for="ch" forName="picture_5" refType="w" refFor="ch" refForName="picture_1" fact="0.22"/>
+                <dgm:constr type="h" for="ch" forName="picture_5" refType="h" refFor="ch" refForName="picture_1" fact="0.22"/>
+                <dgm:constr type="l" for="ch" forName="picture_5" refType="w" refFor="ch" refForName="picture_1" fact="1.375"/>
+                <dgm:constr type="ctrY" for="ch" forName="picture_5" refType="h" refFor="ch" refForName="picture_1" fact="0.89"/>
+                <dgm:constr type="l" for="ch" forName="line_5" refType="ctrX" refFor="ch" refForName="picture_1"/>
+                <dgm:constr type="h" for="ch" forName="line_5"/>
+                <dgm:constr type="r" for="ch" forName="line_5" refType="ctrX" refFor="ch" refForName="picture_5"/>
+                <dgm:constr type="ctrY" for="ch" forName="line_5" refType="ctrY" refFor="ch" refForName="picture_5"/>
+                <dgm:constr type="r" for="ch" forName="textparent_5" refType="w"/>
+                <dgm:constr type="h" for="ch" forName="textparent_5" refType="h" refFor="ch" refForName="picture_5"/>
+                <dgm:constr type="l" for="ch" forName="textparent_5" refType="r" refFor="ch" refForName="picture_5"/>
+                <dgm:constr type="ctrY" for="ch" forName="textparent_5" refType="ctrY" refFor="ch" refForName="picture_5"/>
+                <dgm:constr type="primFontSz" for="des" forName="text_5" refType="primFontSz" refFor="des" refForName="text_2" op="equ"/>
+              </dgm:constrLst>
+            </dgm:if>
+            <dgm:else name="Name19">
+              <dgm:constrLst>
+                <dgm:constr type="h" for="ch" forName="picture_1" refType="h"/>
+                <dgm:constr type="w" for="ch" forName="picture_1" refType="h" refFor="ch" refForName="picture_1" op="equ"/>
+                <dgm:constr type="r" for="ch" forName="picture_1" refType="w"/>
+                <dgm:constr type="t" for="ch" forName="picture_1"/>
+                <dgm:constr type="w" for="ch" forName="text_1" refType="w" refFor="ch" refForName="picture_1" fact="0.64"/>
+                <dgm:constr type="h" for="ch" forName="text_1" refType="h" refFor="ch" refForName="picture_1" fact="0.33"/>
+                <dgm:constr type="l" for="ch" forName="text_1" refType="l" refFor="ch" refForName="picture_1"/>
+                <dgm:constr type="lOff" for="ch" forName="text_1" refType="w" refFor="ch" refForName="picture_1" fact="0.18"/>
+                <dgm:constr type="t" for="ch" forName="text_1" refType="h" refFor="ch" refForName="picture_1" fact="0.531"/>
+                <dgm:constr type="w" for="ch" forName="picture_2" refType="w" refFor="ch" refForName="picture_1" fact="0.22"/>
+                <dgm:constr type="h" for="ch" forName="picture_2" refType="h" refFor="ch" refForName="picture_1" fact="0.22"/>
+                <dgm:constr type="r" for="ch" forName="picture_2" refType="w"/>
+                <dgm:constr type="rOff" for="ch" forName="picture_2" refType="w" refFor="ch" refForName="picture_1" fact="-1.375"/>
+                <dgm:constr type="ctrY" for="ch" forName="picture_2" refType="h" refFor="ch" refForName="picture_1" fact="0.11"/>
+                <dgm:constr type="r" for="ch" forName="line_2" refType="ctrX" refFor="ch" refForName="picture_1"/>
+                <dgm:constr type="h" for="ch" forName="line_2"/>
+                <dgm:constr type="l" for="ch" forName="line_2" refType="ctrX" refFor="ch" refForName="picture_2"/>
+                <dgm:constr type="ctrY" for="ch" forName="line_2" refType="ctrY" refFor="ch" refForName="picture_2"/>
+                <dgm:constr type="l" for="ch" forName="textparent_2"/>
+                <dgm:constr type="h" for="ch" forName="textparent_2" refType="h" refFor="ch" refForName="picture_2"/>
+                <dgm:constr type="r" for="ch" forName="textparent_2" refType="l" refFor="ch" refForName="picture_2"/>
+                <dgm:constr type="ctrY" for="ch" forName="textparent_2" refType="ctrY" refFor="ch" refForName="picture_2"/>
+                <dgm:constr type="primFontSz" for="des" forName="text_2" val="65"/>
+                <dgm:constr type="w" for="ch" forName="picture_3" refType="w" refFor="ch" refForName="picture_1" fact="0.22"/>
+                <dgm:constr type="h" for="ch" forName="picture_3" refType="h" refFor="ch" refForName="picture_1" fact="0.22"/>
+                <dgm:constr type="r" for="ch" forName="picture_3" refType="w"/>
+                <dgm:constr type="rOff" for="ch" forName="picture_3" refType="w" refFor="ch" refForName="picture_1" fact="-1.21"/>
+                <dgm:constr type="ctrY" for="ch" forName="picture_3" refType="h" refFor="ch" refForName="picture_1" fact="0.353"/>
+                <dgm:constr type="r" for="ch" forName="line_3" refType="ctrX" refFor="ch" refForName="picture_1"/>
+                <dgm:constr type="h" for="ch" forName="line_3"/>
+                <dgm:constr type="l" for="ch" forName="line_3" refType="ctrX" refFor="ch" refForName="picture_3"/>
+                <dgm:constr type="ctrY" for="ch" forName="line_3" refType="ctrY" refFor="ch" refForName="picture_3"/>
+                <dgm:constr type="l" for="ch" forName="textparent_3"/>
+                <dgm:constr type="h" for="ch" forName="textparent_3" refType="h" refFor="ch" refForName="picture_3"/>
+                <dgm:constr type="r" for="ch" forName="textparent_3" refType="l" refFor="ch" refForName="picture_3"/>
+                <dgm:constr type="ctrY" for="ch" forName="textparent_3" refType="ctrY" refFor="ch" refForName="picture_3"/>
+                <dgm:constr type="primFontSz" for="des" forName="text_3" refType="primFontSz" refFor="des" refForName="text_2" op="equ"/>
+                <dgm:constr type="w" for="ch" forName="picture_4" refType="w" refFor="ch" refForName="picture_1" fact="0.22"/>
+                <dgm:constr type="h" for="ch" forName="picture_4" refType="h" refFor="ch" refForName="picture_1" fact="0.22"/>
+                <dgm:constr type="r" for="ch" forName="picture_4" refType="w"/>
+                <dgm:constr type="rOff" for="ch" forName="picture_4" refType="w" refFor="ch" refForName="picture_1" fact="-1.21"/>
+                <dgm:constr type="ctrY" for="ch" forName="picture_4" refType="h" refFor="ch" refForName="picture_1" fact="0.647"/>
+                <dgm:constr type="r" for="ch" forName="line_4" refType="ctrX" refFor="ch" refForName="picture_1"/>
+                <dgm:constr type="h" for="ch" forName="line_4"/>
+                <dgm:constr type="l" for="ch" forName="line_4" refType="ctrX" refFor="ch" refForName="picture_4"/>
+                <dgm:constr type="ctrY" for="ch" forName="line_4" refType="ctrY" refFor="ch" refForName="picture_4"/>
+                <dgm:constr type="l" for="ch" forName="textparent_4"/>
+                <dgm:constr type="h" for="ch" forName="textparent_4" refType="h" refFor="ch" refForName="picture_4"/>
+                <dgm:constr type="r" for="ch" forName="textparent_4" refType="l" refFor="ch" refForName="picture_4"/>
+                <dgm:constr type="ctrY" for="ch" forName="textparent_4" refType="ctrY" refFor="ch" refForName="picture_4"/>
+                <dgm:constr type="primFontSz" for="des" forName="text_4" refType="primFontSz" refFor="des" refForName="text_2" op="equ"/>
+                <dgm:constr type="w" for="ch" forName="picture_5" refType="w" refFor="ch" refForName="picture_1" fact="0.22"/>
+                <dgm:constr type="h" for="ch" forName="picture_5" refType="h" refFor="ch" refForName="picture_1" fact="0.22"/>
+                <dgm:constr type="r" for="ch" forName="picture_5" refType="w"/>
+                <dgm:constr type="rOff" for="ch" forName="picture_5" refType="w" refFor="ch" refForName="picture_1" fact="-1.375"/>
+                <dgm:constr type="ctrY" for="ch" forName="picture_5" refType="h" refFor="ch" refForName="picture_1" fact="0.89"/>
+                <dgm:constr type="r" for="ch" forName="line_5" refType="ctrX" refFor="ch" refForName="picture_1"/>
+                <dgm:constr type="h" for="ch" forName="line_5"/>
+                <dgm:constr type="l" for="ch" forName="line_5" refType="ctrX" refFor="ch" refForName="picture_5"/>
+                <dgm:constr type="ctrY" for="ch" forName="line_5" refType="ctrY" refFor="ch" refForName="picture_5"/>
+                <dgm:constr type="l" for="ch" forName="textparent_5"/>
+                <dgm:constr type="h" for="ch" forName="textparent_5" refType="h" refFor="ch" refForName="picture_5"/>
+                <dgm:constr type="r" for="ch" forName="textparent_5" refType="l" refFor="ch" refForName="picture_5"/>
+                <dgm:constr type="ctrY" for="ch" forName="textparent_5" refType="ctrY" refFor="ch" refForName="picture_5"/>
+                <dgm:constr type="primFontSz" for="des" forName="text_5" refType="primFontSz" refFor="des" refForName="text_2" op="equ"/>
+              </dgm:constrLst>
+            </dgm:else>
+          </dgm:choose>
+        </dgm:if>
+        <dgm:if name="Name20" axis="ch" ptType="node" func="cnt" op="lte" val="6">
+          <dgm:choose name="Name21">
+            <dgm:if name="Name22" func="var" arg="dir" op="equ" val="norm">
+              <dgm:constrLst>
+                <dgm:constr type="h" for="ch" forName="picture_1" refType="h"/>
+                <dgm:constr type="w" for="ch" forName="picture_1" refType="h" refFor="ch" refForName="picture_1" op="equ"/>
+                <dgm:constr type="l" for="ch" forName="picture_1"/>
+                <dgm:constr type="t" for="ch" forName="picture_1"/>
+                <dgm:constr type="w" for="ch" forName="text_1" refType="w" refFor="ch" refForName="picture_1" fact="0.64"/>
+                <dgm:constr type="h" for="ch" forName="text_1" refType="h" refFor="ch" refForName="picture_1" fact="0.33"/>
+                <dgm:constr type="l" for="ch" forName="text_1" refType="l" refFor="ch" refForName="picture_1"/>
+                <dgm:constr type="lOff" for="ch" forName="text_1" refType="w" refFor="ch" refForName="picture_1" fact="0.18"/>
+                <dgm:constr type="t" for="ch" forName="text_1" refType="h" refFor="ch" refForName="picture_1" fact="0.531"/>
+                <dgm:constr type="w" for="ch" forName="picture_2" refType="w" refFor="ch" refForName="picture_1" fact="0.18"/>
+                <dgm:constr type="h" for="ch" forName="picture_2" refType="h" refFor="ch" refForName="picture_1" fact="0.18"/>
+                <dgm:constr type="l" for="ch" forName="picture_2" refType="w" refFor="ch" refForName="picture_1" fact="1.4238"/>
+                <dgm:constr type="ctrY" for="ch" forName="picture_2" refType="h" refFor="ch" refForName="picture_1" fact="0.09"/>
+                <dgm:constr type="l" for="ch" forName="line_2" refType="ctrX" refFor="ch" refForName="picture_1"/>
+                <dgm:constr type="h" for="ch" forName="line_2"/>
+                <dgm:constr type="r" for="ch" forName="line_2" refType="ctrX" refFor="ch" refForName="picture_2"/>
+                <dgm:constr type="ctrY" for="ch" forName="line_2" refType="ctrY" refFor="ch" refForName="picture_2"/>
+                <dgm:constr type="r" for="ch" forName="textparent_2" refType="w"/>
+                <dgm:constr type="h" for="ch" forName="textparent_2" refType="h" refFor="ch" refForName="picture_2"/>
+                <dgm:constr type="l" for="ch" forName="textparent_2" refType="r" refFor="ch" refForName="picture_2"/>
+                <dgm:constr type="ctrY" for="ch" forName="textparent_2" refType="ctrY" refFor="ch" refForName="picture_2"/>
+                <dgm:constr type="primFontSz" for="des" forName="text_2" val="65"/>
+                <dgm:constr type="w" for="ch" forName="picture_3" refType="w" refFor="ch" refForName="picture_1" fact="0.18"/>
+                <dgm:constr type="h" for="ch" forName="picture_3" refType="h" refFor="ch" refForName="picture_1" fact="0.18"/>
+                <dgm:constr type="l" for="ch" forName="picture_3" refType="w" refFor="ch" refForName="picture_1" fact="1.2667"/>
+                <dgm:constr type="ctrY" for="ch" forName="picture_3" refType="h" refFor="ch" refForName="picture_1" fact="0.261"/>
+                <dgm:constr type="l" for="ch" forName="line_3" refType="ctrX" refFor="ch" refForName="picture_1"/>
+                <dgm:constr type="h" for="ch" forName="line_3"/>
+                <dgm:constr type="r" for="ch" forName="line_3" refType="ctrX" refFor="ch" refForName="picture_3"/>
+                <dgm:constr type="ctrY" for="ch" forName="line_3" refType="ctrY" refFor="ch" refForName="picture_3"/>
+                <dgm:constr type="r" for="ch" forName="textparent_3" refType="w"/>
+                <dgm:constr type="h" for="ch" forName="textparent_3" refType="h" refFor="ch" refForName="picture_3"/>
+                <dgm:constr type="l" for="ch" forName="textparent_3" refType="r" refFor="ch" refForName="picture_3"/>
+                <dgm:constr type="ctrY" for="ch" forName="textparent_3" refType="ctrY" refFor="ch" refForName="picture_3"/>
+                <dgm:constr type="primFontSz" for="des" forName="text_3" refType="primFontSz" refFor="des" refForName="text_2" op="equ"/>
+                <dgm:constr type="w" for="ch" forName="picture_4" refType="w" refFor="ch" refForName="picture_1" fact="0.18"/>
+                <dgm:constr type="h" for="ch" forName="picture_4" refType="h" refFor="ch" refForName="picture_1" fact="0.18"/>
+                <dgm:constr type="l" for="ch" forName="picture_4" refType="w" refFor="ch" refForName="picture_1" fact="1.21"/>
+                <dgm:constr type="ctrY" for="ch" forName="picture_4" refType="h" refFor="ch" refForName="picture_1" fact="0.5"/>
+                <dgm:constr type="l" for="ch" forName="line_4" refType="ctrX" refFor="ch" refForName="picture_1"/>
+                <dgm:constr type="h" for="ch" forName="line_4"/>
+                <dgm:constr type="r" for="ch" forName="line_4" refType="ctrX" refFor="ch" refForName="picture_4"/>
+                <dgm:constr type="ctrY" for="ch" forName="line_4" refType="ctrY" refFor="ch" refForName="picture_4"/>
+                <dgm:constr type="r" for="ch" forName="textparent_4" refType="w"/>
+                <dgm:constr type="h" for="ch" forName="textparent_4" refType="h" refFor="ch" refForName="picture_4"/>
+                <dgm:constr type="l" for="ch" forName="textparent_4" refType="r" refFor="ch" refForName="picture_4"/>
+                <dgm:constr type="ctrY" for="ch" forName="textparent_4" refType="ctrY" refFor="ch" refForName="picture_4"/>
+                <dgm:constr type="primFontSz" for="des" forName="text_4" refType="primFontSz" refFor="des" refForName="text_2" op="equ"/>
+                <dgm:constr type="w" for="ch" forName="picture_5" refType="w" refFor="ch" refForName="picture_1" fact="0.18"/>
+                <dgm:constr type="h" for="ch" forName="picture_5" refType="h" refFor="ch" refForName="picture_1" fact="0.18"/>
+                <dgm:constr type="l" for="ch" forName="picture_5" refType="w" refFor="ch" refForName="picture_1" fact="1.2667"/>
+                <dgm:constr type="ctrY" for="ch" forName="picture_5" refType="h" refFor="ch" refForName="picture_1" fact="0.739"/>
+                <dgm:constr type="l" for="ch" forName="line_5" refType="ctrX" refFor="ch" refForName="picture_1"/>
+                <dgm:constr type="h" for="ch" forName="line_5"/>
+                <dgm:constr type="r" for="ch" forName="line_5" refType="ctrX" refFor="ch" refForName="picture_5"/>
+                <dgm:constr type="ctrY" for="ch" forName="line_5" refType="ctrY" refFor="ch" refForName="picture_5"/>
+                <dgm:constr type="r" for="ch" forName="textparent_5" refType="w"/>
+                <dgm:constr type="h" for="ch" forName="textparent_5" refType="h" refFor="ch" refForName="picture_5"/>
+                <dgm:constr type="l" for="ch" forName="textparent_5" refType="r" refFor="ch" refForName="picture_5"/>
+                <dgm:constr type="ctrY" for="ch" forName="textparent_5" refType="ctrY" refFor="ch" refForName="picture_5"/>
+                <dgm:constr type="primFontSz" for="des" forName="text_5" refType="primFontSz" refFor="des" refForName="text_2" op="equ"/>
+                <dgm:constr type="w" for="ch" forName="picture_6" refType="w" refFor="ch" refForName="picture_1" fact="0.18"/>
+                <dgm:constr type="h" for="ch" forName="picture_6" refType="h" refFor="ch" refForName="picture_1" fact="0.18"/>
+                <dgm:constr type="l" for="ch" forName="picture_6" refType="w" refFor="ch" refForName="picture_1" fact="1.4238"/>
+                <dgm:constr type="ctrY" for="ch" forName="picture_6" refType="h" refFor="ch" refForName="picture_1" fact="0.91"/>
+                <dgm:constr type="l" for="ch" forName="line_6" refType="ctrX" refFor="ch" refForName="picture_1"/>
+                <dgm:constr type="h" for="ch" forName="line_6"/>
+                <dgm:constr type="r" for="ch" forName="line_6" refType="ctrX" refFor="ch" refForName="picture_6"/>
+                <dgm:constr type="ctrY" for="ch" forName="line_6" refType="ctrY" refFor="ch" refForName="picture_6"/>
+                <dgm:constr type="r" for="ch" forName="textparent_6" refType="w"/>
+                <dgm:constr type="h" for="ch" forName="textparent_6" refType="h" refFor="ch" refForName="picture_6"/>
+                <dgm:constr type="l" for="ch" forName="textparent_6" refType="r" refFor="ch" refForName="picture_6"/>
+                <dgm:constr type="ctrY" for="ch" forName="textparent_6" refType="ctrY" refFor="ch" refForName="picture_6"/>
+                <dgm:constr type="primFontSz" for="des" forName="text_6" refType="primFontSz" refFor="des" refForName="text_2" op="equ"/>
+              </dgm:constrLst>
+            </dgm:if>
+            <dgm:else name="Name23">
+              <dgm:constrLst>
+                <dgm:constr type="h" for="ch" forName="picture_1" refType="h"/>
+                <dgm:constr type="w" for="ch" forName="picture_1" refType="h" refFor="ch" refForName="picture_1" op="equ"/>
+                <dgm:constr type="r" for="ch" forName="picture_1" refType="w"/>
+                <dgm:constr type="t" for="ch" forName="picture_1"/>
+                <dgm:constr type="w" for="ch" forName="text_1" refType="w" refFor="ch" refForName="picture_1" fact="0.64"/>
+                <dgm:constr type="h" for="ch" forName="text_1" refType="h" refFor="ch" refForName="picture_1" fact="0.33"/>
+                <dgm:constr type="l" for="ch" forName="text_1" refType="l" refFor="ch" refForName="picture_1"/>
+                <dgm:constr type="lOff" for="ch" forName="text_1" refType="w" refFor="ch" refForName="picture_1" fact="0.18"/>
+                <dgm:constr type="t" for="ch" forName="text_1" refType="h" refFor="ch" refForName="picture_1" fact="0.531"/>
+                <dgm:constr type="w" for="ch" forName="picture_2" refType="w" refFor="ch" refForName="picture_1" fact="0.18"/>
+                <dgm:constr type="h" for="ch" forName="picture_2" refType="h" refFor="ch" refForName="picture_1" fact="0.18"/>
+                <dgm:constr type="r" for="ch" forName="picture_2" refType="w"/>
+                <dgm:constr type="rOff" for="ch" forName="picture_2" refType="w" refFor="ch" refForName="picture_1" fact="-1.4238"/>
+                <dgm:constr type="ctrY" for="ch" forName="picture_2" refType="h" refFor="ch" refForName="picture_1" fact="0.09"/>
+                <dgm:constr type="r" for="ch" forName="line_2" refType="ctrX" refFor="ch" refForName="picture_1"/>
+                <dgm:constr type="h" for="ch" forName="line_2"/>
+                <dgm:constr type="l" for="ch" forName="line_2" refType="ctrX" refFor="ch" refForName="picture_2"/>
+                <dgm:constr type="ctrY" for="ch" forName="line_2" refType="ctrY" refFor="ch" refForName="picture_2"/>
+                <dgm:constr type="l" for="ch" forName="textparent_2"/>
+                <dgm:constr type="h" for="ch" forName="textparent_2" refType="h" refFor="ch" refForName="picture_2"/>
+                <dgm:constr type="r" for="ch" forName="textparent_2" refType="l" refFor="ch" refForName="picture_2"/>
+                <dgm:constr type="ctrY" for="ch" forName="textparent_2" refType="ctrY" refFor="ch" refForName="picture_2"/>
+                <dgm:constr type="primFontSz" for="des" forName="text_2" val="65"/>
+                <dgm:constr type="w" for="ch" forName="picture_3" refType="w" refFor="ch" refForName="picture_1" fact="0.18"/>
+                <dgm:constr type="h" for="ch" forName="picture_3" refType="h" refFor="ch" refForName="picture_1" fact="0.18"/>
+                <dgm:constr type="r" for="ch" forName="picture_3" refType="w"/>
+                <dgm:constr type="rOff" for="ch" forName="picture_3" refType="w" refFor="ch" refForName="picture_1" fact="-1.2667"/>
+                <dgm:constr type="ctrY" for="ch" forName="picture_3" refType="h" refFor="ch" refForName="picture_1" fact="0.261"/>
+                <dgm:constr type="r" for="ch" forName="line_3" refType="ctrX" refFor="ch" refForName="picture_1"/>
+                <dgm:constr type="h" for="ch" forName="line_3"/>
+                <dgm:constr type="l" for="ch" forName="line_3" refType="ctrX" refFor="ch" refForName="picture_3"/>
+                <dgm:constr type="ctrY" for="ch" forName="line_3" refType="ctrY" refFor="ch" refForName="picture_3"/>
+                <dgm:constr type="l" for="ch" forName="textparent_3"/>
+                <dgm:constr type="h" for="ch" forName="textparent_3" refType="h" refFor="ch" refForName="picture_3"/>
+                <dgm:constr type="r" for="ch" forName="textparent_3" refType="l" refFor="ch" refForName="picture_3"/>
+                <dgm:constr type="ctrY" for="ch" forName="textparent_3" refType="ctrY" refFor="ch" refForName="picture_3"/>
+                <dgm:constr type="primFontSz" for="des" forName="text_3" refType="primFontSz" refFor="des" refForName="text_2" op="equ"/>
+                <dgm:constr type="w" for="ch" forName="picture_4" refType="w" refFor="ch" refForName="picture_1" fact="0.18"/>
+                <dgm:constr type="h" for="ch" forName="picture_4" refType="h" refFor="ch" refForName="picture_1" fact="0.18"/>
+                <dgm:constr type="r" for="ch" forName="picture_4" refType="w"/>
+                <dgm:constr type="rOff" for="ch" forName="picture_4" refType="w" refFor="ch" refForName="picture_1" fact="-1.21"/>
+                <dgm:constr type="ctrY" for="ch" forName="picture_4" refType="h" refFor="ch" refForName="picture_1" fact="0.5"/>
+                <dgm:constr type="r" for="ch" forName="line_4" refType="ctrX" refFor="ch" refForName="picture_1"/>
+                <dgm:constr type="h" for="ch" forName="line_4"/>
+                <dgm:constr type="l" for="ch" forName="line_4" refType="ctrX" refFor="ch" refForName="picture_4"/>
+                <dgm:constr type="ctrY" for="ch" forName="line_4" refType="ctrY" refFor="ch" refForName="picture_4"/>
+                <dgm:constr type="l" for="ch" forName="textparent_4"/>
+                <dgm:constr type="h" for="ch" forName="textparent_4" refType="h" refFor="ch" refForName="picture_4"/>
+                <dgm:constr type="r" for="ch" forName="textparent_4" refType="l" refFor="ch" refForName="picture_4"/>
+                <dgm:constr type="ctrY" for="ch" forName="textparent_4" refType="ctrY" refFor="ch" refForName="picture_4"/>
+                <dgm:constr type="primFontSz" for="des" forName="text_4" refType="primFontSz" refFor="des" refForName="text_2" op="equ"/>
+                <dgm:constr type="w" for="ch" forName="picture_5" refType="w" refFor="ch" refForName="picture_1" fact="0.18"/>
+                <dgm:constr type="h" for="ch" forName="picture_5" refType="h" refFor="ch" refForName="picture_1" fact="0.18"/>
+                <dgm:constr type="r" for="ch" forName="picture_5" refType="w"/>
+                <dgm:constr type="rOff" for="ch" forName="picture_5" refType="w" refFor="ch" refForName="picture_1" fact="-1.2667"/>
+                <dgm:constr type="ctrY" for="ch" forName="picture_5" refType="h" refFor="ch" refForName="picture_1" fact="0.739"/>
+                <dgm:constr type="r" for="ch" forName="line_5" refType="ctrX" refFor="ch" refForName="picture_1"/>
+                <dgm:constr type="h" for="ch" forName="line_5"/>
+                <dgm:constr type="l" for="ch" forName="line_5" refType="ctrX" refFor="ch" refForName="picture_5"/>
+                <dgm:constr type="ctrY" for="ch" forName="line_5" refType="ctrY" refFor="ch" refForName="picture_5"/>
+                <dgm:constr type="l" for="ch" forName="textparent_5"/>
+                <dgm:constr type="h" for="ch" forName="textparent_5" refType="h" refFor="ch" refForName="picture_5"/>
+                <dgm:constr type="r" for="ch" forName="textparent_5" refType="l" refFor="ch" refForName="picture_5"/>
+                <dgm:constr type="ctrY" for="ch" forName="textparent_5" refType="ctrY" refFor="ch" refForName="picture_5"/>
+                <dgm:constr type="primFontSz" for="des" forName="text_5" refType="primFontSz" refFor="des" refForName="text_2" op="equ"/>
+                <dgm:constr type="w" for="ch" forName="picture_6" refType="w" refFor="ch" refForName="picture_1" fact="0.18"/>
+                <dgm:constr type="h" for="ch" forName="picture_6" refType="h" refFor="ch" refForName="picture_1" fact="0.18"/>
+                <dgm:constr type="r" for="ch" forName="picture_6" refType="w"/>
+                <dgm:constr type="rOff" for="ch" forName="picture_6" refType="w" refFor="ch" refForName="picture_1" fact="-1.4238"/>
+                <dgm:constr type="ctrY" for="ch" forName="picture_6" refType="h" refFor="ch" refForName="picture_1" fact="0.91"/>
+                <dgm:constr type="r" for="ch" forName="line_6" refType="ctrX" refFor="ch" refForName="picture_1"/>
+                <dgm:constr type="h" for="ch" forName="line_6"/>
+                <dgm:constr type="l" for="ch" forName="line_6" refType="ctrX" refFor="ch" refForName="picture_6"/>
+                <dgm:constr type="ctrY" for="ch" forName="line_6" refType="ctrY" refFor="ch" refForName="picture_6"/>
+                <dgm:constr type="l" for="ch" forName="textparent_6"/>
+                <dgm:constr type="h" for="ch" forName="textparent_6" refType="h" refFor="ch" refForName="picture_6"/>
+                <dgm:constr type="r" for="ch" forName="textparent_6" refType="l" refFor="ch" refForName="picture_6"/>
+                <dgm:constr type="ctrY" for="ch" forName="textparent_6" refType="ctrY" refFor="ch" refForName="picture_6"/>
+                <dgm:constr type="primFontSz" for="des" forName="text_6" refType="primFontSz" refFor="des" refForName="text_2" op="equ"/>
+              </dgm:constrLst>
+            </dgm:else>
+          </dgm:choose>
+        </dgm:if>
+        <dgm:else name="Name24">
+          <dgm:choose name="Name25">
+            <dgm:if name="Name26" func="var" arg="dir" op="equ" val="norm">
+              <dgm:constrLst>
+                <dgm:constr type="h" for="ch" forName="picture_1" refType="h"/>
+                <dgm:constr type="w" for="ch" forName="picture_1" refType="h" refFor="ch" refForName="picture_1" op="equ"/>
+                <dgm:constr type="l" for="ch" forName="picture_1"/>
+                <dgm:constr type="t" for="ch" forName="picture_1"/>
+                <dgm:constr type="w" for="ch" forName="text_1" refType="w" refFor="ch" refForName="picture_1" fact="0.64"/>
+                <dgm:constr type="h" for="ch" forName="text_1" refType="h" refFor="ch" refForName="picture_1" fact="0.33"/>
+                <dgm:constr type="l" for="ch" forName="text_1" refType="l" refFor="ch" refForName="picture_1"/>
+                <dgm:constr type="lOff" for="ch" forName="text_1" refType="w" refFor="ch" refForName="picture_1" fact="0.18"/>
+                <dgm:constr type="t" for="ch" forName="text_1" refType="h" refFor="ch" refForName="picture_1" fact="0.531"/>
+                <dgm:constr type="w" for="ch" forName="picture_2" refType="w" refFor="ch" refForName="picture_1" fact="0.15"/>
+                <dgm:constr type="h" for="ch" forName="picture_2" refType="h" refFor="ch" refForName="picture_1" fact="0.15"/>
+                <dgm:constr type="l" for="ch" forName="picture_2" refType="w" refFor="ch" refForName="picture_1" fact="1.4363"/>
+                <dgm:constr type="ctrY" for="ch" forName="picture_2" refType="h" refFor="ch" refForName="picture_1" fact="0.075"/>
+                <dgm:constr type="l" for="ch" forName="line_2" refType="ctrX" refFor="ch" refForName="picture_1"/>
+                <dgm:constr type="h" for="ch" forName="line_2"/>
+                <dgm:constr type="r" for="ch" forName="line_2" refType="ctrX" refFor="ch" refForName="picture_2"/>
+                <dgm:constr type="ctrY" for="ch" forName="line_2" refType="ctrY" refFor="ch" refForName="picture_2"/>
+                <dgm:constr type="r" for="ch" forName="textparent_2" refType="w"/>
+                <dgm:constr type="h" for="ch" forName="textparent_2" refType="h" refFor="ch" refForName="picture_2"/>
+                <dgm:constr type="l" for="ch" forName="textparent_2" refType="r" refFor="ch" refForName="picture_2"/>
+                <dgm:constr type="ctrY" for="ch" forName="textparent_2" refType="ctrY" refFor="ch" refForName="picture_2"/>
+                <dgm:constr type="primFontSz" for="des" forName="text_2" val="65"/>
+                <dgm:constr type="w" for="ch" forName="picture_3" refType="w" refFor="ch" refForName="picture_1" fact="0.15"/>
+                <dgm:constr type="h" for="ch" forName="picture_3" refType="h" refFor="ch" refForName="picture_1" fact="0.15"/>
+                <dgm:constr type="l" for="ch" forName="picture_3" refType="w" refFor="ch" refForName="picture_1" fact="1.2898"/>
+                <dgm:constr type="ctrY" for="ch" forName="picture_3" refType="h" refFor="ch" refForName="picture_1" fact="0.227"/>
+                <dgm:constr type="l" for="ch" forName="line_3" refType="ctrX" refFor="ch" refForName="picture_1"/>
+                <dgm:constr type="h" for="ch" forName="line_3"/>
+                <dgm:constr type="r" for="ch" forName="line_3" refType="ctrX" refFor="ch" refForName="picture_3"/>
+                <dgm:constr type="ctrY" for="ch" forName="line_3" refType="ctrY" refFor="ch" refForName="picture_3"/>
+                <dgm:constr type="r" for="ch" forName="textparent_3" refType="w"/>
+                <dgm:constr type="h" for="ch" forName="textparent_3" refType="h" refFor="ch" refForName="picture_3"/>
+                <dgm:constr type="l" for="ch" forName="textparent_3" refType="r" refFor="ch" refForName="picture_3"/>
+                <dgm:constr type="ctrY" for="ch" forName="textparent_3" refType="ctrY" refFor="ch" refForName="picture_3"/>
+                <dgm:constr type="primFontSz" for="des" forName="text_3" refType="primFontSz" refFor="des" refForName="text_2" op="equ"/>
+                <dgm:constr type="w" for="ch" forName="picture_4" refType="w" refFor="ch" refForName="picture_1" fact="0.15"/>
+                <dgm:constr type="h" for="ch" forName="picture_4" refType="h" refFor="ch" refForName="picture_1" fact="0.15"/>
+                <dgm:constr type="l" for="ch" forName="picture_4" refType="w" refFor="ch" refForName="picture_1" fact="1.21"/>
+                <dgm:constr type="ctrY" for="ch" forName="picture_4" refType="h" refFor="ch" refForName="picture_1" fact="0.405"/>
+                <dgm:constr type="l" for="ch" forName="line_4" refType="ctrX" refFor="ch" refForName="picture_1"/>
+                <dgm:constr type="h" for="ch" forName="line_4"/>
+                <dgm:constr type="r" for="ch" forName="line_4" refType="ctrX" refFor="ch" refForName="picture_4"/>
+                <dgm:constr type="ctrY" for="ch" forName="line_4" refType="ctrY" refFor="ch" refForName="picture_4"/>
+                <dgm:constr type="r" for="ch" forName="textparent_4" refType="w"/>
+                <dgm:constr type="h" for="ch" forName="textparent_4" refType="h" refFor="ch" refForName="picture_4"/>
+                <dgm:constr type="l" for="ch" forName="textparent_4" refType="r" refFor="ch" refForName="picture_4"/>
+                <dgm:constr type="ctrY" for="ch" forName="textparent_4" refType="ctrY" refFor="ch" refForName="picture_4"/>
+                <dgm:constr type="primFontSz" for="des" forName="text_4" refType="primFontSz" refFor="des" refForName="text_2" op="equ"/>
+                <dgm:constr type="w" for="ch" forName="picture_5" refType="w" refFor="ch" refForName="picture_1" fact="0.15"/>
+                <dgm:constr type="h" for="ch" forName="picture_5" refType="h" refFor="ch" refForName="picture_1" fact="0.15"/>
+                <dgm:constr type="l" for="ch" forName="picture_5" refType="w" refFor="ch" refForName="picture_1" fact="1.21"/>
+                <dgm:constr type="ctrY" for="ch" forName="picture_5" refType="h" refFor="ch" refForName="picture_1" fact="0.595"/>
+                <dgm:constr type="l" for="ch" forName="line_5" refType="ctrX" refFor="ch" refForName="picture_1"/>
+                <dgm:constr type="h" for="ch" forName="line_5"/>
+                <dgm:constr type="r" for="ch" forName="line_5" refType="ctrX" refFor="ch" refForName="picture_5"/>
+                <dgm:constr type="ctrY" for="ch" forName="line_5" refType="ctrY" refFor="ch" refForName="picture_5"/>
+                <dgm:constr type="r" for="ch" forName="textparent_5" refType="w"/>
+                <dgm:constr type="h" for="ch" forName="textparent_5" refType="h" refFor="ch" refForName="picture_5"/>
+                <dgm:constr type="l" for="ch" forName="textparent_5" refType="r" refFor="ch" refForName="picture_5"/>
+                <dgm:constr type="ctrY" for="ch" forName="textparent_5" refType="ctrY" refFor="ch" refForName="picture_5"/>
+                <dgm:constr type="primFontSz" for="des" forName="text_5" refType="primFontSz" refFor="des" refForName="text_2" op="equ"/>
+                <dgm:constr type="w" for="ch" forName="picture_6" refType="w" refFor="ch" refForName="picture_1" fact="0.15"/>
+                <dgm:constr type="h" for="ch" forName="picture_6" refType="h" refFor="ch" refForName="picture_1" fact="0.15"/>
+                <dgm:constr type="l" for="ch" forName="picture_6" refType="w" refFor="ch" refForName="picture_1" fact="1.2898"/>
+                <dgm:constr type="ctrY" for="ch" forName="picture_6" refType="h" refFor="ch" refForName="picture_1" fact="0.773"/>
+                <dgm:constr type="l" for="ch" forName="line_6" refType="ctrX" refFor="ch" refForName="picture_1"/>
+                <dgm:constr type="h" for="ch" forName="line_6"/>
+                <dgm:constr type="r" for="ch" forName="line_6" refType="ctrX" refFor="ch" refForName="picture_6"/>
+                <dgm:constr type="ctrY" for="ch" forName="line_6" refType="ctrY" refFor="ch" refForName="picture_6"/>
+                <dgm:constr type="r" for="ch" forName="textparent_6" refType="w"/>
+                <dgm:constr type="h" for="ch" forName="textparent_6" refType="h" refFor="ch" refForName="picture_6"/>
+                <dgm:constr type="l" for="ch" forName="textparent_6" refType="r" refFor="ch" refForName="picture_6"/>
+                <dgm:constr type="ctrY" for="ch" forName="textparent_6" refType="ctrY" refFor="ch" refForName="picture_6"/>
+                <dgm:constr type="primFontSz" for="des" forName="text_6" refType="primFontSz" refFor="des" refForName="text_2" op="equ"/>
+                <dgm:constr type="w" for="ch" forName="picture_7" refType="w" refFor="ch" refForName="picture_1" fact="0.15"/>
+                <dgm:constr type="h" for="ch" forName="picture_7" refType="h" refFor="ch" refForName="picture_1" fact="0.15"/>
+                <dgm:constr type="l" for="ch" forName="picture_7" refType="w" refFor="ch" refForName="picture_1" fact="1.4363"/>
+                <dgm:constr type="ctrY" for="ch" forName="picture_7" refType="h" refFor="ch" refForName="picture_1" fact="0.925"/>
+                <dgm:constr type="l" for="ch" forName="line_7" refType="ctrX" refFor="ch" refForName="picture_1"/>
+                <dgm:constr type="h" for="ch" forName="line_7"/>
+                <dgm:constr type="r" for="ch" forName="line_7" refType="ctrX" refFor="ch" refForName="picture_7"/>
+                <dgm:constr type="ctrY" for="ch" forName="line_7" refType="ctrY" refFor="ch" refForName="picture_7"/>
+                <dgm:constr type="r" for="ch" forName="textparent_7" refType="w"/>
+                <dgm:constr type="h" for="ch" forName="textparent_7" refType="h" refFor="ch" refForName="picture_7"/>
+                <dgm:constr type="l" for="ch" forName="textparent_7" refType="r" refFor="ch" refForName="picture_7"/>
+                <dgm:constr type="ctrY" for="ch" forName="textparent_7" refType="ctrY" refFor="ch" refForName="picture_7"/>
+                <dgm:constr type="primFontSz" for="des" forName="text_7" refType="primFontSz" refFor="des" refForName="text_2" op="equ"/>
+              </dgm:constrLst>
+            </dgm:if>
+            <dgm:else name="Name27">
+              <dgm:constrLst>
+                <dgm:constr type="h" for="ch" forName="picture_1" refType="h"/>
+                <dgm:constr type="w" for="ch" forName="picture_1" refType="h" refFor="ch" refForName="picture_1" op="equ"/>
+                <dgm:constr type="r" for="ch" forName="picture_1" refType="w"/>
+                <dgm:constr type="t" for="ch" forName="picture_1"/>
+                <dgm:constr type="w" for="ch" forName="text_1" refType="w" refFor="ch" refForName="picture_1" fact="0.64"/>
+                <dgm:constr type="h" for="ch" forName="text_1" refType="h" refFor="ch" refForName="picture_1" fact="0.33"/>
+                <dgm:constr type="l" for="ch" forName="text_1" refType="l" refFor="ch" refForName="picture_1"/>
+                <dgm:constr type="lOff" for="ch" forName="text_1" refType="w" refFor="ch" refForName="picture_1" fact="0.18"/>
+                <dgm:constr type="t" for="ch" forName="text_1" refType="h" refFor="ch" refForName="picture_1" fact="0.531"/>
+                <dgm:constr type="w" for="ch" forName="picture_2" refType="w" refFor="ch" refForName="picture_1" fact="0.15"/>
+                <dgm:constr type="h" for="ch" forName="picture_2" refType="h" refFor="ch" refForName="picture_1" fact="0.15"/>
+                <dgm:constr type="r" for="ch" forName="picture_2" refType="w"/>
+                <dgm:constr type="rOff" for="ch" forName="picture_2" refType="w" refFor="ch" refForName="picture_1" fact="-1.4363"/>
+                <dgm:constr type="ctrY" for="ch" forName="picture_2" refType="h" refFor="ch" refForName="picture_1" fact="0.075"/>
+                <dgm:constr type="r" for="ch" forName="line_2" refType="ctrX" refFor="ch" refForName="picture_1"/>
+                <dgm:constr type="h" for="ch" forName="line_2"/>
+                <dgm:constr type="l" for="ch" forName="line_2" refType="ctrX" refFor="ch" refForName="picture_2"/>
+                <dgm:constr type="ctrY" for="ch" forName="line_2" refType="ctrY" refFor="ch" refForName="picture_2"/>
+                <dgm:constr type="l" for="ch" forName="textparent_2"/>
+                <dgm:constr type="h" for="ch" forName="textparent_2" refType="h" refFor="ch" refForName="picture_2"/>
+                <dgm:constr type="r" for="ch" forName="textparent_2" refType="l" refFor="ch" refForName="picture_2"/>
+                <dgm:constr type="ctrY" for="ch" forName="textparent_2" refType="ctrY" refFor="ch" refForName="picture_2"/>
+                <dgm:constr type="primFontSz" for="des" forName="text_2" val="65"/>
+                <dgm:constr type="w" for="ch" forName="picture_3" refType="w" refFor="ch" refForName="picture_1" fact="0.15"/>
+                <dgm:constr type="h" for="ch" forName="picture_3" refType="h" refFor="ch" refForName="picture_1" fact="0.15"/>
+                <dgm:constr type="r" for="ch" forName="picture_3" refType="w"/>
+                <dgm:constr type="rOff" for="ch" forName="picture_3" refType="w" refFor="ch" refForName="picture_1" fact="-1.2898"/>
+                <dgm:constr type="ctrY" for="ch" forName="picture_3" refType="h" refFor="ch" refForName="picture_1" fact="0.227"/>
+                <dgm:constr type="r" for="ch" forName="line_3" refType="ctrX" refFor="ch" refForName="picture_1"/>
+                <dgm:constr type="h" for="ch" forName="line_3"/>
+                <dgm:constr type="l" for="ch" forName="line_3" refType="ctrX" refFor="ch" refForName="picture_3"/>
+                <dgm:constr type="ctrY" for="ch" forName="line_3" refType="ctrY" refFor="ch" refForName="picture_3"/>
+                <dgm:constr type="l" for="ch" forName="textparent_3"/>
+                <dgm:constr type="h" for="ch" forName="textparent_3" refType="h" refFor="ch" refForName="picture_3"/>
+                <dgm:constr type="r" for="ch" forName="textparent_3" refType="l" refFor="ch" refForName="picture_3"/>
+                <dgm:constr type="ctrY" for="ch" forName="textparent_3" refType="ctrY" refFor="ch" refForName="picture_3"/>
+                <dgm:constr type="primFontSz" for="des" forName="text_3" refType="primFontSz" refFor="des" refForName="text_2" op="equ"/>
+                <dgm:constr type="w" for="ch" forName="picture_4" refType="w" refFor="ch" refForName="picture_1" fact="0.15"/>
+                <dgm:constr type="h" for="ch" forName="picture_4" refType="h" refFor="ch" refForName="picture_1" fact="0.15"/>
+                <dgm:constr type="r" for="ch" forName="picture_4" refType="w"/>
+                <dgm:constr type="rOff" for="ch" forName="picture_4" refType="w" refFor="ch" refForName="picture_1" fact="-1.21"/>
+                <dgm:constr type="ctrY" for="ch" forName="picture_4" refType="h" refFor="ch" refForName="picture_1" fact="0.405"/>
+                <dgm:constr type="r" for="ch" forName="line_4" refType="ctrX" refFor="ch" refForName="picture_1"/>
+                <dgm:constr type="h" for="ch" forName="line_4"/>
+                <dgm:constr type="l" for="ch" forName="line_4" refType="ctrX" refFor="ch" refForName="picture_4"/>
+                <dgm:constr type="ctrY" for="ch" forName="line_4" refType="ctrY" refFor="ch" refForName="picture_4"/>
+                <dgm:constr type="l" for="ch" forName="textparent_4"/>
+                <dgm:constr type="h" for="ch" forName="textparent_4" refType="h" refFor="ch" refForName="picture_4"/>
+                <dgm:constr type="r" for="ch" forName="textparent_4" refType="l" refFor="ch" refForName="picture_4"/>
+                <dgm:constr type="ctrY" for="ch" forName="textparent_4" refType="ctrY" refFor="ch" refForName="picture_4"/>
+                <dgm:constr type="primFontSz" for="des" forName="text_4" refType="primFontSz" refFor="des" refForName="text_2" op="equ"/>
+                <dgm:constr type="w" for="ch" forName="picture_5" refType="w" refFor="ch" refForName="picture_1" fact="0.15"/>
+                <dgm:constr type="h" for="ch" forName="picture_5" refType="h" refFor="ch" refForName="picture_1" fact="0.15"/>
+                <dgm:constr type="r" for="ch" forName="picture_5" refType="w"/>
+                <dgm:constr type="rOff" for="ch" forName="picture_5" refType="w" refFor="ch" refForName="picture_1" fact="-1.21"/>
+                <dgm:constr type="ctrY" for="ch" forName="picture_5" refType="h" refFor="ch" refForName="picture_1" fact="0.595"/>
+                <dgm:constr type="r" for="ch" forName="line_5" refType="ctrX" refFor="ch" refForName="picture_1"/>
+                <dgm:constr type="h" for="ch" forName="line_5"/>
+                <dgm:constr type="l" for="ch" forName="line_5" refType="ctrX" refFor="ch" refForName="picture_5"/>
+                <dgm:constr type="ctrY" for="ch" forName="line_5" refType="ctrY" refFor="ch" refForName="picture_5"/>
+                <dgm:constr type="l" for="ch" forName="textparent_5"/>
+                <dgm:constr type="h" for="ch" forName="textparent_5" refType="h" refFor="ch" refForName="picture_5"/>
+                <dgm:constr type="r" for="ch" forName="textparent_5" refType="l" refFor="ch" refForName="picture_5"/>
+                <dgm:constr type="ctrY" for="ch" forName="textparent_5" refType="ctrY" refFor="ch" refForName="picture_5"/>
+                <dgm:constr type="primFontSz" for="des" forName="text_5" refType="primFontSz" refFor="des" refForName="text_2" op="equ"/>
+                <dgm:constr type="w" for="ch" forName="picture_6" refType="w" refFor="ch" refForName="picture_1" fact="0.15"/>
+                <dgm:constr type="h" for="ch" forName="picture_6" refType="h" refFor="ch" refForName="picture_1" fact="0.15"/>
+                <dgm:constr type="r" for="ch" forName="picture_6" refType="w"/>
+                <dgm:constr type="rOff" for="ch" forName="picture_6" refType="w" refFor="ch" refForName="picture_1" fact="-1.2898"/>
+                <dgm:constr type="ctrY" for="ch" forName="picture_6" refType="h" refFor="ch" refForName="picture_1" fact="0.773"/>
+                <dgm:constr type="r" for="ch" forName="line_6" refType="ctrX" refFor="ch" refForName="picture_1"/>
+                <dgm:constr type="h" for="ch" forName="line_6"/>
+                <dgm:constr type="l" for="ch" forName="line_6" refType="ctrX" refFor="ch" refForName="picture_6"/>
+                <dgm:constr type="ctrY" for="ch" forName="line_6" refType="ctrY" refFor="ch" refForName="picture_6"/>
+                <dgm:constr type="l" for="ch" forName="textparent_6"/>
+                <dgm:constr type="h" for="ch" forName="textparent_6" refType="h" refFor="ch" refForName="picture_6"/>
+                <dgm:constr type="r" for="ch" forName="textparent_6" refType="l" refFor="ch" refForName="picture_6"/>
+                <dgm:constr type="ctrY" for="ch" forName="textparent_6" refType="ctrY" refFor="ch" refForName="picture_6"/>
+                <dgm:constr type="primFontSz" for="des" forName="text_6" refType="primFontSz" refFor="des" refForName="text_2" op="equ"/>
+                <dgm:constr type="w" for="ch" forName="picture_7" refType="w" refFor="ch" refForName="picture_1" fact="0.15"/>
+                <dgm:constr type="h" for="ch" forName="picture_7" refType="h" refFor="ch" refForName="picture_1" fact="0.15"/>
+                <dgm:constr type="r" for="ch" forName="picture_7" refType="w"/>
+                <dgm:constr type="rOff" for="ch" forName="picture_7" refType="w" refFor="ch" refForName="picture_1" fact="-1.4363"/>
+                <dgm:constr type="ctrY" for="ch" forName="picture_7" refType="h" refFor="ch" refForName="picture_1" fact="0.925"/>
+                <dgm:constr type="r" for="ch" forName="line_7" refType="ctrX" refFor="ch" refForName="picture_1"/>
+                <dgm:constr type="h" for="ch" forName="line_7"/>
+                <dgm:constr type="l" for="ch" forName="line_7" refType="ctrX" refFor="ch" refForName="picture_7"/>
+                <dgm:constr type="ctrY" for="ch" forName="line_7" refType="ctrY" refFor="ch" refForName="picture_7"/>
+                <dgm:constr type="l" for="ch" forName="textparent_7"/>
+                <dgm:constr type="h" for="ch" forName="textparent_7" refType="h" refFor="ch" refForName="picture_7"/>
+                <dgm:constr type="r" for="ch" forName="textparent_7" refType="l" refFor="ch" refForName="picture_7"/>
+                <dgm:constr type="ctrY" for="ch" forName="textparent_7" refType="ctrY" refFor="ch" refForName="picture_7"/>
+                <dgm:constr type="primFontSz" for="des" forName="text_7" refType="primFontSz" refFor="des" refForName="text_2" op="equ"/>
+              </dgm:constrLst>
+            </dgm:else>
+          </dgm:choose>
+        </dgm:else>
+      </dgm:choose>
+      <dgm:forEach name="wrapper" axis="self" ptType="parTrans">
+        <dgm:forEach name="wrapper2" axis="self" ptType="sibTrans" st="2">
+          <dgm:forEach name="pictureRepeat" axis="self">
+            <dgm:layoutNode name="pictureRepeatNode" styleLbl="alignImgPlace1">
+              <dgm:alg type="sp"/>
+              <dgm:shape xmlns:r="http://schemas.openxmlformats.org/officeDocument/2006/relationships" type="ellipse" r:blip="" blipPhldr="1">
+                <dgm:adjLst/>
+              </dgm:shape>
+              <dgm:presOf axis="self"/>
+            </dgm:layoutNode>
+          </dgm:forEach>
+        </dgm:forEach>
+      </dgm:forEach>
+      <dgm:forEach name="Name28" axis="ch" ptType="sibTrans" hideLastTrans="0" cnt="1">
+        <dgm:layoutNode name="picture_1">
+          <dgm:alg type="sp"/>
+          <dgm:shape xmlns:r="http://schemas.openxmlformats.org/officeDocument/2006/relationships" r:blip="">
+            <dgm:adjLst/>
+          </dgm:shape>
+          <dgm:presOf/>
+          <dgm:constrLst/>
+          <dgm:forEach name="Name29" ref="pictureRepeat"/>
+        </dgm:layoutNode>
+      </dgm:forEach>
+      <dgm:forEach name="Name30" axis="ch" ptType="node" cnt="1">
+        <dgm:layoutNode name="text_1" styleLbl="node1">
+          <dgm:varLst>
+            <dgm:bulletEnabled val="1"/>
+          </dgm:varLst>
+          <dgm:alg type="tx">
+            <dgm:param type="txAnchorVert" val="b"/>
+            <dgm:param type="txAnchorVertCh" val="b"/>
+            <dgm:param type="parTxRTLAlign" val="r"/>
+            <dgm:param type="shpTxRTLAlignCh" val="r"/>
+          </dgm:alg>
+          <dgm:shape xmlns:r="http://schemas.openxmlformats.org/officeDocument/2006/relationships" type="rect" r:blip="" hideGeom="1">
+            <dgm:adjLst/>
+          </dgm:shape>
+          <dgm:presOf axis="desOrSelf" ptType="node"/>
+          <dgm:constrLst>
+            <dgm:constr type="primFontSz" val="65"/>
+            <dgm:constr type="lMarg"/>
+            <dgm:constr type="rMarg"/>
+            <dgm:constr type="tMarg"/>
+            <dgm:constr type="bMarg"/>
+          </dgm:constrLst>
+          <dgm:ruleLst>
+            <dgm:rule type="primFontSz" val="5" fact="NaN" max="NaN"/>
+          </dgm:ruleLst>
+        </dgm:layoutNode>
+      </dgm:forEach>
+      <dgm:forEach name="Name31" axis="ch" ptType="sibTrans" hideLastTrans="0" st="2" cnt="1">
+        <dgm:layoutNode name="picture_2">
+          <dgm:alg type="sp"/>
+          <dgm:shape xmlns:r="http://schemas.openxmlformats.org/officeDocument/2006/relationships" r:blip="">
+            <dgm:adjLst/>
+          </dgm:shape>
+          <dgm:presOf/>
+          <dgm:constrLst/>
+          <dgm:forEach name="Name32" ref="pictureRepeat"/>
+        </dgm:layoutNode>
+      </dgm:forEach>
+      <dgm:forEach name="Name33" axis="ch" ptType="node" st="2" cnt="1">
+        <dgm:layoutNode name="line_2" styleLbl="parChTrans1D1">
+          <dgm:alg type="sp"/>
+          <dgm:shape xmlns:r="http://schemas.openxmlformats.org/officeDocument/2006/relationships" type="line" r:blip="" zOrderOff="-100">
+            <dgm:adjLst/>
+          </dgm:shape>
+          <dgm:presOf/>
+        </dgm:layoutNode>
+        <dgm:layoutNode name="textparent_2">
+          <dgm:choose name="Name34">
+            <dgm:if name="Name35" func="var" arg="dir" op="equ" val="norm">
+              <dgm:alg type="lin">
+                <dgm:param type="horzAlign" val="l"/>
+              </dgm:alg>
+            </dgm:if>
+            <dgm:else name="Name36">
+              <dgm:alg type="lin">
+                <dgm:param type="horzAlign" val="r"/>
+              </dgm:alg>
+            </dgm:else>
+          </dgm:choose>
+          <dgm:shape xmlns:r="http://schemas.openxmlformats.org/officeDocument/2006/relationships" type="rect" r:blip="" hideGeom="1">
+            <dgm:adjLst/>
+          </dgm:shape>
+          <dgm:constrLst>
+            <dgm:constr type="userW" for="ch" forName="text_2" refType="w"/>
+            <dgm:constr type="h" for="ch" forName="text_2" refType="h"/>
+          </dgm:constrLst>
+          <dgm:presOf/>
+          <dgm:layoutNode name="text_2" styleLbl="revTx">
+            <dgm:varLst>
+              <dgm:bulletEnabled val="1"/>
+            </dgm:varLst>
+            <dgm:choose name="Name37">
+              <dgm:if name="Name38" func="var" arg="dir" op="equ" val="norm">
+                <dgm:alg type="tx">
+                  <dgm:param type="parTxLTRAlign" val="l"/>
+                  <dgm:param type="shpTxLTRAlignCh" val="l"/>
+                  <dgm:param type="parTxRTLAlign" val="r"/>
+                  <dgm:param type="shpTxRTLAlignCh" val="r"/>
+                </dgm:alg>
+              </dgm:if>
+              <dgm:else name="Name39">
+                <dgm:alg type="tx">
+                  <dgm:param type="parTxLTRAlign" val="r"/>
+                  <dgm:param type="shpTxLTRAlignCh" val="r"/>
+                  <dgm:param type="parTxRTLAlign" val="r"/>
+                  <dgm:param type="shpTxRTLAlignCh" val="r"/>
+                </dgm:alg>
+              </dgm:else>
+            </dgm:choose>
+            <dgm:shape xmlns:r="http://schemas.openxmlformats.org/officeDocument/2006/relationships" type="rect" r:blip="">
+              <dgm:adjLst/>
+            </dgm:shape>
+            <dgm:presOf axis="desOrSelf" ptType="node"/>
+            <dgm:constrLst>
+              <dgm:constr type="userW"/>
+              <dgm:constr type="w" refType="userW" fact="0.1"/>
+              <dgm:constr type="lMarg" refType="primFontSz" fact="0.3"/>
+              <dgm:constr type="rMarg" refType="primFontSz" fact="0.3"/>
+              <dgm:constr type="tMarg"/>
+              <dgm:constr type="bMarg"/>
+            </dgm:constrLst>
+            <dgm:ruleLst>
+              <dgm:rule type="w" val="NaN" fact="1" max="NaN"/>
+              <dgm:rule type="primFontSz" val="5" fact="NaN" max="NaN"/>
+            </dgm:ruleLst>
+          </dgm:layoutNode>
+        </dgm:layoutNode>
+      </dgm:forEach>
+      <dgm:forEach name="Name40" axis="ch" ptType="sibTrans" hideLastTrans="0" st="3" cnt="1">
+        <dgm:layoutNode name="picture_3">
+          <dgm:alg type="sp"/>
+          <dgm:shape xmlns:r="http://schemas.openxmlformats.org/officeDocument/2006/relationships" r:blip="">
+            <dgm:adjLst/>
+          </dgm:shape>
+          <dgm:presOf/>
+          <dgm:constrLst/>
+          <dgm:forEach name="Name41" ref="pictureRepeat"/>
+        </dgm:layoutNode>
+      </dgm:forEach>
+      <dgm:forEach name="Name42" axis="ch" ptType="node" st="3" cnt="1">
+        <dgm:layoutNode name="line_3" styleLbl="parChTrans1D1">
+          <dgm:alg type="sp"/>
+          <dgm:shape xmlns:r="http://schemas.openxmlformats.org/officeDocument/2006/relationships" type="line" r:blip="" zOrderOff="-100">
+            <dgm:adjLst/>
+          </dgm:shape>
+          <dgm:presOf/>
+        </dgm:layoutNode>
+        <dgm:layoutNode name="textparent_3">
+          <dgm:choose name="Name43">
+            <dgm:if name="Name44" func="var" arg="dir" op="equ" val="norm">
+              <dgm:alg type="lin">
+                <dgm:param type="horzAlign" val="l"/>
+              </dgm:alg>
+            </dgm:if>
+            <dgm:else name="Name45">
+              <dgm:alg type="lin">
+                <dgm:param type="horzAlign" val="r"/>
+              </dgm:alg>
+            </dgm:else>
+          </dgm:choose>
+          <dgm:shape xmlns:r="http://schemas.openxmlformats.org/officeDocument/2006/relationships" type="rect" r:blip="" hideGeom="1">
+            <dgm:adjLst/>
+          </dgm:shape>
+          <dgm:constrLst>
+            <dgm:constr type="userW" for="ch" forName="text_3" refType="w"/>
+            <dgm:constr type="h" for="ch" forName="text_3" refType="h"/>
+          </dgm:constrLst>
+          <dgm:presOf/>
+          <dgm:layoutNode name="text_3" styleLbl="revTx">
+            <dgm:varLst>
+              <dgm:bulletEnabled val="1"/>
+            </dgm:varLst>
+            <dgm:choose name="Name46">
+              <dgm:if name="Name47" func="var" arg="dir" op="equ" val="norm">
+                <dgm:alg type="tx">
+                  <dgm:param type="parTxLTRAlign" val="l"/>
+                  <dgm:param type="shpTxLTRAlignCh" val="l"/>
+                  <dgm:param type="parTxRTLAlign" val="r"/>
+                  <dgm:param type="shpTxRTLAlignCh" val="r"/>
+                </dgm:alg>
+              </dgm:if>
+              <dgm:else name="Name48">
+                <dgm:alg type="tx">
+                  <dgm:param type="parTxLTRAlign" val="r"/>
+                  <dgm:param type="shpTxLTRAlignCh" val="r"/>
+                  <dgm:param type="parTxRTLAlign" val="r"/>
+                  <dgm:param type="shpTxRTLAlignCh" val="r"/>
+                </dgm:alg>
+              </dgm:else>
+            </dgm:choose>
+            <dgm:shape xmlns:r="http://schemas.openxmlformats.org/officeDocument/2006/relationships" type="rect" r:blip="">
+              <dgm:adjLst/>
+            </dgm:shape>
+            <dgm:presOf axis="desOrSelf" ptType="node"/>
+            <dgm:constrLst>
+              <dgm:constr type="userW"/>
+              <dgm:constr type="w" refType="userW" fact="0.1"/>
+              <dgm:constr type="lMarg" refType="primFontSz" fact="0.3"/>
+              <dgm:constr type="rMarg" refType="primFontSz" fact="0.3"/>
+              <dgm:constr type="tMarg"/>
+              <dgm:constr type="bMarg"/>
+            </dgm:constrLst>
+            <dgm:ruleLst>
+              <dgm:rule type="w" val="NaN" fact="1" max="NaN"/>
+              <dgm:rule type="primFontSz" val="5" fact="NaN" max="NaN"/>
+            </dgm:ruleLst>
+          </dgm:layoutNode>
+        </dgm:layoutNode>
+      </dgm:forEach>
+      <dgm:forEach name="Name49" axis="ch" ptType="sibTrans" hideLastTrans="0" st="4" cnt="1">
+        <dgm:layoutNode name="picture_4">
+          <dgm:alg type="sp"/>
+          <dgm:shape xmlns:r="http://schemas.openxmlformats.org/officeDocument/2006/relationships" r:blip="">
+            <dgm:adjLst/>
+          </dgm:shape>
+          <dgm:presOf/>
+          <dgm:constrLst/>
+          <dgm:forEach name="Name50" ref="pictureRepeat"/>
+        </dgm:layoutNode>
+      </dgm:forEach>
+      <dgm:forEach name="Name51" axis="ch" ptType="node" st="4" cnt="1">
+        <dgm:layoutNode name="line_4" styleLbl="parChTrans1D1">
+          <dgm:alg type="sp"/>
+          <dgm:shape xmlns:r="http://schemas.openxmlformats.org/officeDocument/2006/relationships" type="line" r:blip="" zOrderOff="-100">
+            <dgm:adjLst/>
+          </dgm:shape>
+          <dgm:presOf/>
+        </dgm:layoutNode>
+        <dgm:layoutNode name="textparent_4">
+          <dgm:choose name="Name52">
+            <dgm:if name="Name53" func="var" arg="dir" op="equ" val="norm">
+              <dgm:alg type="lin">
+                <dgm:param type="horzAlign" val="l"/>
+              </dgm:alg>
+            </dgm:if>
+            <dgm:else name="Name54">
+              <dgm:alg type="lin">
+                <dgm:param type="horzAlign" val="r"/>
+              </dgm:alg>
+            </dgm:else>
+          </dgm:choose>
+          <dgm:shape xmlns:r="http://schemas.openxmlformats.org/officeDocument/2006/relationships" type="rect" r:blip="" hideGeom="1">
+            <dgm:adjLst/>
+          </dgm:shape>
+          <dgm:constrLst>
+            <dgm:constr type="userW" for="ch" forName="text_4" refType="w"/>
+            <dgm:constr type="h" for="ch" forName="text_4" refType="h"/>
+          </dgm:constrLst>
+          <dgm:presOf/>
+          <dgm:layoutNode name="text_4" styleLbl="revTx">
+            <dgm:varLst>
+              <dgm:bulletEnabled val="1"/>
+            </dgm:varLst>
+            <dgm:choose name="Name55">
+              <dgm:if name="Name56" func="var" arg="dir" op="equ" val="norm">
+                <dgm:alg type="tx">
+                  <dgm:param type="parTxLTRAlign" val="l"/>
+                  <dgm:param type="shpTxLTRAlignCh" val="l"/>
+                  <dgm:param type="parTxRTLAlign" val="r"/>
+                  <dgm:param type="shpTxRTLAlignCh" val="r"/>
+                </dgm:alg>
+              </dgm:if>
+              <dgm:else name="Name57">
+                <dgm:alg type="tx">
+                  <dgm:param type="parTxLTRAlign" val="r"/>
+                  <dgm:param type="shpTxLTRAlignCh" val="r"/>
+                  <dgm:param type="parTxRTLAlign" val="r"/>
+                  <dgm:param type="shpTxRTLAlignCh" val="r"/>
+                </dgm:alg>
+              </dgm:else>
+            </dgm:choose>
+            <dgm:shape xmlns:r="http://schemas.openxmlformats.org/officeDocument/2006/relationships" type="rect" r:blip="">
+              <dgm:adjLst/>
+            </dgm:shape>
+            <dgm:presOf axis="desOrSelf" ptType="node"/>
+            <dgm:constrLst>
+              <dgm:constr type="userW"/>
+              <dgm:constr type="w" refType="userW" fact="0.1"/>
+              <dgm:constr type="lMarg" refType="primFontSz" fact="0.3"/>
+              <dgm:constr type="rMarg" refType="primFontSz" fact="0.3"/>
+              <dgm:constr type="tMarg"/>
+              <dgm:constr type="bMarg"/>
+            </dgm:constrLst>
+            <dgm:ruleLst>
+              <dgm:rule type="w" val="NaN" fact="1" max="NaN"/>
+              <dgm:rule type="primFontSz" val="5" fact="NaN" max="NaN"/>
+            </dgm:ruleLst>
+          </dgm:layoutNode>
+        </dgm:layoutNode>
+      </dgm:forEach>
+      <dgm:forEach name="Name58" axis="ch" ptType="sibTrans" hideLastTrans="0" st="5" cnt="1">
+        <dgm:layoutNode name="picture_5">
+          <dgm:alg type="sp"/>
+          <dgm:shape xmlns:r="http://schemas.openxmlformats.org/officeDocument/2006/relationships" r:blip="">
+            <dgm:adjLst/>
+          </dgm:shape>
+          <dgm:presOf/>
+          <dgm:constrLst/>
+          <dgm:forEach name="Name59" ref="pictureRepeat"/>
+        </dgm:layoutNode>
+      </dgm:forEach>
+      <dgm:forEach name="Name60" axis="ch" ptType="node" st="5" cnt="1">
+        <dgm:layoutNode name="line_5" styleLbl="parChTrans1D1">
+          <dgm:alg type="sp"/>
+          <dgm:shape xmlns:r="http://schemas.openxmlformats.org/officeDocument/2006/relationships" type="line" r:blip="" zOrderOff="-100">
+            <dgm:adjLst/>
+          </dgm:shape>
+          <dgm:presOf/>
+        </dgm:layoutNode>
+        <dgm:layoutNode name="textparent_5">
+          <dgm:choose name="Name61">
+            <dgm:if name="Name62" func="var" arg="dir" op="equ" val="norm">
+              <dgm:alg type="lin">
+                <dgm:param type="horzAlign" val="l"/>
+              </dgm:alg>
+            </dgm:if>
+            <dgm:else name="Name63">
+              <dgm:alg type="lin">
+                <dgm:param type="horzAlign" val="r"/>
+              </dgm:alg>
+            </dgm:else>
+          </dgm:choose>
+          <dgm:shape xmlns:r="http://schemas.openxmlformats.org/officeDocument/2006/relationships" type="rect" r:blip="" hideGeom="1">
+            <dgm:adjLst/>
+          </dgm:shape>
+          <dgm:constrLst>
+            <dgm:constr type="userW" for="ch" forName="text_5" refType="w"/>
+            <dgm:constr type="h" for="ch" forName="text_5" refType="h"/>
+          </dgm:constrLst>
+          <dgm:presOf/>
+          <dgm:layoutNode name="text_5" styleLbl="revTx">
+            <dgm:varLst>
+              <dgm:bulletEnabled val="1"/>
+            </dgm:varLst>
+            <dgm:choose name="Name64">
+              <dgm:if name="Name65" func="var" arg="dir" op="equ" val="norm">
+                <dgm:alg type="tx">
+                  <dgm:param type="parTxLTRAlign" val="l"/>
+                  <dgm:param type="shpTxLTRAlignCh" val="l"/>
+                  <dgm:param type="parTxRTLAlign" val="r"/>
+                  <dgm:param type="shpTxRTLAlignCh" val="r"/>
+                </dgm:alg>
+              </dgm:if>
+              <dgm:else name="Name66">
+                <dgm:alg type="tx">
+                  <dgm:param type="parTxLTRAlign" val="r"/>
+                  <dgm:param type="shpTxLTRAlignCh" val="r"/>
+                  <dgm:param type="parTxRTLAlign" val="r"/>
+                  <dgm:param type="shpTxRTLAlignCh" val="r"/>
+                </dgm:alg>
+              </dgm:else>
+            </dgm:choose>
+            <dgm:shape xmlns:r="http://schemas.openxmlformats.org/officeDocument/2006/relationships" type="rect" r:blip="">
+              <dgm:adjLst/>
+            </dgm:shape>
+            <dgm:presOf axis="desOrSelf" ptType="node"/>
+            <dgm:constrLst>
+              <dgm:constr type="userW"/>
+              <dgm:constr type="w" refType="userW" fact="0.1"/>
+              <dgm:constr type="lMarg" refType="primFontSz" fact="0.3"/>
+              <dgm:constr type="rMarg" refType="primFontSz" fact="0.3"/>
+              <dgm:constr type="tMarg"/>
+              <dgm:constr type="bMarg"/>
+            </dgm:constrLst>
+            <dgm:ruleLst>
+              <dgm:rule type="w" val="NaN" fact="1" max="NaN"/>
+              <dgm:rule type="primFontSz" val="5" fact="NaN" max="NaN"/>
+            </dgm:ruleLst>
+          </dgm:layoutNode>
+        </dgm:layoutNode>
+      </dgm:forEach>
+      <dgm:forEach name="Name67" axis="ch" ptType="sibTrans" hideLastTrans="0" st="6" cnt="1">
+        <dgm:layoutNode name="picture_6">
+          <dgm:alg type="sp"/>
+          <dgm:shape xmlns:r="http://schemas.openxmlformats.org/officeDocument/2006/relationships" r:blip="">
+            <dgm:adjLst/>
+          </dgm:shape>
+          <dgm:presOf/>
+          <dgm:constrLst/>
+          <dgm:forEach name="Name68" ref="pictureRepeat"/>
+        </dgm:layoutNode>
+      </dgm:forEach>
+      <dgm:forEach name="Name69" axis="ch" ptType="node" st="6" cnt="1">
+        <dgm:layoutNode name="line_6" styleLbl="parChTrans1D1">
+          <dgm:alg type="sp"/>
+          <dgm:shape xmlns:r="http://schemas.openxmlformats.org/officeDocument/2006/relationships" type="line" r:blip="" zOrderOff="-100">
+            <dgm:adjLst/>
+          </dgm:shape>
+          <dgm:presOf/>
+        </dgm:layoutNode>
+        <dgm:layoutNode name="textparent_6">
+          <dgm:choose name="Name70">
+            <dgm:if name="Name71" func="var" arg="dir" op="equ" val="norm">
+              <dgm:alg type="lin">
+                <dgm:param type="horzAlign" val="l"/>
+              </dgm:alg>
+            </dgm:if>
+            <dgm:else name="Name72">
+              <dgm:alg type="lin">
+                <dgm:param type="horzAlign" val="r"/>
+              </dgm:alg>
+            </dgm:else>
+          </dgm:choose>
+          <dgm:shape xmlns:r="http://schemas.openxmlformats.org/officeDocument/2006/relationships" type="rect" r:blip="" hideGeom="1">
+            <dgm:adjLst/>
+          </dgm:shape>
+          <dgm:constrLst>
+            <dgm:constr type="userW" for="ch" forName="text_6" refType="w"/>
+            <dgm:constr type="h" for="ch" forName="text_6" refType="h"/>
+          </dgm:constrLst>
+          <dgm:presOf/>
+          <dgm:layoutNode name="text_6" styleLbl="revTx">
+            <dgm:varLst>
+              <dgm:bulletEnabled val="1"/>
+            </dgm:varLst>
+            <dgm:choose name="Name73">
+              <dgm:if name="Name74" func="var" arg="dir" op="equ" val="norm">
+                <dgm:alg type="tx">
+                  <dgm:param type="parTxLTRAlign" val="l"/>
+                  <dgm:param type="shpTxLTRAlignCh" val="l"/>
+                  <dgm:param type="parTxRTLAlign" val="r"/>
+                  <dgm:param type="shpTxRTLAlignCh" val="r"/>
+                </dgm:alg>
+              </dgm:if>
+              <dgm:else name="Name75">
+                <dgm:alg type="tx">
+                  <dgm:param type="parTxLTRAlign" val="r"/>
+                  <dgm:param type="shpTxLTRAlignCh" val="r"/>
+                  <dgm:param type="parTxRTLAlign" val="r"/>
+                  <dgm:param type="shpTxRTLAlignCh" val="r"/>
+                </dgm:alg>
+              </dgm:else>
+            </dgm:choose>
+            <dgm:shape xmlns:r="http://schemas.openxmlformats.org/officeDocument/2006/relationships" type="rect" r:blip="">
+              <dgm:adjLst/>
+            </dgm:shape>
+            <dgm:presOf axis="desOrSelf" ptType="node"/>
+            <dgm:constrLst>
+              <dgm:constr type="userW"/>
+              <dgm:constr type="w" refType="userW" fact="0.1"/>
+              <dgm:constr type="lMarg" refType="primFontSz" fact="0.3"/>
+              <dgm:constr type="rMarg" refType="primFontSz" fact="0.3"/>
+              <dgm:constr type="tMarg"/>
+              <dgm:constr type="bMarg"/>
+            </dgm:constrLst>
+            <dgm:ruleLst>
+              <dgm:rule type="w" val="NaN" fact="1" max="NaN"/>
+              <dgm:rule type="primFontSz" val="5" fact="NaN" max="NaN"/>
+            </dgm:ruleLst>
+          </dgm:layoutNode>
+        </dgm:layoutNode>
+      </dgm:forEach>
+      <dgm:forEach name="Name76" axis="ch" ptType="sibTrans" hideLastTrans="0" st="7" cnt="1">
+        <dgm:layoutNode name="picture_7">
+          <dgm:alg type="sp"/>
+          <dgm:shape xmlns:r="http://schemas.openxmlformats.org/officeDocument/2006/relationships" r:blip="">
+            <dgm:adjLst/>
+          </dgm:shape>
+          <dgm:presOf/>
+          <dgm:constrLst/>
+          <dgm:forEach name="Name77" ref="pictureRepeat"/>
+        </dgm:layoutNode>
+      </dgm:forEach>
+      <dgm:forEach name="Name78" axis="ch" ptType="node" st="7" cnt="1">
+        <dgm:layoutNode name="line_7" styleLbl="parChTrans1D1">
+          <dgm:alg type="sp"/>
+          <dgm:shape xmlns:r="http://schemas.openxmlformats.org/officeDocument/2006/relationships" type="line" r:blip="" zOrderOff="-100">
+            <dgm:adjLst/>
+          </dgm:shape>
+          <dgm:presOf/>
+        </dgm:layoutNode>
+        <dgm:layoutNode name="textparent_7">
+          <dgm:choose name="Name79">
+            <dgm:if name="Name80" func="var" arg="dir" op="equ" val="norm">
+              <dgm:alg type="lin">
+                <dgm:param type="horzAlign" val="l"/>
+              </dgm:alg>
+            </dgm:if>
+            <dgm:else name="Name81">
+              <dgm:alg type="lin">
+                <dgm:param type="horzAlign" val="r"/>
+              </dgm:alg>
+            </dgm:else>
+          </dgm:choose>
+          <dgm:shape xmlns:r="http://schemas.openxmlformats.org/officeDocument/2006/relationships" type="rect" r:blip="" hideGeom="1">
+            <dgm:adjLst/>
+          </dgm:shape>
+          <dgm:constrLst>
+            <dgm:constr type="userW" for="ch" forName="text_7" refType="w"/>
+            <dgm:constr type="h" for="ch" forName="text_7" refType="h"/>
+          </dgm:constrLst>
+          <dgm:presOf/>
+          <dgm:layoutNode name="text_7" styleLbl="revTx">
+            <dgm:varLst>
+              <dgm:bulletEnabled val="1"/>
+            </dgm:varLst>
+            <dgm:choose name="Name82">
+              <dgm:if name="Name83" func="var" arg="dir" op="equ" val="norm">
+                <dgm:alg type="tx">
+                  <dgm:param type="parTxLTRAlign" val="l"/>
+                  <dgm:param type="shpTxLTRAlignCh" val="l"/>
+                  <dgm:param type="parTxRTLAlign" val="r"/>
+                  <dgm:param type="shpTxRTLAlignCh" val="r"/>
+                </dgm:alg>
+              </dgm:if>
+              <dgm:else name="Name84">
+                <dgm:alg type="tx">
+                  <dgm:param type="parTxLTRAlign" val="r"/>
+                  <dgm:param type="shpTxLTRAlignCh" val="r"/>
+                  <dgm:param type="parTxRTLAlign" val="r"/>
+                  <dgm:param type="shpTxRTLAlignCh" val="r"/>
+                </dgm:alg>
+              </dgm:else>
+            </dgm:choose>
+            <dgm:shape xmlns:r="http://schemas.openxmlformats.org/officeDocument/2006/relationships" type="rect" r:blip="">
+              <dgm:adjLst/>
+            </dgm:shape>
+            <dgm:presOf axis="desOrSelf" ptType="node"/>
+            <dgm:constrLst>
+              <dgm:constr type="userW"/>
+              <dgm:constr type="w" refType="userW" fact="0.1"/>
+              <dgm:constr type="lMarg" refType="primFontSz" fact="0.3"/>
+              <dgm:constr type="rMarg" refType="primFontSz" fact="0.3"/>
+              <dgm:constr type="tMarg"/>
+              <dgm:constr type="bMarg"/>
+            </dgm:constrLst>
+            <dgm:ruleLst>
+              <dgm:rule type="w" val="NaN" fact="1" max="NaN"/>
+              <dgm:rule type="primFontSz" val="5" fact="NaN" max="NaN"/>
+            </dgm:ruleLst>
+          </dgm:layoutNode>
+        </dgm:layoutNode>
+      </dgm:forEach>
+    </dgm:layoutNode>
+  </dgm:layoutNode>
+</dgm:layoutDef>
+</file>
+
+<file path=ppt/diagrams/quickStyle1.xml><?xml version="1.0" encoding="utf-8"?>
+<dgm:styleDef xmlns:dgm="http://schemas.openxmlformats.org/drawingml/2006/diagram" xmlns:a="http://schemas.openxmlformats.org/drawingml/2006/main" uniqueId="urn:microsoft.com/office/officeart/2005/8/quickstyle/simple1">
+  <dgm:title val=""/>
+  <dgm:desc val=""/>
+  <dgm:catLst>
+    <dgm:cat type="simple" pri="10100"/>
+  </dgm:catLst>
+  <dgm:scene3d>
+    <a:camera prst="orthographicFront"/>
+    <a:lightRig rig="threePt" dir="t"/>
+  </dgm:scene3d>
+  <dgm:styleLbl name="node0">
+    <dgm:scene3d>
+      <a:camera prst="orthographicFront"/>
+      <a:lightRig rig="threePt" dir="t"/>
+    </dgm:scene3d>
+    <dgm:sp3d/>
+    <dgm:txPr/>
+    <dgm:style>
+      <a:lnRef idx="2">
+        <a:scrgbClr r="0" g="0" b="0"/>
+      </a:lnRef>
+      <a:fillRef idx="1">
+        <a:scrgbClr r="0" g="0" b="0"/>
+      </a:fillRef>
+      <a:effectRef idx="0">
+        <a:scrgbClr r="0" g="0" b="0"/>
+      </a:effectRef>
+      <a:fontRef idx="minor">
+        <a:schemeClr val="lt1"/>
+      </a:fontRef>
+    </dgm:style>
+  </dgm:styleLbl>
+  <dgm:styleLbl name="lnNode1">
+    <dgm:scene3d>
+      <a:camera prst="orthographicFront"/>
+      <a:lightRig rig="threePt" dir="t"/>
+    </dgm:scene3d>
+    <dgm:sp3d/>
+    <dgm:txPr/>
+    <dgm:style>
+      <a:lnRef idx="2">
+        <a:scrgbClr r="0" g="0" b="0"/>
+      </a:lnRef>
+      <a:fillRef idx="1">
+        <a:scrgbClr r="0" g="0" b="0"/>
+      </a:fillRef>
+      <a:effectRef idx="0">
+        <a:scrgbClr r="0" g="0" b="0"/>
+      </a:effectRef>
+      <a:fontRef idx="minor">
+        <a:schemeClr val="lt1"/>
+      </a:fontRef>
+    </dgm:style>
+  </dgm:styleLbl>
+  <dgm:styleLbl name="vennNode1">
+    <dgm:scene3d>
+      <a:camera prst="orthographicFront"/>
+      <a:lightRig rig="threePt" dir="t"/>
+    </dgm:scene3d>
+    <dgm:sp3d/>
+    <dgm:txPr/>
+    <dgm:style>
+      <a:lnRef idx="2">
+        <a:scrgbClr r="0" g="0" b="0"/>
+      </a:lnRef>
+      <a:fillRef idx="1">
+        <a:scrgbClr r="0" g="0" b="0"/>
+      </a:fillRef>
+      <a:effectRef idx="0">
+        <a:scrgbClr r="0" g="0" b="0"/>
+      </a:effectRef>
+      <a:fontRef idx="minor">
+        <a:schemeClr val="tx1"/>
+      </a:fontRef>
+    </dgm:style>
+  </dgm:styleLbl>
+  <dgm:styleLbl name="alignNode1">
+    <dgm:scene3d>
+      <a:camera prst="orthographicFront"/>
+      <a:lightRig rig="threePt" dir="t"/>
+    </dgm:scene3d>
+    <dgm:sp3d/>
+    <dgm:txPr/>
+    <dgm:style>
+      <a:lnRef idx="2">
+        <a:scrgbClr r="0" g="0" b="0"/>
+      </a:lnRef>
+      <a:fillRef idx="1">
+        <a:scrgbClr r="0" g="0" b="0"/>
+      </a:fillRef>
+      <a:effectRef idx="0">
+        <a:scrgbClr r="0" g="0" b="0"/>
+      </a:effectRef>
+      <a:fontRef idx="minor">
+        <a:schemeClr val="lt1"/>
+      </a:fontRef>
+    </dgm:style>
+  </dgm:styleLbl>
+  <dgm:styleLbl name="node1">
+    <dgm:scene3d>
+      <a:camera prst="orthographicFront"/>
+      <a:lightRig rig="threePt" dir="t"/>
+    </dgm:scene3d>
+    <dgm:sp3d/>
+    <dgm:txPr/>
+    <dgm:style>
+      <a:lnRef idx="2">
+        <a:scrgbClr r="0" g="0" b="0"/>
+      </a:lnRef>
+      <a:fillRef idx="1">
+        <a:scrgbClr r="0" g="0" b="0"/>
+      </a:fillRef>
+      <a:effectRef idx="0">
+        <a:scrgbClr r="0" g="0" b="0"/>
+      </a:effectRef>
+      <a:fontRef idx="minor">
+        <a:schemeClr val="lt1"/>
+      </a:fontRef>
+    </dgm:style>
+  </dgm:styleLbl>
+  <dgm:styleLbl name="node2">
+    <dgm:scene3d>
+      <a:camera prst="orthographicFront"/>
+      <a:lightRig rig="threePt" dir="t"/>
+    </dgm:scene3d>
+    <dgm:sp3d/>
+    <dgm:txPr/>
+    <dgm:style>
+      <a:lnRef idx="2">
+        <a:scrgbClr r="0" g="0" b="0"/>
+      </a:lnRef>
+      <a:fillRef idx="1">
+        <a:scrgbClr r="0" g="0" b="0"/>
+      </a:fillRef>
+      <a:effectRef idx="0">
+        <a:scrgbClr r="0" g="0" b="0"/>
+      </a:effectRef>
+      <a:fontRef idx="minor">
+        <a:schemeClr val="lt1"/>
+      </a:fontRef>
+    </dgm:style>
+  </dgm:styleLbl>
+  <dgm:styleLbl name="node3">
+    <dgm:scene3d>
+      <a:camera prst="orthographicFront"/>
+      <a:lightRig rig="threePt" dir="t"/>
+    </dgm:scene3d>
+    <dgm:sp3d/>
+    <dgm:txPr/>
+    <dgm:style>
+      <a:lnRef idx="2">
+        <a:scrgbClr r="0" g="0" b="0"/>
+      </a:lnRef>
+      <a:fillRef idx="1">
+        <a:scrgbClr r="0" g="0" b="0"/>
+      </a:fillRef>
+      <a:effectRef idx="0">
+        <a:scrgbClr r="0" g="0" b="0"/>
+      </a:effectRef>
+      <a:fontRef idx="minor">
+        <a:schemeClr val="lt1"/>
+      </a:fontRef>
+    </dgm:style>
+  </dgm:styleLbl>
+  <dgm:styleLbl name="node4">
+    <dgm:scene3d>
+      <a:camera prst="orthographicFront"/>
+      <a:lightRig rig="threePt" dir="t"/>
+    </dgm:scene3d>
+    <dgm:sp3d/>
+    <dgm:txPr/>
+    <dgm:style>
+      <a:lnRef idx="2">
+        <a:scrgbClr r="0" g="0" b="0"/>
+      </a:lnRef>
+      <a:fillRef idx="1">
+        <a:scrgbClr r="0" g="0" b="0"/>
+      </a:fillRef>
+      <a:effectRef idx="0">
+        <a:scrgbClr r="0" g="0" b="0"/>
+      </a:effectRef>
+      <a:fontRef idx="minor">
+        <a:schemeClr val="lt1"/>
+      </a:fontRef>
+    </dgm:style>
+  </dgm:styleLbl>
+  <dgm:styleLbl name="fgImgPlace1">
+    <dgm:scene3d>
+      <a:camera prst="orthographicFront"/>
+      <a:lightRig rig="threePt" dir="t"/>
+    </dgm:scene3d>
+    <dgm:sp3d/>
+    <dgm:txPr/>
+    <dgm:style>
+      <a:lnRef idx="2">
+        <a:scrgbClr r="0" g="0" b="0"/>
+      </a:lnRef>
+      <a:fillRef idx="1">
+        <a:scrgbClr r="0" g="0" b="0"/>
+      </a:fillRef>
+      <a:effectRef idx="0">
+        <a:scrgbClr r="0" g="0" b="0"/>
+      </a:effectRef>
+      <a:fontRef idx="minor"/>
+    </dgm:style>
+  </dgm:styleLbl>
+  <dgm:styleLbl name="alignImgPlace1">
+    <dgm:scene3d>
+      <a:camera prst="orthographicFront"/>
+      <a:lightRig rig="threePt" dir="t"/>
+    </dgm:scene3d>
+    <dgm:sp3d/>
+    <dgm:txPr/>
+    <dgm:style>
+      <a:lnRef idx="2">
+        <a:scrgbClr r="0" g="0" b="0"/>
+      </a:lnRef>
+      <a:fillRef idx="1">
+        <a:scrgbClr r="0" g="0" b="0"/>
+      </a:fillRef>
+      <a:effectRef idx="0">
+        <a:scrgbClr r="0" g="0" b="0"/>
+      </a:effectRef>
+      <a:fontRef idx="minor"/>
+    </dgm:style>
+  </dgm:styleLbl>
+  <dgm:styleLbl name="bgImgPlace1">
+    <dgm:scene3d>
+      <a:camera prst="orthographicFront"/>
+      <a:lightRig rig="threePt" dir="t"/>
+    </dgm:scene3d>
+    <dgm:sp3d/>
+    <dgm:txPr/>
+    <dgm:style>
+      <a:lnRef idx="2">
+        <a:scrgbClr r="0" g="0" b="0"/>
+      </a:lnRef>
+      <a:fillRef idx="1">
+        <a:scrgbClr r="0" g="0" b="0"/>
+      </a:fillRef>
+      <a:effectRef idx="0">
+        <a:scrgbClr r="0" g="0" b="0"/>
+      </a:effectRef>
+      <a:fontRef idx="minor"/>
+    </dgm:style>
+  </dgm:styleLbl>
+  <dgm:styleLbl name="sibTrans2D1">
+    <dgm:scene3d>
+      <a:camera prst="orthographicFront"/>
+      <a:lightRig rig="threePt" dir="t"/>
+    </dgm:scene3d>
+    <dgm:sp3d/>
+    <dgm:txPr/>
+    <dgm:style>
+      <a:lnRef idx="0">
+        <a:scrgbClr r="0" g="0" b="0"/>
+      </a:lnRef>
+      <a:fillRef idx="1">
+        <a:scrgbClr r="0" g="0" b="0"/>
+      </a:fillRef>
+      <a:effectRef idx="0">
+        <a:scrgbClr r="0" g="0" b="0"/>
+      </a:effectRef>
+      <a:fontRef idx="minor">
+        <a:schemeClr val="lt1"/>
+      </a:fontRef>
+    </dgm:style>
+  </dgm:styleLbl>
+  <dgm:styleLbl name="fgSibTrans2D1">
+    <dgm:scene3d>
+      <a:camera prst="orthographicFront"/>
+      <a:lightRig rig="threePt" dir="t"/>
+    </dgm:scene3d>
+    <dgm:sp3d/>
+    <dgm:txPr/>
+    <dgm:style>
+      <a:lnRef idx="0">
+        <a:scrgbClr r="0" g="0" b="0"/>
+      </a:lnRef>
+      <a:fillRef idx="1">
+        <a:scrgbClr r="0" g="0" b="0"/>
+      </a:fillRef>
+      <a:effectRef idx="0">
+        <a:scrgbClr r="0" g="0" b="0"/>
+      </a:effectRef>
+      <a:fontRef idx="minor">
+        <a:schemeClr val="lt1"/>
+      </a:fontRef>
+    </dgm:style>
+  </dgm:styleLbl>
+  <dgm:styleLbl name="bgSibTrans2D1">
+    <dgm:scene3d>
+      <a:camera prst="orthographicFront"/>
+      <a:lightRig rig="threePt" dir="t"/>
+    </dgm:scene3d>
+    <dgm:sp3d/>
+    <dgm:txPr/>
+    <dgm:style>
+      <a:lnRef idx="0">
+        <a:scrgbClr r="0" g="0" b="0"/>
+      </a:lnRef>
+      <a:fillRef idx="1">
+        <a:scrgbClr r="0" g="0" b="0"/>
+      </a:fillRef>
+      <a:effectRef idx="0">
+        <a:scrgbClr r="0" g="0" b="0"/>
+      </a:effectRef>
+      <a:fontRef idx="minor">
+        <a:schemeClr val="lt1"/>
+      </a:fontRef>
+    </dgm:style>
+  </dgm:styleLbl>
+  <dgm:styleLbl name="sibTrans1D1">
+    <dgm:scene3d>
+      <a:camera prst="orthographicFront"/>
+      <a:lightRig rig="threePt" dir="t"/>
+    </dgm:scene3d>
+    <dgm:sp3d/>
+    <dgm:txPr/>
+    <dgm:style>
+      <a:lnRef idx="1">
+        <a:scrgbClr r="0" g="0" b="0"/>
+      </a:lnRef>
+      <a:fillRef idx="0">
+        <a:scrgbClr r="0" g="0" b="0"/>
+      </a:fillRef>
+      <a:effectRef idx="0">
+        <a:scrgbClr r="0" g="0" b="0"/>
+      </a:effectRef>
+      <a:fontRef idx="minor"/>
+    </dgm:style>
+  </dgm:styleLbl>
+  <dgm:styleLbl name="callout">
+    <dgm:scene3d>
+      <a:camera prst="orthographicFront"/>
+      <a:lightRig rig="threePt" dir="t"/>
+    </dgm:scene3d>
+    <dgm:sp3d/>
+    <dgm:txPr/>
+    <dgm:style>
+      <a:lnRef idx="2">
+        <a:scrgbClr r="0" g="0" b="0"/>
+      </a:lnRef>
+      <a:fillRef idx="1">
+        <a:scrgbClr r="0" g="0" b="0"/>
+      </a:fillRef>
+      <a:effectRef idx="0">
+        <a:scrgbClr r="0" g="0" b="0"/>
+      </a:effectRef>
+      <a:fontRef idx="minor"/>
+    </dgm:style>
+  </dgm:styleLbl>
+  <dgm:styleLbl name="asst0">
+    <dgm:scene3d>
+      <a:camera prst="orthographicFront"/>
+      <a:lightRig rig="threePt" dir="t"/>
+    </dgm:scene3d>
+    <dgm:sp3d/>
+    <dgm:txPr/>
+    <dgm:style>
+      <a:lnRef idx="2">
+        <a:scrgbClr r="0" g="0" b="0"/>
+      </a:lnRef>
+      <a:fillRef idx="1">
+        <a:scrgbClr r="0" g="0" b="0"/>
+      </a:fillRef>
+      <a:effectRef idx="0">
+        <a:scrgbClr r="0" g="0" b="0"/>
+      </a:effectRef>
+      <a:fontRef idx="minor">
+        <a:schemeClr val="lt1"/>
+      </a:fontRef>
+    </dgm:style>
+  </dgm:styleLbl>
+  <dgm:styleLbl name="asst1">
+    <dgm:scene3d>
+      <a:camera prst="orthographicFront"/>
+      <a:lightRig rig="threePt" dir="t"/>
+    </dgm:scene3d>
+    <dgm:sp3d/>
+    <dgm:txPr/>
+    <dgm:style>
+      <a:lnRef idx="2">
+        <a:scrgbClr r="0" g="0" b="0"/>
+      </a:lnRef>
+      <a:fillRef idx="1">
+        <a:scrgbClr r="0" g="0" b="0"/>
+      </a:fillRef>
+      <a:effectRef idx="0">
+        <a:scrgbClr r="0" g="0" b="0"/>
+      </a:effectRef>
+      <a:fontRef idx="minor">
+        <a:schemeClr val="lt1"/>
+      </a:fontRef>
+    </dgm:style>
+  </dgm:styleLbl>
+  <dgm:styleLbl name="asst2">
+    <dgm:scene3d>
+      <a:camera prst="orthographicFront"/>
+      <a:lightRig rig="threePt" dir="t"/>
+    </dgm:scene3d>
+    <dgm:sp3d/>
+    <dgm:txPr/>
+    <dgm:style>
+      <a:lnRef idx="2">
+        <a:scrgbClr r="0" g="0" b="0"/>
+      </a:lnRef>
+      <a:fillRef idx="1">
+        <a:scrgbClr r="0" g="0" b="0"/>
+      </a:fillRef>
+      <a:effectRef idx="0">
+        <a:scrgbClr r="0" g="0" b="0"/>
+      </a:effectRef>
+      <a:fontRef idx="minor">
+        <a:schemeClr val="lt1"/>
+      </a:fontRef>
+    </dgm:style>
+  </dgm:styleLbl>
+  <dgm:styleLbl name="asst3">
+    <dgm:scene3d>
+      <a:camera prst="orthographicFront"/>
+      <a:lightRig rig="threePt" dir="t"/>
+    </dgm:scene3d>
+    <dgm:sp3d/>
+    <dgm:txPr/>
+    <dgm:style>
+      <a:lnRef idx="2">
+        <a:scrgbClr r="0" g="0" b="0"/>
+      </a:lnRef>
+      <a:fillRef idx="1">
+        <a:scrgbClr r="0" g="0" b="0"/>
+      </a:fillRef>
+      <a:effectRef idx="0">
+        <a:scrgbClr r="0" g="0" b="0"/>
+      </a:effectRef>
+      <a:fontRef idx="minor">
+        <a:schemeClr val="lt1"/>
+      </a:fontRef>
+    </dgm:style>
+  </dgm:styleLbl>
+  <dgm:styleLbl name="asst4">
+    <dgm:scene3d>
+      <a:camera prst="orthographicFront"/>
+      <a:lightRig rig="threePt" dir="t"/>
+    </dgm:scene3d>
+    <dgm:sp3d/>
+    <dgm:txPr/>
+    <dgm:style>
+      <a:lnRef idx="2">
+        <a:scrgbClr r="0" g="0" b="0"/>
+      </a:lnRef>
+      <a:fillRef idx="1">
+        <a:scrgbClr r="0" g="0" b="0"/>
+      </a:fillRef>
+      <a:effectRef idx="0">
+        <a:scrgbClr r="0" g="0" b="0"/>
+      </a:effectRef>
+      <a:fontRef idx="minor">
+        <a:schemeClr val="lt1"/>
+      </a:fontRef>
+    </dgm:style>
+  </dgm:styleLbl>
+  <dgm:styleLbl name="parChTrans2D1">
+    <dgm:scene3d>
+      <a:camera prst="orthographicFront"/>
+      <a:lightRig rig="threePt" dir="t"/>
+    </dgm:scene3d>
+    <dgm:sp3d/>
+    <dgm:txPr/>
+    <dgm:style>
+      <a:lnRef idx="2">
+        <a:scrgbClr r="0" g="0" b="0"/>
+      </a:lnRef>
+      <a:fillRef idx="1">
+        <a:scrgbClr r="0" g="0" b="0"/>
+      </a:fillRef>
+      <a:effectRef idx="0">
+        <a:scrgbClr r="0" g="0" b="0"/>
+      </a:effectRef>
+      <a:fontRef idx="minor">
+        <a:schemeClr val="lt1"/>
+      </a:fontRef>
+    </dgm:style>
+  </dgm:styleLbl>
+  <dgm:styleLbl name="parChTrans2D2">
+    <dgm:scene3d>
+      <a:camera prst="orthographicFront"/>
+      <a:lightRig rig="threePt" dir="t"/>
+    </dgm:scene3d>
+    <dgm:sp3d/>
+    <dgm:txPr/>
+    <dgm:style>
+      <a:lnRef idx="2">
+        <a:scrgbClr r="0" g="0" b="0"/>
+      </a:lnRef>
+      <a:fillRef idx="1">
+        <a:scrgbClr r="0" g="0" b="0"/>
+      </a:fillRef>
+      <a:effectRef idx="0">
+        <a:scrgbClr r="0" g="0" b="0"/>
+      </a:effectRef>
+      <a:fontRef idx="minor">
+        <a:schemeClr val="lt1"/>
+      </a:fontRef>
+    </dgm:style>
+  </dgm:styleLbl>
+  <dgm:styleLbl name="parChTrans2D3">
+    <dgm:scene3d>
+      <a:camera prst="orthographicFront"/>
+      <a:lightRig rig="threePt" dir="t"/>
+    </dgm:scene3d>
+    <dgm:sp3d/>
+    <dgm:txPr/>
+    <dgm:style>
+      <a:lnRef idx="2">
+        <a:scrgbClr r="0" g="0" b="0"/>
+      </a:lnRef>
+      <a:fillRef idx="1">
+        <a:scrgbClr r="0" g="0" b="0"/>
+      </a:fillRef>
+      <a:effectRef idx="0">
+        <a:scrgbClr r="0" g="0" b="0"/>
+      </a:effectRef>
+      <a:fontRef idx="minor">
+        <a:schemeClr val="lt1"/>
+      </a:fontRef>
+    </dgm:style>
+  </dgm:styleLbl>
+  <dgm:styleLbl name="parChTrans2D4">
+    <dgm:scene3d>
+      <a:camera prst="orthographicFront"/>
+      <a:lightRig rig="threePt" dir="t"/>
+    </dgm:scene3d>
+    <dgm:sp3d/>
+    <dgm:txPr/>
+    <dgm:style>
+      <a:lnRef idx="2">
+        <a:scrgbClr r="0" g="0" b="0"/>
+      </a:lnRef>
+      <a:fillRef idx="1">
+        <a:scrgbClr r="0" g="0" b="0"/>
+      </a:fillRef>
+      <a:effectRef idx="0">
+        <a:scrgbClr r="0" g="0" b="0"/>
+      </a:effectRef>
+      <a:fontRef idx="minor">
+        <a:schemeClr val="lt1"/>
+      </a:fontRef>
+    </dgm:style>
+  </dgm:styleLbl>
+  <dgm:styleLbl name="parChTrans1D1">
+    <dgm:scene3d>
+      <a:camera prst="orthographicFront"/>
+      <a:lightRig rig="threePt" dir="t"/>
+    </dgm:scene3d>
+    <dgm:sp3d/>
+    <dgm:txPr/>
+    <dgm:style>
+      <a:lnRef idx="2">
+        <a:scrgbClr r="0" g="0" b="0"/>
+      </a:lnRef>
+      <a:fillRef idx="0">
+        <a:scrgbClr r="0" g="0" b="0"/>
+      </a:fillRef>
+      <a:effectRef idx="0">
+        <a:scrgbClr r="0" g="0" b="0"/>
+      </a:effectRef>
+      <a:fontRef idx="minor"/>
+    </dgm:style>
+  </dgm:styleLbl>
+  <dgm:styleLbl name="parChTrans1D2">
+    <dgm:scene3d>
+      <a:camera prst="orthographicFront"/>
+      <a:lightRig rig="threePt" dir="t"/>
+    </dgm:scene3d>
+    <dgm:sp3d/>
+    <dgm:txPr/>
+    <dgm:style>
+      <a:lnRef idx="2">
+        <a:scrgbClr r="0" g="0" b="0"/>
+      </a:lnRef>
+      <a:fillRef idx="0">
+        <a:scrgbClr r="0" g="0" b="0"/>
+      </a:fillRef>
+      <a:effectRef idx="0">
+        <a:scrgbClr r="0" g="0" b="0"/>
+      </a:effectRef>
+      <a:fontRef idx="minor"/>
+    </dgm:style>
+  </dgm:styleLbl>
+  <dgm:styleLbl name="parChTrans1D3">
+    <dgm:scene3d>
+      <a:camera prst="orthographicFront"/>
+      <a:lightRig rig="threePt" dir="t"/>
+    </dgm:scene3d>
+    <dgm:sp3d/>
+    <dgm:txPr/>
+    <dgm:style>
+      <a:lnRef idx="2">
+        <a:scrgbClr r="0" g="0" b="0"/>
+      </a:lnRef>
+      <a:fillRef idx="0">
+        <a:scrgbClr r="0" g="0" b="0"/>
+      </a:fillRef>
+      <a:effectRef idx="0">
+        <a:scrgbClr r="0" g="0" b="0"/>
+      </a:effectRef>
+      <a:fontRef idx="minor"/>
+    </dgm:style>
+  </dgm:styleLbl>
+  <dgm:styleLbl name="parChTrans1D4">
+    <dgm:scene3d>
+      <a:camera prst="orthographicFront"/>
+      <a:lightRig rig="threePt" dir="t"/>
+    </dgm:scene3d>
+    <dgm:sp3d/>
+    <dgm:txPr/>
+    <dgm:style>
+      <a:lnRef idx="2">
+        <a:scrgbClr r="0" g="0" b="0"/>
+      </a:lnRef>
+      <a:fillRef idx="0">
+        <a:scrgbClr r="0" g="0" b="0"/>
+      </a:fillRef>
+      <a:effectRef idx="0">
+        <a:scrgbClr r="0" g="0" b="0"/>
+      </a:effectRef>
+      <a:fontRef idx="minor"/>
+    </dgm:style>
+  </dgm:styleLbl>
+  <dgm:styleLbl name="fgAcc1">
+    <dgm:scene3d>
+      <a:camera prst="orthographicFront"/>
+      <a:lightRig rig="threePt" dir="t"/>
+    </dgm:scene3d>
+    <dgm:sp3d/>
+    <dgm:txPr/>
+    <dgm:style>
+      <a:lnRef idx="2">
+        <a:scrgbClr r="0" g="0" b="0"/>
+      </a:lnRef>
+      <a:fillRef idx="1">
+        <a:scrgbClr r="0" g="0" b="0"/>
+      </a:fillRef>
+      <a:effectRef idx="0">
+        <a:scrgbClr r="0" g="0" b="0"/>
+      </a:effectRef>
+      <a:fontRef idx="minor"/>
+    </dgm:style>
+  </dgm:styleLbl>
+  <dgm:styleLbl name="conFgAcc1">
+    <dgm:scene3d>
+      <a:camera prst="orthographicFront"/>
+      <a:lightRig rig="threePt" dir="t"/>
+    </dgm:scene3d>
+    <dgm:sp3d/>
+    <dgm:txPr/>
+    <dgm:style>
+      <a:lnRef idx="2">
+        <a:scrgbClr r="0" g="0" b="0"/>
+      </a:lnRef>
+      <a:fillRef idx="1">
+        <a:scrgbClr r="0" g="0" b="0"/>
+      </a:fillRef>
+      <a:effectRef idx="0">
+        <a:scrgbClr r="0" g="0" b="0"/>
+      </a:effectRef>
+      <a:fontRef idx="minor"/>
+    </dgm:style>
+  </dgm:styleLbl>
+  <dgm:styleLbl name="alignAcc1">
+    <dgm:scene3d>
+      <a:camera prst="orthographicFront"/>
+      <a:lightRig rig="threePt" dir="t"/>
+    </dgm:scene3d>
+    <dgm:sp3d/>
+    <dgm:txPr/>
+    <dgm:style>
+      <a:lnRef idx="2">
+        <a:scrgbClr r="0" g="0" b="0"/>
+      </a:lnRef>
+      <a:fillRef idx="1">
+        <a:scrgbClr r="0" g="0" b="0"/>
+      </a:fillRef>
+      <a:effectRef idx="0">
+        <a:scrgbClr r="0" g="0" b="0"/>
+      </a:effectRef>
+      <a:fontRef idx="minor"/>
+    </dgm:style>
+  </dgm:styleLbl>
+  <dgm:styleLbl name="trAlignAcc1">
+    <dgm:scene3d>
+      <a:camera prst="orthographicFront"/>
+      <a:lightRig rig="threePt" dir="t"/>
+    </dgm:scene3d>
+    <dgm:sp3d/>
+    <dgm:txPr/>
+    <dgm:style>
+      <a:lnRef idx="1">
+        <a:scrgbClr r="0" g="0" b="0"/>
+      </a:lnRef>
+      <a:fillRef idx="1">
+        <a:scrgbClr r="0" g="0" b="0"/>
+      </a:fillRef>
+      <a:effectRef idx="0">
+        <a:scrgbClr r="0" g="0" b="0"/>
+      </a:effectRef>
+      <a:fontRef idx="minor"/>
+    </dgm:style>
+  </dgm:styleLbl>
+  <dgm:styleLbl name="bgAcc1">
+    <dgm:scene3d>
+      <a:camera prst="orthographicFront"/>
+      <a:lightRig rig="threePt" dir="t"/>
+    </dgm:scene3d>
+    <dgm:sp3d/>
+    <dgm:txPr/>
+    <dgm:style>
+      <a:lnRef idx="2">
+        <a:scrgbClr r="0" g="0" b="0"/>
+      </a:lnRef>
+      <a:fillRef idx="1">
+        <a:scrgbClr r="0" g="0" b="0"/>
+      </a:fillRef>
+      <a:effectRef idx="0">
+        <a:scrgbClr r="0" g="0" b="0"/>
+      </a:effectRef>
+      <a:fontRef idx="minor"/>
+    </dgm:style>
+  </dgm:styleLbl>
+  <dgm:styleLbl name="solidFgAcc1">
+    <dgm:scene3d>
+      <a:camera prst="orthographicFront"/>
+      <a:lightRig rig="threePt" dir="t"/>
+    </dgm:scene3d>
+    <dgm:sp3d/>
+    <dgm:txPr/>
+    <dgm:style>
+      <a:lnRef idx="2">
+        <a:scrgbClr r="0" g="0" b="0"/>
+      </a:lnRef>
+      <a:fillRef idx="1">
+        <a:scrgbClr r="0" g="0" b="0"/>
+      </a:fillRef>
+      <a:effectRef idx="0">
+        <a:scrgbClr r="0" g="0" b="0"/>
+      </a:effectRef>
+      <a:fontRef idx="minor"/>
+    </dgm:style>
+  </dgm:styleLbl>
+  <dgm:styleLbl name="solidAlignAcc1">
+    <dgm:scene3d>
+      <a:camera prst="orthographicFront"/>
+      <a:lightRig rig="threePt" dir="t"/>
+    </dgm:scene3d>
+    <dgm:sp3d/>
+    <dgm:txPr/>
+    <dgm:style>
+      <a:lnRef idx="2">
+        <a:scrgbClr r="0" g="0" b="0"/>
+      </a:lnRef>
+      <a:fillRef idx="1">
+        <a:scrgbClr r="0" g="0" b="0"/>
+      </a:fillRef>
+      <a:effectRef idx="0">
+        <a:scrgbClr r="0" g="0" b="0"/>
+      </a:effectRef>
+      <a:fontRef idx="minor"/>
+    </dgm:style>
+  </dgm:styleLbl>
+  <dgm:styleLbl name="solidBgAcc1">
+    <dgm:scene3d>
+      <a:camera prst="orthographicFront"/>
+      <a:lightRig rig="threePt" dir="t"/>
+    </dgm:scene3d>
+    <dgm:sp3d/>
+    <dgm:txPr/>
+    <dgm:style>
+      <a:lnRef idx="2">
+        <a:scrgbClr r="0" g="0" b="0"/>
+      </a:lnRef>
+      <a:fillRef idx="1">
+        <a:scrgbClr r="0" g="0" b="0"/>
+      </a:fillRef>
+      <a:effectRef idx="0">
+        <a:scrgbClr r="0" g="0" b="0"/>
+      </a:effectRef>
+      <a:fontRef idx="minor"/>
+    </dgm:style>
+  </dgm:styleLbl>
+  <dgm:styleLbl name="fgAccFollowNode1">
+    <dgm:scene3d>
+      <a:camera prst="orthographicFront"/>
+      <a:lightRig rig="threePt" dir="t"/>
+    </dgm:scene3d>
+    <dgm:sp3d/>
+    <dgm:txPr/>
+    <dgm:style>
+      <a:lnRef idx="2">
+        <a:scrgbClr r="0" g="0" b="0"/>
+      </a:lnRef>
+      <a:fillRef idx="1">
+        <a:scrgbClr r="0" g="0" b="0"/>
+      </a:fillRef>
+      <a:effectRef idx="0">
+        <a:scrgbClr r="0" g="0" b="0"/>
+      </a:effectRef>
+      <a:fontRef idx="minor"/>
+    </dgm:style>
+  </dgm:styleLbl>
+  <dgm:styleLbl name="alignAccFollowNode1">
+    <dgm:scene3d>
+      <a:camera prst="orthographicFront"/>
+      <a:lightRig rig="threePt" dir="t"/>
+    </dgm:scene3d>
+    <dgm:sp3d/>
+    <dgm:txPr/>
+    <dgm:style>
+      <a:lnRef idx="2">
+        <a:scrgbClr r="0" g="0" b="0"/>
+      </a:lnRef>
+      <a:fillRef idx="1">
+        <a:scrgbClr r="0" g="0" b="0"/>
+      </a:fillRef>
+      <a:effectRef idx="0">
+        <a:scrgbClr r="0" g="0" b="0"/>
+      </a:effectRef>
+      <a:fontRef idx="minor"/>
+    </dgm:style>
+  </dgm:styleLbl>
+  <dgm:styleLbl name="bgAccFollowNode1">
+    <dgm:scene3d>
+      <a:camera prst="orthographicFront"/>
+      <a:lightRig rig="threePt" dir="t"/>
+    </dgm:scene3d>
+    <dgm:sp3d/>
+    <dgm:txPr/>
+    <dgm:style>
+      <a:lnRef idx="2">
+        <a:scrgbClr r="0" g="0" b="0"/>
+      </a:lnRef>
+      <a:fillRef idx="1">
+        <a:scrgbClr r="0" g="0" b="0"/>
+      </a:fillRef>
+      <a:effectRef idx="0">
+        <a:scrgbClr r="0" g="0" b="0"/>
+      </a:effectRef>
+      <a:fontRef idx="minor"/>
+    </dgm:style>
+  </dgm:styleLbl>
+  <dgm:styleLbl name="fgAcc0">
+    <dgm:scene3d>
+      <a:camera prst="orthographicFront"/>
+      <a:lightRig rig="threePt" dir="t"/>
+    </dgm:scene3d>
+    <dgm:sp3d/>
+    <dgm:txPr/>
+    <dgm:style>
+      <a:lnRef idx="2">
+        <a:scrgbClr r="0" g="0" b="0"/>
+      </a:lnRef>
+      <a:fillRef idx="1">
+        <a:scrgbClr r="0" g="0" b="0"/>
+      </a:fillRef>
+      <a:effectRef idx="0">
+        <a:scrgbClr r="0" g="0" b="0"/>
+      </a:effectRef>
+      <a:fontRef idx="minor"/>
+    </dgm:style>
+  </dgm:styleLbl>
+  <dgm:styleLbl name="fgAcc2">
+    <dgm:scene3d>
+      <a:camera prst="orthographicFront"/>
+      <a:lightRig rig="threePt" dir="t"/>
+    </dgm:scene3d>
+    <dgm:sp3d/>
+    <dgm:txPr/>
+    <dgm:style>
+      <a:lnRef idx="2">
+        <a:scrgbClr r="0" g="0" b="0"/>
+      </a:lnRef>
+      <a:fillRef idx="1">
+        <a:scrgbClr r="0" g="0" b="0"/>
+      </a:fillRef>
+      <a:effectRef idx="0">
+        <a:scrgbClr r="0" g="0" b="0"/>
+      </a:effectRef>
+      <a:fontRef idx="minor"/>
+    </dgm:style>
+  </dgm:styleLbl>
+  <dgm:styleLbl name="fgAcc3">
+    <dgm:scene3d>
+      <a:camera prst="orthographicFront"/>
+      <a:lightRig rig="threePt" dir="t"/>
+    </dgm:scene3d>
+    <dgm:sp3d/>
+    <dgm:txPr/>
+    <dgm:style>
+      <a:lnRef idx="2">
+        <a:scrgbClr r="0" g="0" b="0"/>
+      </a:lnRef>
+      <a:fillRef idx="1">
+        <a:scrgbClr r="0" g="0" b="0"/>
+      </a:fillRef>
+      <a:effectRef idx="0">
+        <a:scrgbClr r="0" g="0" b="0"/>
+      </a:effectRef>
+      <a:fontRef idx="minor"/>
+    </dgm:style>
+  </dgm:styleLbl>
+  <dgm:styleLbl name="fgAcc4">
+    <dgm:scene3d>
+      <a:camera prst="orthographicFront"/>
+      <a:lightRig rig="threePt" dir="t"/>
+    </dgm:scene3d>
+    <dgm:sp3d/>
+    <dgm:txPr/>
+    <dgm:style>
+      <a:lnRef idx="2">
+        <a:scrgbClr r="0" g="0" b="0"/>
+      </a:lnRef>
+      <a:fillRef idx="1">
+        <a:scrgbClr r="0" g="0" b="0"/>
+      </a:fillRef>
+      <a:effectRef idx="0">
+        <a:scrgbClr r="0" g="0" b="0"/>
+      </a:effectRef>
+      <a:fontRef idx="minor"/>
+    </dgm:style>
+  </dgm:styleLbl>
+  <dgm:styleLbl name="bgShp">
+    <dgm:scene3d>
+      <a:camera prst="orthographicFront"/>
+      <a:lightRig rig="threePt" dir="t"/>
+    </dgm:scene3d>
+    <dgm:sp3d/>
+    <dgm:txPr/>
+    <dgm:style>
+      <a:lnRef idx="0">
+        <a:scrgbClr r="0" g="0" b="0"/>
+      </a:lnRef>
+      <a:fillRef idx="1">
+        <a:scrgbClr r="0" g="0" b="0"/>
+      </a:fillRef>
+      <a:effectRef idx="0">
+        <a:scrgbClr r="0" g="0" b="0"/>
+      </a:effectRef>
+      <a:fontRef idx="minor"/>
+    </dgm:style>
+  </dgm:styleLbl>
+  <dgm:styleLbl name="dkBgShp">
+    <dgm:scene3d>
+      <a:camera prst="orthographicFront"/>
+      <a:lightRig rig="threePt" dir="t"/>
+    </dgm:scene3d>
+    <dgm:sp3d/>
+    <dgm:txPr/>
+    <dgm:style>
+      <a:lnRef idx="0">
+        <a:scrgbClr r="0" g="0" b="0"/>
+      </a:lnRef>
+      <a:fillRef idx="1">
+        <a:scrgbClr r="0" g="0" b="0"/>
+      </a:fillRef>
+      <a:effectRef idx="0">
+        <a:scrgbClr r="0" g="0" b="0"/>
+      </a:effectRef>
+      <a:fontRef idx="minor"/>
+    </dgm:style>
+  </dgm:styleLbl>
+  <dgm:styleLbl name="trBgShp">
+    <dgm:scene3d>
+      <a:camera prst="orthographicFront"/>
+      <a:lightRig rig="threePt" dir="t"/>
+    </dgm:scene3d>
+    <dgm:sp3d/>
+    <dgm:txPr/>
+    <dgm:style>
+      <a:lnRef idx="0">
+        <a:scrgbClr r="0" g="0" b="0"/>
+      </a:lnRef>
+      <a:fillRef idx="1">
+        <a:scrgbClr r="0" g="0" b="0"/>
+      </a:fillRef>
+      <a:effectRef idx="0">
+        <a:scrgbClr r="0" g="0" b="0"/>
+      </a:effectRef>
+      <a:fontRef idx="minor"/>
+    </dgm:style>
+  </dgm:styleLbl>
+  <dgm:styleLbl name="fgShp">
+    <dgm:scene3d>
+      <a:camera prst="orthographicFront"/>
+      <a:lightRig rig="threePt" dir="t"/>
+    </dgm:scene3d>
+    <dgm:sp3d/>
+    <dgm:txPr/>
+    <dgm:style>
+      <a:lnRef idx="2">
+        <a:scrgbClr r="0" g="0" b="0"/>
+      </a:lnRef>
+      <a:fillRef idx="1">
+        <a:scrgbClr r="0" g="0" b="0"/>
+      </a:fillRef>
+      <a:effectRef idx="0">
+        <a:scrgbClr r="0" g="0" b="0"/>
+      </a:effectRef>
+      <a:fontRef idx="minor"/>
+    </dgm:style>
+  </dgm:styleLbl>
+  <dgm:styleLbl name="revTx">
+    <dgm:scene3d>
+      <a:camera prst="orthographicFront"/>
+      <a:lightRig rig="threePt" dir="t"/>
+    </dgm:scene3d>
+    <dgm:sp3d/>
+    <dgm:txPr/>
+    <dgm:style>
+      <a:lnRef idx="0">
+        <a:scrgbClr r="0" g="0" b="0"/>
+      </a:lnRef>
+      <a:fillRef idx="0">
+        <a:scrgbClr r="0" g="0" b="0"/>
+      </a:fillRef>
+      <a:effectRef idx="0">
+        <a:scrgbClr r="0" g="0" b="0"/>
+      </a:effectRef>
+      <a:fontRef idx="minor"/>
+    </dgm:style>
+  </dgm:styleLbl>
+</dgm:styleDef>
+</file>
+
 <file path=ppt/slideLayouts/slideLayout1.xml><?xml version="1.0" encoding="utf-8"?>
 <p:sldLayout xmlns:a="http://schemas.openxmlformats.org/drawingml/2006/main" xmlns:r="http://schemas.openxmlformats.org/officeDocument/2006/relationships" xmlns:p="http://schemas.openxmlformats.org/presentationml/2006/main" type="title" preserve="1">
   <p:cSld name="Title Slide">
@@ -2920,7 +6350,7 @@
               </a14:hiddenLine>
             </a:ext>
             <a:ext uri="{FAA26D3D-D897-4be2-8F04-BA451C77F1D7}">
-              <ma14:placeholderFlag xmlns:ma14="http://schemas.microsoft.com/office/mac/drawingml/2011/main" xmlns="" val="1"/>
+              <ma14:placeholderFlag xmlns="" xmlns:ma14="http://schemas.microsoft.com/office/mac/drawingml/2011/main" val="1"/>
             </a:ext>
           </a:extLst>
         </p:spPr>
@@ -2981,7 +6411,7 @@
               </a14:hiddenLine>
             </a:ext>
             <a:ext uri="{FAA26D3D-D897-4be2-8F04-BA451C77F1D7}">
-              <ma14:placeholderFlag xmlns:ma14="http://schemas.microsoft.com/office/mac/drawingml/2011/main" xmlns="" val="1"/>
+              <ma14:placeholderFlag xmlns="" xmlns:ma14="http://schemas.microsoft.com/office/mac/drawingml/2011/main" val="1"/>
             </a:ext>
           </a:extLst>
         </p:spPr>
@@ -4029,8 +7459,8 @@
         </p:nvSpPr>
         <p:spPr bwMode="auto">
           <a:xfrm>
-            <a:off x="10729614" y="2368886"/>
-            <a:ext cx="4224731" cy="7969321"/>
+            <a:off x="10729615" y="2368886"/>
+            <a:ext cx="4224730" cy="7969321"/>
           </a:xfrm>
           <a:prstGeom prst="rect">
             <a:avLst/>
@@ -4285,7 +7715,14 @@
             <a:pPr eaLnBrk="1" hangingPunct="1"/>
             <a:r>
               <a:rPr lang="en-GB" altLang="x-none" sz="2000" dirty="0"/>
-              <a:t>Video of the project working</a:t>
+              <a:t>INSERT VIDEO HERE</a:t>
+            </a:r>
+          </a:p>
+          <a:p>
+            <a:pPr eaLnBrk="1" hangingPunct="1"/>
+            <a:r>
+              <a:rPr lang="en-GB" altLang="x-none" sz="2000"/>
+              <a:t>SAVING THIS UNTIL A BIT LATER</a:t>
             </a:r>
             <a:endParaRPr lang="x-none" altLang="x-none" sz="2000" dirty="0"/>
           </a:p>
@@ -4680,8 +8117,8 @@
         </p:nvSpPr>
         <p:spPr bwMode="auto">
           <a:xfrm>
-            <a:off x="168181" y="2368886"/>
-            <a:ext cx="10393254" cy="1820734"/>
+            <a:off x="168181" y="2368885"/>
+            <a:ext cx="10393254" cy="1872000"/>
           </a:xfrm>
           <a:prstGeom prst="rect">
             <a:avLst/>
@@ -4802,16 +8239,75 @@
             <a:pPr eaLnBrk="1" hangingPunct="1"/>
             <a:r>
               <a:rPr lang="en-GB" altLang="x-none" sz="2000" dirty="0"/>
-              <a:t>Short </a:t>
+              <a:t>A piece of software aimed at replacing normal door signs with an interactive</a:t>
             </a:r>
+            <a:br>
+              <a:rPr lang="en-GB" altLang="x-none" sz="2000" dirty="0"/>
+            </a:br>
             <a:r>
-              <a:rPr lang="en-GB" altLang="x-none" sz="2000"/>
-              <a:t>project description, app logo</a:t>
+              <a:rPr lang="en-GB" altLang="x-none" sz="2000" dirty="0"/>
+              <a:t>user interface that provides a range of functionalities.</a:t>
+            </a:r>
+            <a:br>
+              <a:rPr lang="en-GB" altLang="x-none" sz="2000" dirty="0"/>
+            </a:br>
+            <a:r>
+              <a:rPr lang="en-GB" altLang="x-none" sz="2000" dirty="0"/>
+              <a:t>The users are able to provide people at their door with availability, location,</a:t>
+            </a:r>
+            <a:br>
+              <a:rPr lang="en-GB" altLang="x-none" sz="2000" dirty="0"/>
+            </a:br>
+            <a:r>
+              <a:rPr lang="en-GB" altLang="x-none" sz="2000" dirty="0"/>
+              <a:t>general information, messaging, calling and booking meetings.</a:t>
+            </a:r>
+            <a:br>
+              <a:rPr lang="en-GB" altLang="x-none" sz="2000" dirty="0"/>
+            </a:br>
+            <a:r>
+              <a:rPr lang="en-GB" altLang="x-none" sz="2000" dirty="0"/>
+              <a:t>It was initially design to be used in school setting, but can be used in most</a:t>
+            </a:r>
+            <a:br>
+              <a:rPr lang="en-GB" altLang="x-none" sz="2000" dirty="0"/>
+            </a:br>
+            <a:r>
+              <a:rPr lang="en-GB" altLang="x-none" sz="2000" dirty="0"/>
+              <a:t>work spaces that has offices and needs a modern way to manage them.</a:t>
             </a:r>
             <a:endParaRPr lang="x-none" altLang="x-none" sz="2000" dirty="0"/>
           </a:p>
         </p:txBody>
       </p:sp>
+      <p:graphicFrame>
+        <p:nvGraphicFramePr>
+          <p:cNvPr id="8" name="Diagram 7">
+            <a:extLst>
+              <a:ext uri="{FF2B5EF4-FFF2-40B4-BE49-F238E27FC236}">
+                <a16:creationId xmlns:a16="http://schemas.microsoft.com/office/drawing/2014/main" id="{237E631B-AB66-4D7B-A9A4-4873AF3E83A6}"/>
+              </a:ext>
+            </a:extLst>
+          </p:cNvPr>
+          <p:cNvGraphicFramePr/>
+          <p:nvPr>
+            <p:extLst>
+              <p:ext uri="{D42A27DB-BD31-4B8C-83A1-F6EECF244321}">
+                <p14:modId xmlns:p14="http://schemas.microsoft.com/office/powerpoint/2010/main" val="2097206657"/>
+              </p:ext>
+            </p:extLst>
+          </p:nvPr>
+        </p:nvGraphicFramePr>
+        <p:xfrm>
+          <a:off x="8862717" y="2512164"/>
+          <a:ext cx="1512735" cy="1502407"/>
+        </p:xfrm>
+        <a:graphic>
+          <a:graphicData uri="http://schemas.openxmlformats.org/drawingml/2006/diagram">
+            <dgm:relIds xmlns:dgm="http://schemas.openxmlformats.org/drawingml/2006/diagram" xmlns:r="http://schemas.openxmlformats.org/officeDocument/2006/relationships" r:dm="rId10" r:lo="rId11" r:qs="rId12" r:cs="rId13"/>
+          </a:graphicData>
+        </a:graphic>
+      </p:graphicFrame>
     </p:spTree>
   </p:cSld>
   <p:clrMapOvr>

</xml_diff>

<commit_message>
updated CE301 Open Day Poster Template.pptx and added abstract.md
</commit_message>
<xml_diff>
--- a/docs/open_day/CE301 Open Day Poster Template.pptx
+++ b/docs/open_day/CE301 Open Day Poster Template.pptx
@@ -4,6 +4,9 @@
   <p:sldMasterIdLst>
     <p:sldMasterId id="2147483648" r:id="rId3"/>
   </p:sldMasterIdLst>
+  <p:notesMasterIdLst>
+    <p:notesMasterId r:id="rId5"/>
+  </p:notesMasterIdLst>
   <p:sldIdLst>
     <p:sldId id="256" r:id="rId4"/>
   </p:sldIdLst>
@@ -1092,7 +1095,7 @@
         <a:bodyPr/>
         <a:lstStyle/>
         <a:p>
-          <a:endParaRPr lang="en-GB"/>
+          <a:endParaRPr lang="en-GB" dirty="0"/>
         </a:p>
       </dgm:t>
     </dgm:pt>
@@ -1162,7 +1165,7 @@
       <dgm:spPr/>
     </dgm:pt>
     <dgm:pt modelId="{02F3159F-24CA-441C-8E10-201DBADB7D24}" type="pres">
-      <dgm:prSet presAssocID="{ECFA26F9-B486-42B0-AF67-F6B79A5432CB}" presName="pictureRepeatNode" presStyleLbl="alignImgPlace1" presStyleIdx="0" presStyleCnt="1" custScaleX="200000" custScaleY="198635" custLinFactNeighborX="804" custLinFactNeighborY="699"/>
+      <dgm:prSet presAssocID="{ECFA26F9-B486-42B0-AF67-F6B79A5432CB}" presName="pictureRepeatNode" presStyleLbl="alignImgPlace1" presStyleIdx="0" presStyleCnt="1" custScaleX="200000" custScaleY="198635" custLinFactNeighborX="35196" custLinFactNeighborY="-18962"/>
       <dgm:spPr/>
     </dgm:pt>
     <dgm:pt modelId="{4EB9D189-E9A7-4CBC-9546-1109F11EA9D3}" type="pres">
@@ -1188,7 +1191,7 @@
   <dgm:whole/>
   <dgm:extLst>
     <a:ext uri="http://schemas.microsoft.com/office/drawing/2008/diagram">
-      <dsp:dataModelExt xmlns:dsp="http://schemas.microsoft.com/office/drawing/2008/diagram" relId="rId14" minVer="http://schemas.openxmlformats.org/drawingml/2006/diagram"/>
+      <dsp:dataModelExt xmlns:dsp="http://schemas.microsoft.com/office/drawing/2008/diagram" relId="rId8" minVer="http://schemas.openxmlformats.org/drawingml/2006/diagram"/>
     </a:ext>
   </dgm:extLst>
 </dgm:dataModel>
@@ -1209,8 +1212,8 @@
       </dsp:nvSpPr>
       <dsp:spPr>
         <a:xfrm>
-          <a:off x="0" y="-1"/>
-          <a:ext cx="1512735" cy="1502410"/>
+          <a:off x="0" y="-9378"/>
+          <a:ext cx="1126717" cy="1119027"/>
         </a:xfrm>
         <a:prstGeom prst="ellipse">
           <a:avLst/>
@@ -1261,8 +1264,8 @@
       </dsp:nvSpPr>
       <dsp:spPr>
         <a:xfrm>
-          <a:off x="514329" y="774650"/>
-          <a:ext cx="484075" cy="249601"/>
+          <a:off x="383083" y="567599"/>
+          <a:ext cx="360549" cy="185908"/>
         </a:xfrm>
         <a:prstGeom prst="rect">
           <a:avLst/>
@@ -1295,7 +1298,7 @@
         </a:bodyPr>
         <a:lstStyle/>
         <a:p>
-          <a:pPr marL="0" lvl="0" indent="0" algn="ctr" defTabSz="666750">
+          <a:pPr marL="0" lvl="0" indent="0" algn="ctr" defTabSz="488950">
             <a:lnSpc>
               <a:spcPct val="90000"/>
             </a:lnSpc>
@@ -1307,12 +1310,12 @@
             </a:spcAft>
             <a:buNone/>
           </a:pPr>
-          <a:endParaRPr lang="en-GB" sz="1500" kern="1200"/>
+          <a:endParaRPr lang="en-GB" sz="1100" kern="1200" dirty="0"/>
         </a:p>
       </dsp:txBody>
       <dsp:txXfrm>
-        <a:off x="514329" y="774650"/>
-        <a:ext cx="484075" cy="249601"/>
+        <a:off x="383083" y="567599"/>
+        <a:ext cx="360549" cy="185908"/>
       </dsp:txXfrm>
     </dsp:sp>
   </dsp:spTree>
@@ -3761,6 +3764,440 @@
 </dgm:styleDef>
 </file>
 
+<file path=ppt/notesMasters/notesMaster1.xml><?xml version="1.0" encoding="utf-8"?>
+<p:notesMaster xmlns:a="http://schemas.openxmlformats.org/drawingml/2006/main" xmlns:r="http://schemas.openxmlformats.org/officeDocument/2006/relationships" xmlns:p="http://schemas.openxmlformats.org/presentationml/2006/main">
+  <p:cSld>
+    <p:bg>
+      <p:bgRef idx="1001">
+        <a:schemeClr val="bg1"/>
+      </p:bgRef>
+    </p:bg>
+    <p:spTree>
+      <p:nvGrpSpPr>
+        <p:cNvPr id="1" name=""/>
+        <p:cNvGrpSpPr/>
+        <p:nvPr/>
+      </p:nvGrpSpPr>
+      <p:grpSpPr>
+        <a:xfrm>
+          <a:off x="0" y="0"/>
+          <a:ext cx="0" cy="0"/>
+          <a:chOff x="0" y="0"/>
+          <a:chExt cx="0" cy="0"/>
+        </a:xfrm>
+      </p:grpSpPr>
+      <p:sp>
+        <p:nvSpPr>
+          <p:cNvPr id="2" name="Header Placeholder 1"/>
+          <p:cNvSpPr>
+            <a:spLocks noGrp="1"/>
+          </p:cNvSpPr>
+          <p:nvPr>
+            <p:ph type="hdr" sz="quarter"/>
+          </p:nvPr>
+        </p:nvSpPr>
+        <p:spPr>
+          <a:xfrm>
+            <a:off x="0" y="0"/>
+            <a:ext cx="9069388" cy="1495425"/>
+          </a:xfrm>
+          <a:prstGeom prst="rect">
+            <a:avLst/>
+          </a:prstGeom>
+        </p:spPr>
+        <p:txBody>
+          <a:bodyPr vert="horz" lIns="91440" tIns="45720" rIns="91440" bIns="45720" rtlCol="0"/>
+          <a:lstStyle>
+            <a:lvl1pPr algn="l">
+              <a:defRPr sz="1200"/>
+            </a:lvl1pPr>
+          </a:lstStyle>
+          <a:p>
+            <a:endParaRPr lang="en-GB"/>
+          </a:p>
+        </p:txBody>
+      </p:sp>
+      <p:sp>
+        <p:nvSpPr>
+          <p:cNvPr id="3" name="Date Placeholder 2"/>
+          <p:cNvSpPr>
+            <a:spLocks noGrp="1"/>
+          </p:cNvSpPr>
+          <p:nvPr>
+            <p:ph type="dt" idx="1"/>
+          </p:nvPr>
+        </p:nvSpPr>
+        <p:spPr>
+          <a:xfrm>
+            <a:off x="11855450" y="0"/>
+            <a:ext cx="9069388" cy="1495425"/>
+          </a:xfrm>
+          <a:prstGeom prst="rect">
+            <a:avLst/>
+          </a:prstGeom>
+        </p:spPr>
+        <p:txBody>
+          <a:bodyPr vert="horz" lIns="91440" tIns="45720" rIns="91440" bIns="45720" rtlCol="0"/>
+          <a:lstStyle>
+            <a:lvl1pPr algn="r">
+              <a:defRPr sz="1200"/>
+            </a:lvl1pPr>
+          </a:lstStyle>
+          <a:p>
+            <a:fld id="{6823682D-4EC1-4460-9FEF-F862992620B6}" type="datetimeFigureOut">
+              <a:rPr lang="en-GB" smtClean="0"/>
+              <a:t>28/02/2022</a:t>
+            </a:fld>
+            <a:endParaRPr lang="en-GB"/>
+          </a:p>
+        </p:txBody>
+      </p:sp>
+      <p:sp>
+        <p:nvSpPr>
+          <p:cNvPr id="4" name="Slide Image Placeholder 3"/>
+          <p:cNvSpPr>
+            <a:spLocks noGrp="1" noRot="1" noChangeAspect="1"/>
+          </p:cNvSpPr>
+          <p:nvPr>
+            <p:ph type="sldImg" idx="2"/>
+          </p:nvPr>
+        </p:nvSpPr>
+        <p:spPr>
+          <a:xfrm>
+            <a:off x="3348038" y="3727450"/>
+            <a:ext cx="14233525" cy="10064750"/>
+          </a:xfrm>
+          <a:prstGeom prst="rect">
+            <a:avLst/>
+          </a:prstGeom>
+          <a:noFill/>
+          <a:ln w="12700">
+            <a:solidFill>
+              <a:prstClr val="black"/>
+            </a:solidFill>
+          </a:ln>
+        </p:spPr>
+        <p:txBody>
+          <a:bodyPr vert="horz" lIns="91440" tIns="45720" rIns="91440" bIns="45720" rtlCol="0" anchor="ctr"/>
+          <a:lstStyle/>
+          <a:p>
+            <a:endParaRPr lang="en-GB"/>
+          </a:p>
+        </p:txBody>
+      </p:sp>
+      <p:sp>
+        <p:nvSpPr>
+          <p:cNvPr id="5" name="Notes Placeholder 4"/>
+          <p:cNvSpPr>
+            <a:spLocks noGrp="1"/>
+          </p:cNvSpPr>
+          <p:nvPr>
+            <p:ph type="body" sz="quarter" idx="3"/>
+          </p:nvPr>
+        </p:nvSpPr>
+        <p:spPr>
+          <a:xfrm>
+            <a:off x="2092325" y="14351000"/>
+            <a:ext cx="16744950" cy="11741150"/>
+          </a:xfrm>
+          <a:prstGeom prst="rect">
+            <a:avLst/>
+          </a:prstGeom>
+        </p:spPr>
+        <p:txBody>
+          <a:bodyPr vert="horz" lIns="91440" tIns="45720" rIns="91440" bIns="45720" rtlCol="0"/>
+          <a:lstStyle/>
+          <a:p>
+            <a:pPr lvl="0"/>
+            <a:r>
+              <a:rPr lang="en-US"/>
+              <a:t>Click to edit Master text styles</a:t>
+            </a:r>
+          </a:p>
+          <a:p>
+            <a:pPr lvl="1"/>
+            <a:r>
+              <a:rPr lang="en-US"/>
+              <a:t>Second level</a:t>
+            </a:r>
+          </a:p>
+          <a:p>
+            <a:pPr lvl="2"/>
+            <a:r>
+              <a:rPr lang="en-US"/>
+              <a:t>Third level</a:t>
+            </a:r>
+          </a:p>
+          <a:p>
+            <a:pPr lvl="3"/>
+            <a:r>
+              <a:rPr lang="en-US"/>
+              <a:t>Fourth level</a:t>
+            </a:r>
+          </a:p>
+          <a:p>
+            <a:pPr lvl="4"/>
+            <a:r>
+              <a:rPr lang="en-US"/>
+              <a:t>Fifth level</a:t>
+            </a:r>
+            <a:endParaRPr lang="en-GB"/>
+          </a:p>
+        </p:txBody>
+      </p:sp>
+      <p:sp>
+        <p:nvSpPr>
+          <p:cNvPr id="6" name="Footer Placeholder 5"/>
+          <p:cNvSpPr>
+            <a:spLocks noGrp="1"/>
+          </p:cNvSpPr>
+          <p:nvPr>
+            <p:ph type="ftr" sz="quarter" idx="4"/>
+          </p:nvPr>
+        </p:nvSpPr>
+        <p:spPr>
+          <a:xfrm>
+            <a:off x="0" y="28324175"/>
+            <a:ext cx="9069388" cy="1495425"/>
+          </a:xfrm>
+          <a:prstGeom prst="rect">
+            <a:avLst/>
+          </a:prstGeom>
+        </p:spPr>
+        <p:txBody>
+          <a:bodyPr vert="horz" lIns="91440" tIns="45720" rIns="91440" bIns="45720" rtlCol="0" anchor="b"/>
+          <a:lstStyle>
+            <a:lvl1pPr algn="l">
+              <a:defRPr sz="1200"/>
+            </a:lvl1pPr>
+          </a:lstStyle>
+          <a:p>
+            <a:endParaRPr lang="en-GB"/>
+          </a:p>
+        </p:txBody>
+      </p:sp>
+      <p:sp>
+        <p:nvSpPr>
+          <p:cNvPr id="7" name="Slide Number Placeholder 6"/>
+          <p:cNvSpPr>
+            <a:spLocks noGrp="1"/>
+          </p:cNvSpPr>
+          <p:nvPr>
+            <p:ph type="sldNum" sz="quarter" idx="5"/>
+          </p:nvPr>
+        </p:nvSpPr>
+        <p:spPr>
+          <a:xfrm>
+            <a:off x="11855450" y="28324175"/>
+            <a:ext cx="9069388" cy="1495425"/>
+          </a:xfrm>
+          <a:prstGeom prst="rect">
+            <a:avLst/>
+          </a:prstGeom>
+        </p:spPr>
+        <p:txBody>
+          <a:bodyPr vert="horz" lIns="91440" tIns="45720" rIns="91440" bIns="45720" rtlCol="0" anchor="b"/>
+          <a:lstStyle>
+            <a:lvl1pPr algn="r">
+              <a:defRPr sz="1200"/>
+            </a:lvl1pPr>
+          </a:lstStyle>
+          <a:p>
+            <a:fld id="{846537D3-7CEF-40E9-ADAF-A04FAA841C8A}" type="slidenum">
+              <a:rPr lang="en-GB" smtClean="0"/>
+              <a:t>‹#›</a:t>
+            </a:fld>
+            <a:endParaRPr lang="en-GB"/>
+          </a:p>
+        </p:txBody>
+      </p:sp>
+    </p:spTree>
+    <p:extLst>
+      <p:ext uri="{BB962C8B-B14F-4D97-AF65-F5344CB8AC3E}">
+        <p14:creationId xmlns:p14="http://schemas.microsoft.com/office/powerpoint/2010/main" val="828147366"/>
+      </p:ext>
+    </p:extLst>
+  </p:cSld>
+  <p:clrMap bg1="lt1" tx1="dk1" bg2="lt2" tx2="dk2" accent1="accent1" accent2="accent2" accent3="accent3" accent4="accent4" accent5="accent5" accent6="accent6" hlink="hlink" folHlink="folHlink"/>
+  <p:notesStyle>
+    <a:lvl1pPr marL="0" algn="l" defTabSz="914400" rtl="0" eaLnBrk="1" latinLnBrk="0" hangingPunct="1">
+      <a:defRPr sz="1200" kern="1200">
+        <a:solidFill>
+          <a:schemeClr val="tx1"/>
+        </a:solidFill>
+        <a:latin typeface="+mn-lt"/>
+        <a:ea typeface="+mn-ea"/>
+        <a:cs typeface="+mn-cs"/>
+      </a:defRPr>
+    </a:lvl1pPr>
+    <a:lvl2pPr marL="457200" algn="l" defTabSz="914400" rtl="0" eaLnBrk="1" latinLnBrk="0" hangingPunct="1">
+      <a:defRPr sz="1200" kern="1200">
+        <a:solidFill>
+          <a:schemeClr val="tx1"/>
+        </a:solidFill>
+        <a:latin typeface="+mn-lt"/>
+        <a:ea typeface="+mn-ea"/>
+        <a:cs typeface="+mn-cs"/>
+      </a:defRPr>
+    </a:lvl2pPr>
+    <a:lvl3pPr marL="914400" algn="l" defTabSz="914400" rtl="0" eaLnBrk="1" latinLnBrk="0" hangingPunct="1">
+      <a:defRPr sz="1200" kern="1200">
+        <a:solidFill>
+          <a:schemeClr val="tx1"/>
+        </a:solidFill>
+        <a:latin typeface="+mn-lt"/>
+        <a:ea typeface="+mn-ea"/>
+        <a:cs typeface="+mn-cs"/>
+      </a:defRPr>
+    </a:lvl3pPr>
+    <a:lvl4pPr marL="1371600" algn="l" defTabSz="914400" rtl="0" eaLnBrk="1" latinLnBrk="0" hangingPunct="1">
+      <a:defRPr sz="1200" kern="1200">
+        <a:solidFill>
+          <a:schemeClr val="tx1"/>
+        </a:solidFill>
+        <a:latin typeface="+mn-lt"/>
+        <a:ea typeface="+mn-ea"/>
+        <a:cs typeface="+mn-cs"/>
+      </a:defRPr>
+    </a:lvl4pPr>
+    <a:lvl5pPr marL="1828800" algn="l" defTabSz="914400" rtl="0" eaLnBrk="1" latinLnBrk="0" hangingPunct="1">
+      <a:defRPr sz="1200" kern="1200">
+        <a:solidFill>
+          <a:schemeClr val="tx1"/>
+        </a:solidFill>
+        <a:latin typeface="+mn-lt"/>
+        <a:ea typeface="+mn-ea"/>
+        <a:cs typeface="+mn-cs"/>
+      </a:defRPr>
+    </a:lvl5pPr>
+    <a:lvl6pPr marL="2286000" algn="l" defTabSz="914400" rtl="0" eaLnBrk="1" latinLnBrk="0" hangingPunct="1">
+      <a:defRPr sz="1200" kern="1200">
+        <a:solidFill>
+          <a:schemeClr val="tx1"/>
+        </a:solidFill>
+        <a:latin typeface="+mn-lt"/>
+        <a:ea typeface="+mn-ea"/>
+        <a:cs typeface="+mn-cs"/>
+      </a:defRPr>
+    </a:lvl6pPr>
+    <a:lvl7pPr marL="2743200" algn="l" defTabSz="914400" rtl="0" eaLnBrk="1" latinLnBrk="0" hangingPunct="1">
+      <a:defRPr sz="1200" kern="1200">
+        <a:solidFill>
+          <a:schemeClr val="tx1"/>
+        </a:solidFill>
+        <a:latin typeface="+mn-lt"/>
+        <a:ea typeface="+mn-ea"/>
+        <a:cs typeface="+mn-cs"/>
+      </a:defRPr>
+    </a:lvl7pPr>
+    <a:lvl8pPr marL="3200400" algn="l" defTabSz="914400" rtl="0" eaLnBrk="1" latinLnBrk="0" hangingPunct="1">
+      <a:defRPr sz="1200" kern="1200">
+        <a:solidFill>
+          <a:schemeClr val="tx1"/>
+        </a:solidFill>
+        <a:latin typeface="+mn-lt"/>
+        <a:ea typeface="+mn-ea"/>
+        <a:cs typeface="+mn-cs"/>
+      </a:defRPr>
+    </a:lvl8pPr>
+    <a:lvl9pPr marL="3657600" algn="l" defTabSz="914400" rtl="0" eaLnBrk="1" latinLnBrk="0" hangingPunct="1">
+      <a:defRPr sz="1200" kern="1200">
+        <a:solidFill>
+          <a:schemeClr val="tx1"/>
+        </a:solidFill>
+        <a:latin typeface="+mn-lt"/>
+        <a:ea typeface="+mn-ea"/>
+        <a:cs typeface="+mn-cs"/>
+      </a:defRPr>
+    </a:lvl9pPr>
+  </p:notesStyle>
+</p:notesMaster>
+</file>
+
+<file path=ppt/notesSlides/notesSlide1.xml><?xml version="1.0" encoding="utf-8"?>
+<p:notes xmlns:a="http://schemas.openxmlformats.org/drawingml/2006/main" xmlns:r="http://schemas.openxmlformats.org/officeDocument/2006/relationships" xmlns:p="http://schemas.openxmlformats.org/presentationml/2006/main">
+  <p:cSld>
+    <p:spTree>
+      <p:nvGrpSpPr>
+        <p:cNvPr id="1" name=""/>
+        <p:cNvGrpSpPr/>
+        <p:nvPr/>
+      </p:nvGrpSpPr>
+      <p:grpSpPr>
+        <a:xfrm>
+          <a:off x="0" y="0"/>
+          <a:ext cx="0" cy="0"/>
+          <a:chOff x="0" y="0"/>
+          <a:chExt cx="0" cy="0"/>
+        </a:xfrm>
+      </p:grpSpPr>
+      <p:sp>
+        <p:nvSpPr>
+          <p:cNvPr id="2" name="Slide Image Placeholder 1"/>
+          <p:cNvSpPr>
+            <a:spLocks noGrp="1" noRot="1" noChangeAspect="1"/>
+          </p:cNvSpPr>
+          <p:nvPr>
+            <p:ph type="sldImg"/>
+          </p:nvPr>
+        </p:nvSpPr>
+        <p:spPr/>
+      </p:sp>
+      <p:sp>
+        <p:nvSpPr>
+          <p:cNvPr id="3" name="Notes Placeholder 2"/>
+          <p:cNvSpPr>
+            <a:spLocks noGrp="1"/>
+          </p:cNvSpPr>
+          <p:nvPr>
+            <p:ph type="body" idx="1"/>
+          </p:nvPr>
+        </p:nvSpPr>
+        <p:spPr/>
+        <p:txBody>
+          <a:bodyPr/>
+          <a:lstStyle/>
+          <a:p>
+            <a:endParaRPr lang="en-GB" dirty="0"/>
+          </a:p>
+        </p:txBody>
+      </p:sp>
+      <p:sp>
+        <p:nvSpPr>
+          <p:cNvPr id="4" name="Slide Number Placeholder 3"/>
+          <p:cNvSpPr>
+            <a:spLocks noGrp="1"/>
+          </p:cNvSpPr>
+          <p:nvPr>
+            <p:ph type="sldNum" sz="quarter" idx="5"/>
+          </p:nvPr>
+        </p:nvSpPr>
+        <p:spPr/>
+        <p:txBody>
+          <a:bodyPr/>
+          <a:lstStyle/>
+          <a:p>
+            <a:fld id="{846537D3-7CEF-40E9-ADAF-A04FAA841C8A}" type="slidenum">
+              <a:rPr lang="en-GB" smtClean="0"/>
+              <a:t>1</a:t>
+            </a:fld>
+            <a:endParaRPr lang="en-GB"/>
+          </a:p>
+        </p:txBody>
+      </p:sp>
+    </p:spTree>
+    <p:extLst>
+      <p:ext uri="{BB962C8B-B14F-4D97-AF65-F5344CB8AC3E}">
+        <p14:creationId xmlns:p14="http://schemas.microsoft.com/office/powerpoint/2010/main" val="3589135347"/>
+      </p:ext>
+    </p:extLst>
+  </p:cSld>
+  <p:clrMapOvr>
+    <a:masterClrMapping/>
+  </p:clrMapOvr>
+</p:notes>
+</file>
+
 <file path=ppt/slideLayouts/slideLayout1.xml><?xml version="1.0" encoding="utf-8"?>
 <p:sldLayout xmlns:a="http://schemas.openxmlformats.org/drawingml/2006/main" xmlns:r="http://schemas.openxmlformats.org/officeDocument/2006/relationships" xmlns:p="http://schemas.openxmlformats.org/presentationml/2006/main" type="title" preserve="1">
   <p:cSld name="Title Slide">
@@ -7000,47 +7437,6 @@
           <a:chExt cx="0" cy="0"/>
         </a:xfrm>
       </p:grpSpPr>
-      <p:sp>
-        <p:nvSpPr>
-          <p:cNvPr id="2050" name="Line 15"/>
-          <p:cNvSpPr>
-            <a:spLocks noChangeShapeType="1"/>
-          </p:cNvSpPr>
-          <p:nvPr/>
-        </p:nvSpPr>
-        <p:spPr bwMode="auto">
-          <a:xfrm>
-            <a:off x="0" y="1406525"/>
-            <a:ext cx="15122525" cy="0"/>
-          </a:xfrm>
-          <a:prstGeom prst="line">
-            <a:avLst/>
-          </a:prstGeom>
-          <a:noFill/>
-          <a:ln w="114300">
-            <a:solidFill>
-              <a:srgbClr val="00FFFF"/>
-            </a:solidFill>
-            <a:round/>
-            <a:headEnd/>
-            <a:tailEnd/>
-          </a:ln>
-          <a:extLst>
-            <a:ext uri="{909E8E84-426E-40DD-AFC4-6F175D3DCCD1}">
-              <a14:hiddenFill xmlns:a14="http://schemas.microsoft.com/office/drawing/2010/main">
-                <a:noFill/>
-              </a14:hiddenFill>
-            </a:ext>
-          </a:extLst>
-        </p:spPr>
-        <p:txBody>
-          <a:bodyPr lIns="94064" tIns="47032" rIns="94064" bIns="47032"/>
-          <a:lstStyle/>
-          <a:p>
-            <a:endParaRPr lang="en-US"/>
-          </a:p>
-        </p:txBody>
-      </p:sp>
       <p:pic>
         <p:nvPicPr>
           <p:cNvPr id="2051" name="Picture 17" descr="logo large"/>
@@ -7050,7 +7446,7 @@
           <p:nvPr/>
         </p:nvPicPr>
         <p:blipFill>
-          <a:blip r:embed="rId2">
+          <a:blip r:embed="rId3">
             <a:extLst>
               <a:ext uri="{28A0092B-C50C-407E-A947-70E740481C1C}">
                 <a14:useLocalDpi xmlns:a14="http://schemas.microsoft.com/office/drawing/2010/main" val="0"/>
@@ -7105,30 +7501,27 @@
         </p:nvSpPr>
         <p:spPr bwMode="auto">
           <a:xfrm>
-            <a:off x="0" y="1425575"/>
-            <a:ext cx="15122525" cy="9267825"/>
+            <a:off x="-12700" y="1363663"/>
+            <a:ext cx="15135225" cy="10200554"/>
           </a:xfrm>
           <a:prstGeom prst="rect">
             <a:avLst/>
           </a:prstGeom>
-          <a:solidFill>
-            <a:srgbClr val="046381"/>
-          </a:solidFill>
+          <a:gradFill flip="none" rotWithShape="1">
+            <a:gsLst>
+              <a:gs pos="0">
+                <a:srgbClr val="411313"/>
+              </a:gs>
+              <a:gs pos="100000">
+                <a:srgbClr val="CF3837"/>
+              </a:gs>
+            </a:gsLst>
+            <a:lin ang="16200000" scaled="1"/>
+            <a:tileRect/>
+          </a:gradFill>
           <a:ln>
             <a:noFill/>
           </a:ln>
-          <a:extLst>
-            <a:ext uri="{91240B29-F687-4F45-9708-019B960494DF}">
-              <a14:hiddenLine xmlns:a14="http://schemas.microsoft.com/office/drawing/2010/main" w="9525">
-                <a:solidFill>
-                  <a:srgbClr val="000000"/>
-                </a:solidFill>
-                <a:miter lim="800000"/>
-                <a:headEnd/>
-                <a:tailEnd/>
-              </a14:hiddenLine>
-            </a:ext>
-          </a:extLst>
         </p:spPr>
         <p:txBody>
           <a:bodyPr wrap="none" lIns="47165" tIns="23582" rIns="47165" bIns="23582" anchor="ctr"/>
@@ -7236,60 +7629,6 @@
           </a:p>
         </p:txBody>
       </p:sp>
-      <p:pic>
-        <p:nvPicPr>
-          <p:cNvPr id="2053" name="Picture 5" descr="use RH modified.jpg"/>
-          <p:cNvPicPr>
-            <a:picLocks noChangeAspect="1"/>
-          </p:cNvPicPr>
-          <p:nvPr/>
-        </p:nvPicPr>
-        <p:blipFill>
-          <a:blip r:embed="rId3">
-            <a:extLst>
-              <a:ext uri="{28A0092B-C50C-407E-A947-70E740481C1C}">
-                <a14:useLocalDpi xmlns:a14="http://schemas.microsoft.com/office/drawing/2010/main" val="0"/>
-              </a:ext>
-            </a:extLst>
-          </a:blip>
-          <a:srcRect/>
-          <a:stretch>
-            <a:fillRect/>
-          </a:stretch>
-        </p:blipFill>
-        <p:spPr bwMode="auto">
-          <a:xfrm>
-            <a:off x="9472613" y="0"/>
-            <a:ext cx="5662612" cy="1363663"/>
-          </a:xfrm>
-          <a:prstGeom prst="rect">
-            <a:avLst/>
-          </a:prstGeom>
-          <a:noFill/>
-          <a:ln>
-            <a:noFill/>
-          </a:ln>
-          <a:extLst>
-            <a:ext uri="{909E8E84-426E-40DD-AFC4-6F175D3DCCD1}">
-              <a14:hiddenFill xmlns:a14="http://schemas.microsoft.com/office/drawing/2010/main">
-                <a:solidFill>
-                  <a:srgbClr val="FFFFFF"/>
-                </a:solidFill>
-              </a14:hiddenFill>
-            </a:ext>
-            <a:ext uri="{91240B29-F687-4F45-9708-019B960494DF}">
-              <a14:hiddenLine xmlns:a14="http://schemas.microsoft.com/office/drawing/2010/main" w="9525">
-                <a:solidFill>
-                  <a:srgbClr val="000000"/>
-                </a:solidFill>
-                <a:miter lim="800000"/>
-                <a:headEnd/>
-                <a:tailEnd/>
-              </a14:hiddenLine>
-            </a:ext>
-          </a:extLst>
-        </p:spPr>
-      </p:pic>
       <p:sp>
         <p:nvSpPr>
           <p:cNvPr id="2054" name="Text Box 6"/>
@@ -7300,7 +7639,7 @@
         </p:nvSpPr>
         <p:spPr bwMode="auto">
           <a:xfrm>
-            <a:off x="3387700" y="1618510"/>
+            <a:off x="168181" y="1626045"/>
             <a:ext cx="8116762" cy="493901"/>
           </a:xfrm>
           <a:prstGeom prst="rect">
@@ -7459,8 +7798,8 @@
         </p:nvSpPr>
         <p:spPr bwMode="auto">
           <a:xfrm>
-            <a:off x="10729615" y="2368886"/>
-            <a:ext cx="4224730" cy="7969321"/>
+            <a:off x="10699887" y="2368886"/>
+            <a:ext cx="4252519" cy="7969322"/>
           </a:xfrm>
           <a:prstGeom prst="rect">
             <a:avLst/>
@@ -7721,8 +8060,25 @@
           <a:p>
             <a:pPr eaLnBrk="1" hangingPunct="1"/>
             <a:r>
-              <a:rPr lang="en-GB" altLang="x-none" sz="2000"/>
+              <a:rPr lang="en-GB" altLang="x-none" sz="2000" dirty="0"/>
               <a:t>SAVING THIS UNTIL A BIT LATER</a:t>
+            </a:r>
+          </a:p>
+          <a:p>
+            <a:pPr eaLnBrk="1" hangingPunct="1"/>
+            <a:endParaRPr lang="en-GB" altLang="x-none" sz="2000" dirty="0"/>
+          </a:p>
+          <a:p>
+            <a:pPr eaLnBrk="1" hangingPunct="1"/>
+            <a:r>
+              <a:rPr lang="en-GB" altLang="x-none" sz="2000" dirty="0"/>
+              <a:t>SCROLLING VIEW OF TECHNOLOGIES?</a:t>
+            </a:r>
+            <a:r>
+              <a:rPr lang="en-GB" altLang="x-none" sz="2000" dirty="0">
+                <a:sym typeface="Wingdings" panose="05000000000000000000" pitchFamily="2" charset="2"/>
+              </a:rPr>
+              <a:t>     </a:t>
             </a:r>
             <a:endParaRPr lang="x-none" altLang="x-none" sz="2000" dirty="0"/>
           </a:p>
@@ -7738,8 +8094,8 @@
         </p:nvSpPr>
         <p:spPr bwMode="auto">
           <a:xfrm>
-            <a:off x="3946525" y="186213"/>
-            <a:ext cx="6999113" cy="984885"/>
+            <a:off x="5271502" y="409351"/>
+            <a:ext cx="2174579" cy="538609"/>
           </a:xfrm>
           <a:prstGeom prst="rect">
             <a:avLst/>
@@ -7874,233 +8230,12 @@
             <a:pPr algn="ctr" eaLnBrk="1" hangingPunct="1"/>
             <a:r>
               <a:rPr lang="en-GB" altLang="x-none" dirty="0"/>
-              <a:t>Digital Assistant for Staff Office Door</a:t>
-            </a:r>
-          </a:p>
-          <a:p>
-            <a:pPr algn="ctr" eaLnBrk="1" hangingPunct="1"/>
-            <a:r>
-              <a:rPr lang="en-GB" altLang="x-none" dirty="0"/>
               <a:t>DoorSine™</a:t>
             </a:r>
             <a:endParaRPr lang="en-US" altLang="x-none" dirty="0"/>
           </a:p>
         </p:txBody>
       </p:sp>
-      <p:pic>
-        <p:nvPicPr>
-          <p:cNvPr id="10" name="Picture 9" descr="Arrow&#10;&#10;Description automatically generated">
-            <a:extLst>
-              <a:ext uri="{FF2B5EF4-FFF2-40B4-BE49-F238E27FC236}">
-                <a16:creationId xmlns:a16="http://schemas.microsoft.com/office/drawing/2014/main" id="{C6D0B061-1E4F-4129-A2DB-0EC8A2B0ED6A}"/>
-              </a:ext>
-            </a:extLst>
-          </p:cNvPr>
-          <p:cNvPicPr>
-            <a:picLocks noChangeAspect="1"/>
-          </p:cNvPicPr>
-          <p:nvPr/>
-        </p:nvPicPr>
-        <p:blipFill rotWithShape="1">
-          <a:blip r:embed="rId4">
-            <a:extLst>
-              <a:ext uri="{28A0092B-C50C-407E-A947-70E740481C1C}">
-                <a14:useLocalDpi xmlns:a14="http://schemas.microsoft.com/office/drawing/2010/main" val="0"/>
-              </a:ext>
-            </a:extLst>
-          </a:blip>
-          <a:srcRect t="21163" b="21728"/>
-          <a:stretch/>
-        </p:blipFill>
-        <p:spPr>
-          <a:xfrm>
-            <a:off x="11277402" y="5082314"/>
-            <a:ext cx="3129147" cy="1003432"/>
-          </a:xfrm>
-          <a:prstGeom prst="rect">
-            <a:avLst/>
-          </a:prstGeom>
-        </p:spPr>
-      </p:pic>
-      <p:pic>
-        <p:nvPicPr>
-          <p:cNvPr id="12" name="Picture 11" descr="A crescent moon in a black sky&#10;&#10;Description automatically generated with low confidence">
-            <a:extLst>
-              <a:ext uri="{FF2B5EF4-FFF2-40B4-BE49-F238E27FC236}">
-                <a16:creationId xmlns:a16="http://schemas.microsoft.com/office/drawing/2014/main" id="{37BF2A03-A750-47A9-8C6F-FE7FEEF6B7E9}"/>
-              </a:ext>
-            </a:extLst>
-          </p:cNvPr>
-          <p:cNvPicPr>
-            <a:picLocks noChangeAspect="1"/>
-          </p:cNvPicPr>
-          <p:nvPr/>
-        </p:nvPicPr>
-        <p:blipFill rotWithShape="1">
-          <a:blip r:embed="rId5">
-            <a:extLst>
-              <a:ext uri="{28A0092B-C50C-407E-A947-70E740481C1C}">
-                <a14:useLocalDpi xmlns:a14="http://schemas.microsoft.com/office/drawing/2010/main" val="0"/>
-              </a:ext>
-            </a:extLst>
-          </a:blip>
-          <a:srcRect l="13692" t="28321" r="13071" b="27784"/>
-          <a:stretch/>
-        </p:blipFill>
-        <p:spPr>
-          <a:xfrm>
-            <a:off x="11083775" y="3721829"/>
-            <a:ext cx="3516409" cy="1080121"/>
-          </a:xfrm>
-          <a:prstGeom prst="rect">
-            <a:avLst/>
-          </a:prstGeom>
-        </p:spPr>
-      </p:pic>
-      <p:pic>
-        <p:nvPicPr>
-          <p:cNvPr id="14" name="Picture 13" descr="Logo&#10;&#10;Description automatically generated with low confidence">
-            <a:extLst>
-              <a:ext uri="{FF2B5EF4-FFF2-40B4-BE49-F238E27FC236}">
-                <a16:creationId xmlns:a16="http://schemas.microsoft.com/office/drawing/2014/main" id="{0DBE5031-8AAF-47C8-BF1E-8AAFD29946AA}"/>
-              </a:ext>
-            </a:extLst>
-          </p:cNvPr>
-          <p:cNvPicPr>
-            <a:picLocks noChangeAspect="1"/>
-          </p:cNvPicPr>
-          <p:nvPr/>
-        </p:nvPicPr>
-        <p:blipFill>
-          <a:blip r:embed="rId6">
-            <a:extLst>
-              <a:ext uri="{28A0092B-C50C-407E-A947-70E740481C1C}">
-                <a14:useLocalDpi xmlns:a14="http://schemas.microsoft.com/office/drawing/2010/main" val="0"/>
-              </a:ext>
-            </a:extLst>
-          </a:blip>
-          <a:stretch>
-            <a:fillRect/>
-          </a:stretch>
-        </p:blipFill>
-        <p:spPr>
-          <a:xfrm>
-            <a:off x="11235753" y="6447668"/>
-            <a:ext cx="3212447" cy="928598"/>
-          </a:xfrm>
-          <a:prstGeom prst="rect">
-            <a:avLst/>
-          </a:prstGeom>
-        </p:spPr>
-      </p:pic>
-      <p:pic>
-        <p:nvPicPr>
-          <p:cNvPr id="16" name="Picture 15" descr="Logo, icon&#10;&#10;Description automatically generated">
-            <a:extLst>
-              <a:ext uri="{FF2B5EF4-FFF2-40B4-BE49-F238E27FC236}">
-                <a16:creationId xmlns:a16="http://schemas.microsoft.com/office/drawing/2014/main" id="{B5146A31-3B8A-401E-880D-76DD05AF67AA}"/>
-              </a:ext>
-            </a:extLst>
-          </p:cNvPr>
-          <p:cNvPicPr>
-            <a:picLocks noChangeAspect="1"/>
-          </p:cNvPicPr>
-          <p:nvPr/>
-        </p:nvPicPr>
-        <p:blipFill>
-          <a:blip r:embed="rId7">
-            <a:extLst>
-              <a:ext uri="{28A0092B-C50C-407E-A947-70E740481C1C}">
-                <a14:useLocalDpi xmlns:a14="http://schemas.microsoft.com/office/drawing/2010/main" val="0"/>
-              </a:ext>
-            </a:extLst>
-          </a:blip>
-          <a:stretch>
-            <a:fillRect/>
-          </a:stretch>
-        </p:blipFill>
-        <p:spPr>
-          <a:xfrm>
-            <a:off x="11116360" y="7807936"/>
-            <a:ext cx="3451234" cy="886517"/>
-          </a:xfrm>
-          <a:prstGeom prst="rect">
-            <a:avLst/>
-          </a:prstGeom>
-        </p:spPr>
-      </p:pic>
-      <p:pic>
-        <p:nvPicPr>
-          <p:cNvPr id="18" name="Picture 17" descr="Shape&#10;&#10;Description automatically generated with low confidence">
-            <a:extLst>
-              <a:ext uri="{FF2B5EF4-FFF2-40B4-BE49-F238E27FC236}">
-                <a16:creationId xmlns:a16="http://schemas.microsoft.com/office/drawing/2014/main" id="{8FF677B0-CD78-40EC-965A-057A22352AC5}"/>
-              </a:ext>
-            </a:extLst>
-          </p:cNvPr>
-          <p:cNvPicPr>
-            <a:picLocks noChangeAspect="1"/>
-          </p:cNvPicPr>
-          <p:nvPr/>
-        </p:nvPicPr>
-        <p:blipFill>
-          <a:blip r:embed="rId8">
-            <a:extLst>
-              <a:ext uri="{28A0092B-C50C-407E-A947-70E740481C1C}">
-                <a14:useLocalDpi xmlns:a14="http://schemas.microsoft.com/office/drawing/2010/main" val="0"/>
-              </a:ext>
-            </a:extLst>
-          </a:blip>
-          <a:stretch>
-            <a:fillRect/>
-          </a:stretch>
-        </p:blipFill>
-        <p:spPr>
-          <a:xfrm>
-            <a:off x="10995784" y="9049646"/>
-            <a:ext cx="3692386" cy="1168294"/>
-          </a:xfrm>
-          <a:prstGeom prst="rect">
-            <a:avLst/>
-          </a:prstGeom>
-        </p:spPr>
-      </p:pic>
-      <p:pic>
-        <p:nvPicPr>
-          <p:cNvPr id="29" name="Picture 28" descr="Shape&#10;&#10;Description automatically generated with medium confidence">
-            <a:extLst>
-              <a:ext uri="{FF2B5EF4-FFF2-40B4-BE49-F238E27FC236}">
-                <a16:creationId xmlns:a16="http://schemas.microsoft.com/office/drawing/2014/main" id="{5350C8E9-E789-4D10-8BA4-3115FE88FB28}"/>
-              </a:ext>
-            </a:extLst>
-          </p:cNvPr>
-          <p:cNvPicPr>
-            <a:picLocks noChangeAspect="1"/>
-          </p:cNvPicPr>
-          <p:nvPr/>
-        </p:nvPicPr>
-        <p:blipFill>
-          <a:blip r:embed="rId9">
-            <a:extLst>
-              <a:ext uri="{28A0092B-C50C-407E-A947-70E740481C1C}">
-                <a14:useLocalDpi xmlns:a14="http://schemas.microsoft.com/office/drawing/2010/main" val="0"/>
-              </a:ext>
-            </a:extLst>
-          </a:blip>
-          <a:stretch>
-            <a:fillRect/>
-          </a:stretch>
-        </p:blipFill>
-        <p:spPr>
-          <a:xfrm>
-            <a:off x="11083775" y="2526942"/>
-            <a:ext cx="3516408" cy="1003431"/>
-          </a:xfrm>
-          <a:prstGeom prst="rect">
-            <a:avLst/>
-          </a:prstGeom>
-        </p:spPr>
-      </p:pic>
       <p:sp>
         <p:nvSpPr>
           <p:cNvPr id="31" name="Rectangle 9">
@@ -8239,42 +8374,21 @@
             <a:pPr eaLnBrk="1" hangingPunct="1"/>
             <a:r>
               <a:rPr lang="en-GB" altLang="x-none" sz="2000" dirty="0"/>
-              <a:t>A piece of software aimed at replacing normal door signs with an interactive</a:t>
+              <a:t>A piece of software aimed at replacing normal door signs with an interactive user interface that provides a range of functionalities.</a:t>
             </a:r>
             <a:br>
               <a:rPr lang="en-GB" altLang="x-none" sz="2000" dirty="0"/>
             </a:br>
             <a:r>
               <a:rPr lang="en-GB" altLang="x-none" sz="2000" dirty="0"/>
-              <a:t>user interface that provides a range of functionalities.</a:t>
+              <a:t>The users are able to provide people at their door with availability, location, general information, messaging, calling and booking meetings.</a:t>
             </a:r>
             <a:br>
               <a:rPr lang="en-GB" altLang="x-none" sz="2000" dirty="0"/>
             </a:br>
             <a:r>
               <a:rPr lang="en-GB" altLang="x-none" sz="2000" dirty="0"/>
-              <a:t>The users are able to provide people at their door with availability, location,</a:t>
-            </a:r>
-            <a:br>
-              <a:rPr lang="en-GB" altLang="x-none" sz="2000" dirty="0"/>
-            </a:br>
-            <a:r>
-              <a:rPr lang="en-GB" altLang="x-none" sz="2000" dirty="0"/>
-              <a:t>general information, messaging, calling and booking meetings.</a:t>
-            </a:r>
-            <a:br>
-              <a:rPr lang="en-GB" altLang="x-none" sz="2000" dirty="0"/>
-            </a:br>
-            <a:r>
-              <a:rPr lang="en-GB" altLang="x-none" sz="2000" dirty="0"/>
-              <a:t>It was initially design to be used in school setting, but can be used in most</a:t>
-            </a:r>
-            <a:br>
-              <a:rPr lang="en-GB" altLang="x-none" sz="2000" dirty="0"/>
-            </a:br>
-            <a:r>
-              <a:rPr lang="en-GB" altLang="x-none" sz="2000" dirty="0"/>
-              <a:t>work spaces that has offices and needs a modern way to manage them.</a:t>
+              <a:t>It was initially design to be used in school setting, but can be used in most work spaces that has offices and needs a modern way to manage them.</a:t>
             </a:r>
             <a:endParaRPr lang="x-none" altLang="x-none" sz="2000" dirty="0"/>
           </a:p>
@@ -8293,26 +8407,1046 @@
           <p:nvPr>
             <p:extLst>
               <p:ext uri="{D42A27DB-BD31-4B8C-83A1-F6EECF244321}">
-                <p14:modId xmlns:p14="http://schemas.microsoft.com/office/powerpoint/2010/main" val="2097206657"/>
+                <p14:modId xmlns:p14="http://schemas.microsoft.com/office/powerpoint/2010/main" val="2510816496"/>
               </p:ext>
             </p:extLst>
           </p:nvPr>
         </p:nvGraphicFramePr>
         <p:xfrm>
-          <a:off x="8862717" y="2512164"/>
-          <a:ext cx="1512735" cy="1502407"/>
+          <a:off x="7561262" y="128520"/>
+          <a:ext cx="1126717" cy="1100270"/>
         </p:xfrm>
         <a:graphic>
           <a:graphicData uri="http://schemas.openxmlformats.org/drawingml/2006/diagram">
-            <dgm:relIds xmlns:dgm="http://schemas.openxmlformats.org/drawingml/2006/diagram" xmlns:r="http://schemas.openxmlformats.org/officeDocument/2006/relationships" r:dm="rId10" r:lo="rId11" r:qs="rId12" r:cs="rId13"/>
+            <dgm:relIds xmlns:dgm="http://schemas.openxmlformats.org/drawingml/2006/diagram" xmlns:r="http://schemas.openxmlformats.org/officeDocument/2006/relationships" r:dm="rId4" r:lo="rId5" r:qs="rId6" r:cs="rId7"/>
           </a:graphicData>
         </a:graphic>
       </p:graphicFrame>
+      <p:grpSp>
+        <p:nvGrpSpPr>
+          <p:cNvPr id="32" name="Group 31">
+            <a:extLst>
+              <a:ext uri="{FF2B5EF4-FFF2-40B4-BE49-F238E27FC236}">
+                <a16:creationId xmlns:a16="http://schemas.microsoft.com/office/drawing/2014/main" id="{C9BE2B4B-9AB6-452E-8963-924078F8E6E8}"/>
+              </a:ext>
+            </a:extLst>
+          </p:cNvPr>
+          <p:cNvGrpSpPr/>
+          <p:nvPr/>
+        </p:nvGrpSpPr>
+        <p:grpSpPr>
+          <a:xfrm>
+            <a:off x="10706152" y="-12661982"/>
+            <a:ext cx="4246255" cy="25442208"/>
+            <a:chOff x="10706152" y="-12661982"/>
+            <a:chExt cx="4246255" cy="25442208"/>
+          </a:xfrm>
+        </p:grpSpPr>
+        <p:grpSp>
+          <p:nvGrpSpPr>
+            <p:cNvPr id="23" name="Group 22">
+              <a:extLst>
+                <a:ext uri="{FF2B5EF4-FFF2-40B4-BE49-F238E27FC236}">
+                  <a16:creationId xmlns:a16="http://schemas.microsoft.com/office/drawing/2014/main" id="{40B8B565-CE10-4E3A-A285-11021B6DA95D}"/>
+                </a:ext>
+              </a:extLst>
+            </p:cNvPr>
+            <p:cNvGrpSpPr/>
+            <p:nvPr/>
+          </p:nvGrpSpPr>
+          <p:grpSpPr>
+            <a:xfrm>
+              <a:off x="10706152" y="128520"/>
+              <a:ext cx="4246255" cy="12651706"/>
+              <a:chOff x="10709060" y="84812"/>
+              <a:chExt cx="4246255" cy="12651706"/>
+            </a:xfrm>
+          </p:grpSpPr>
+          <p:pic>
+            <p:nvPicPr>
+              <p:cNvPr id="19" name="P9" descr="Logo, company name&#10;&#10;Description automatically generated">
+                <a:extLst>
+                  <a:ext uri="{FF2B5EF4-FFF2-40B4-BE49-F238E27FC236}">
+                    <a16:creationId xmlns:a16="http://schemas.microsoft.com/office/drawing/2014/main" id="{4A76A335-CBCB-4B4C-A702-75530B641BD6}"/>
+                  </a:ext>
+                </a:extLst>
+              </p:cNvPr>
+              <p:cNvPicPr>
+                <a:picLocks noChangeAspect="1"/>
+              </p:cNvPicPr>
+              <p:nvPr/>
+            </p:nvPicPr>
+            <p:blipFill rotWithShape="1">
+              <a:blip r:embed="rId9">
+                <a:extLst>
+                  <a:ext uri="{BEBA8EAE-BF5A-486C-A8C5-ECC9F3942E4B}">
+                    <a14:imgProps xmlns:a14="http://schemas.microsoft.com/office/drawing/2010/main">
+                      <a14:imgLayer r:embed="rId10">
+                        <a14:imgEffect>
+                          <a14:backgroundRemoval t="10000" b="90000" l="10000" r="90000">
+                            <a14:foregroundMark x1="41880" y1="50091" x2="41880" y2="50091"/>
+                            <a14:foregroundMark x1="54680" y1="52899" x2="54680" y2="52899"/>
+                            <a14:foregroundMark x1="54520" y1="38225" x2="54520" y2="38225"/>
+                            <a14:foregroundMark x1="58880" y1="41757" x2="58880" y2="41757"/>
+                            <a14:foregroundMark x1="65560" y1="45743" x2="65560" y2="45743"/>
+                            <a14:foregroundMark x1="79120" y1="52446" x2="79120" y2="52446"/>
+                            <a14:foregroundMark x1="83240" y1="46558" x2="83240" y2="46558"/>
+                          </a14:backgroundRemoval>
+                        </a14:imgEffect>
+                      </a14:imgLayer>
+                    </a14:imgProps>
+                  </a:ext>
+                  <a:ext uri="{28A0092B-C50C-407E-A947-70E740481C1C}">
+                    <a14:useLocalDpi xmlns:a14="http://schemas.microsoft.com/office/drawing/2010/main" val="0"/>
+                  </a:ext>
+                </a:extLst>
+              </a:blip>
+              <a:srcRect l="7998" t="19745" r="7793" b="13703"/>
+              <a:stretch/>
+            </p:blipFill>
+            <p:spPr>
+              <a:xfrm>
+                <a:off x="10854325" y="4305959"/>
+                <a:ext cx="4000708" cy="1396269"/>
+              </a:xfrm>
+              <a:prstGeom prst="rect">
+                <a:avLst/>
+              </a:prstGeom>
+            </p:spPr>
+          </p:pic>
+          <p:pic>
+            <p:nvPicPr>
+              <p:cNvPr id="5" name="P8" descr="Icon&#10;&#10;Description automatically generated">
+                <a:extLst>
+                  <a:ext uri="{FF2B5EF4-FFF2-40B4-BE49-F238E27FC236}">
+                    <a16:creationId xmlns:a16="http://schemas.microsoft.com/office/drawing/2014/main" id="{029BAEBB-00D4-4C14-BA21-1BDE60931E64}"/>
+                  </a:ext>
+                </a:extLst>
+              </p:cNvPr>
+              <p:cNvPicPr>
+                <a:picLocks noChangeAspect="1"/>
+              </p:cNvPicPr>
+              <p:nvPr/>
+            </p:nvPicPr>
+            <p:blipFill>
+              <a:blip r:embed="rId11">
+                <a:extLst>
+                  <a:ext uri="{28A0092B-C50C-407E-A947-70E740481C1C}">
+                    <a14:useLocalDpi xmlns:a14="http://schemas.microsoft.com/office/drawing/2010/main" val="0"/>
+                  </a:ext>
+                </a:extLst>
+              </a:blip>
+              <a:stretch>
+                <a:fillRect/>
+              </a:stretch>
+            </p:blipFill>
+            <p:spPr>
+              <a:xfrm>
+                <a:off x="10801031" y="5829667"/>
+                <a:ext cx="4031056" cy="1580807"/>
+              </a:xfrm>
+              <a:prstGeom prst="rect">
+                <a:avLst/>
+              </a:prstGeom>
+            </p:spPr>
+          </p:pic>
+          <p:pic>
+            <p:nvPicPr>
+              <p:cNvPr id="3" name="P7" descr="A screenshot of a video game&#10;&#10;Description automatically generated with medium confidence">
+                <a:extLst>
+                  <a:ext uri="{FF2B5EF4-FFF2-40B4-BE49-F238E27FC236}">
+                    <a16:creationId xmlns:a16="http://schemas.microsoft.com/office/drawing/2014/main" id="{DB1BC595-5E72-4DED-AD00-E070B0C815B4}"/>
+                  </a:ext>
+                </a:extLst>
+              </p:cNvPr>
+              <p:cNvPicPr>
+                <a:picLocks noChangeAspect="1"/>
+              </p:cNvPicPr>
+              <p:nvPr/>
+            </p:nvPicPr>
+            <p:blipFill>
+              <a:blip r:embed="rId12">
+                <a:extLst>
+                  <a:ext uri="{28A0092B-C50C-407E-A947-70E740481C1C}">
+                    <a14:useLocalDpi xmlns:a14="http://schemas.microsoft.com/office/drawing/2010/main" val="0"/>
+                  </a:ext>
+                </a:extLst>
+              </a:blip>
+              <a:stretch>
+                <a:fillRect/>
+              </a:stretch>
+            </p:blipFill>
+            <p:spPr>
+              <a:xfrm>
+                <a:off x="10812385" y="11594110"/>
+                <a:ext cx="4084588" cy="1142408"/>
+              </a:xfrm>
+              <a:prstGeom prst="rect">
+                <a:avLst/>
+              </a:prstGeom>
+            </p:spPr>
+          </p:pic>
+          <p:pic>
+            <p:nvPicPr>
+              <p:cNvPr id="14" name="P6" descr="Logo&#10;&#10;Description automatically generated with low confidence">
+                <a:extLst>
+                  <a:ext uri="{FF2B5EF4-FFF2-40B4-BE49-F238E27FC236}">
+                    <a16:creationId xmlns:a16="http://schemas.microsoft.com/office/drawing/2014/main" id="{0DBE5031-8AAF-47C8-BF1E-8AAFD29946AA}"/>
+                  </a:ext>
+                </a:extLst>
+              </p:cNvPr>
+              <p:cNvPicPr>
+                <a:picLocks noChangeAspect="1"/>
+              </p:cNvPicPr>
+              <p:nvPr/>
+            </p:nvPicPr>
+            <p:blipFill>
+              <a:blip r:embed="rId13">
+                <a:extLst>
+                  <a:ext uri="{28A0092B-C50C-407E-A947-70E740481C1C}">
+                    <a14:useLocalDpi xmlns:a14="http://schemas.microsoft.com/office/drawing/2010/main" val="0"/>
+                  </a:ext>
+                </a:extLst>
+              </a:blip>
+              <a:stretch>
+                <a:fillRect/>
+              </a:stretch>
+            </p:blipFill>
+            <p:spPr>
+              <a:xfrm>
+                <a:off x="10826825" y="7537913"/>
+                <a:ext cx="3768976" cy="1089469"/>
+              </a:xfrm>
+              <a:prstGeom prst="rect">
+                <a:avLst/>
+              </a:prstGeom>
+            </p:spPr>
+          </p:pic>
+          <p:pic>
+            <p:nvPicPr>
+              <p:cNvPr id="16" name="P5" descr="Logo, icon&#10;&#10;Description automatically generated">
+                <a:extLst>
+                  <a:ext uri="{FF2B5EF4-FFF2-40B4-BE49-F238E27FC236}">
+                    <a16:creationId xmlns:a16="http://schemas.microsoft.com/office/drawing/2014/main" id="{B5146A31-3B8A-401E-880D-76DD05AF67AA}"/>
+                  </a:ext>
+                </a:extLst>
+              </p:cNvPr>
+              <p:cNvPicPr>
+                <a:picLocks noChangeAspect="1"/>
+              </p:cNvPicPr>
+              <p:nvPr/>
+            </p:nvPicPr>
+            <p:blipFill>
+              <a:blip r:embed="rId14">
+                <a:extLst>
+                  <a:ext uri="{28A0092B-C50C-407E-A947-70E740481C1C}">
+                    <a14:useLocalDpi xmlns:a14="http://schemas.microsoft.com/office/drawing/2010/main" val="0"/>
+                  </a:ext>
+                </a:extLst>
+              </a:blip>
+              <a:stretch>
+                <a:fillRect/>
+              </a:stretch>
+            </p:blipFill>
+            <p:spPr>
+              <a:xfrm>
+                <a:off x="10966406" y="8904975"/>
+                <a:ext cx="3731563" cy="958525"/>
+              </a:xfrm>
+              <a:prstGeom prst="rect">
+                <a:avLst/>
+              </a:prstGeom>
+            </p:spPr>
+          </p:pic>
+          <p:pic>
+            <p:nvPicPr>
+              <p:cNvPr id="18" name="P4" descr="Shape&#10;&#10;Description automatically generated with low confidence">
+                <a:extLst>
+                  <a:ext uri="{FF2B5EF4-FFF2-40B4-BE49-F238E27FC236}">
+                    <a16:creationId xmlns:a16="http://schemas.microsoft.com/office/drawing/2014/main" id="{8FF677B0-CD78-40EC-965A-057A22352AC5}"/>
+                  </a:ext>
+                </a:extLst>
+              </p:cNvPr>
+              <p:cNvPicPr>
+                <a:picLocks noChangeAspect="1"/>
+              </p:cNvPicPr>
+              <p:nvPr/>
+            </p:nvPicPr>
+            <p:blipFill>
+              <a:blip r:embed="rId15">
+                <a:extLst>
+                  <a:ext uri="{28A0092B-C50C-407E-A947-70E740481C1C}">
+                    <a14:useLocalDpi xmlns:a14="http://schemas.microsoft.com/office/drawing/2010/main" val="0"/>
+                  </a:ext>
+                </a:extLst>
+              </a:blip>
+              <a:stretch>
+                <a:fillRect/>
+              </a:stretch>
+            </p:blipFill>
+            <p:spPr>
+              <a:xfrm>
+                <a:off x="10903903" y="10076109"/>
+                <a:ext cx="4051412" cy="1281892"/>
+              </a:xfrm>
+              <a:prstGeom prst="rect">
+                <a:avLst/>
+              </a:prstGeom>
+            </p:spPr>
+          </p:pic>
+          <p:pic>
+            <p:nvPicPr>
+              <p:cNvPr id="12" name="P3" descr="A crescent moon in a black sky&#10;&#10;Description automatically generated with low confidence">
+                <a:extLst>
+                  <a:ext uri="{FF2B5EF4-FFF2-40B4-BE49-F238E27FC236}">
+                    <a16:creationId xmlns:a16="http://schemas.microsoft.com/office/drawing/2014/main" id="{37BF2A03-A750-47A9-8C6F-FE7FEEF6B7E9}"/>
+                  </a:ext>
+                </a:extLst>
+              </p:cNvPr>
+              <p:cNvPicPr>
+                <a:picLocks noChangeAspect="1"/>
+              </p:cNvPicPr>
+              <p:nvPr/>
+            </p:nvPicPr>
+            <p:blipFill rotWithShape="1">
+              <a:blip r:embed="rId16">
+                <a:extLst>
+                  <a:ext uri="{28A0092B-C50C-407E-A947-70E740481C1C}">
+                    <a14:useLocalDpi xmlns:a14="http://schemas.microsoft.com/office/drawing/2010/main" val="0"/>
+                  </a:ext>
+                </a:extLst>
+              </a:blip>
+              <a:srcRect l="13692" t="28321" r="13071" b="27784"/>
+              <a:stretch/>
+            </p:blipFill>
+            <p:spPr>
+              <a:xfrm>
+                <a:off x="10756025" y="2884349"/>
+                <a:ext cx="4199290" cy="1289879"/>
+              </a:xfrm>
+              <a:prstGeom prst="rect">
+                <a:avLst/>
+              </a:prstGeom>
+            </p:spPr>
+          </p:pic>
+          <p:pic>
+            <p:nvPicPr>
+              <p:cNvPr id="10" name="P2" descr="Arrow&#10;&#10;Description automatically generated">
+                <a:extLst>
+                  <a:ext uri="{FF2B5EF4-FFF2-40B4-BE49-F238E27FC236}">
+                    <a16:creationId xmlns:a16="http://schemas.microsoft.com/office/drawing/2014/main" id="{C6D0B061-1E4F-4129-A2DB-0EC8A2B0ED6A}"/>
+                  </a:ext>
+                </a:extLst>
+              </p:cNvPr>
+              <p:cNvPicPr>
+                <a:picLocks noChangeAspect="1"/>
+              </p:cNvPicPr>
+              <p:nvPr/>
+            </p:nvPicPr>
+            <p:blipFill rotWithShape="1">
+              <a:blip r:embed="rId17">
+                <a:extLst>
+                  <a:ext uri="{28A0092B-C50C-407E-A947-70E740481C1C}">
+                    <a14:useLocalDpi xmlns:a14="http://schemas.microsoft.com/office/drawing/2010/main" val="0"/>
+                  </a:ext>
+                </a:extLst>
+              </a:blip>
+              <a:srcRect t="21163" b="21728"/>
+              <a:stretch/>
+            </p:blipFill>
+            <p:spPr>
+              <a:xfrm>
+                <a:off x="10709060" y="1404142"/>
+                <a:ext cx="4214999" cy="1351635"/>
+              </a:xfrm>
+              <a:prstGeom prst="rect">
+                <a:avLst/>
+              </a:prstGeom>
+            </p:spPr>
+          </p:pic>
+          <p:pic>
+            <p:nvPicPr>
+              <p:cNvPr id="29" name="P1" descr="Shape&#10;&#10;Description automatically generated with medium confidence">
+                <a:extLst>
+                  <a:ext uri="{FF2B5EF4-FFF2-40B4-BE49-F238E27FC236}">
+                    <a16:creationId xmlns:a16="http://schemas.microsoft.com/office/drawing/2014/main" id="{5350C8E9-E789-4D10-8BA4-3115FE88FB28}"/>
+                  </a:ext>
+                </a:extLst>
+              </p:cNvPr>
+              <p:cNvPicPr>
+                <a:picLocks noChangeAspect="1"/>
+              </p:cNvPicPr>
+              <p:nvPr/>
+            </p:nvPicPr>
+            <p:blipFill>
+              <a:blip r:embed="rId18">
+                <a:extLst>
+                  <a:ext uri="{28A0092B-C50C-407E-A947-70E740481C1C}">
+                    <a14:useLocalDpi xmlns:a14="http://schemas.microsoft.com/office/drawing/2010/main" val="0"/>
+                  </a:ext>
+                </a:extLst>
+              </a:blip>
+              <a:stretch>
+                <a:fillRect/>
+              </a:stretch>
+            </p:blipFill>
+            <p:spPr>
+              <a:xfrm>
+                <a:off x="10787314" y="84812"/>
+                <a:ext cx="4008939" cy="1143978"/>
+              </a:xfrm>
+              <a:prstGeom prst="rect">
+                <a:avLst/>
+              </a:prstGeom>
+            </p:spPr>
+          </p:pic>
+        </p:grpSp>
+        <p:grpSp>
+          <p:nvGrpSpPr>
+            <p:cNvPr id="69" name="Group 68">
+              <a:extLst>
+                <a:ext uri="{FF2B5EF4-FFF2-40B4-BE49-F238E27FC236}">
+                  <a16:creationId xmlns:a16="http://schemas.microsoft.com/office/drawing/2014/main" id="{3CFC14D0-2BC6-4990-9304-5E0484D44D60}"/>
+                </a:ext>
+              </a:extLst>
+            </p:cNvPr>
+            <p:cNvGrpSpPr/>
+            <p:nvPr/>
+          </p:nvGrpSpPr>
+          <p:grpSpPr>
+            <a:xfrm>
+              <a:off x="10706152" y="-12661982"/>
+              <a:ext cx="4246255" cy="12651706"/>
+              <a:chOff x="10709060" y="84812"/>
+              <a:chExt cx="4246255" cy="12651706"/>
+            </a:xfrm>
+          </p:grpSpPr>
+          <p:pic>
+            <p:nvPicPr>
+              <p:cNvPr id="70" name="P9" descr="Logo, company name&#10;&#10;Description automatically generated">
+                <a:extLst>
+                  <a:ext uri="{FF2B5EF4-FFF2-40B4-BE49-F238E27FC236}">
+                    <a16:creationId xmlns:a16="http://schemas.microsoft.com/office/drawing/2014/main" id="{227928DF-BD72-4962-AE21-9C2244DE831C}"/>
+                  </a:ext>
+                </a:extLst>
+              </p:cNvPr>
+              <p:cNvPicPr>
+                <a:picLocks noChangeAspect="1"/>
+              </p:cNvPicPr>
+              <p:nvPr/>
+            </p:nvPicPr>
+            <p:blipFill rotWithShape="1">
+              <a:blip r:embed="rId9">
+                <a:extLst>
+                  <a:ext uri="{BEBA8EAE-BF5A-486C-A8C5-ECC9F3942E4B}">
+                    <a14:imgProps xmlns:a14="http://schemas.microsoft.com/office/drawing/2010/main">
+                      <a14:imgLayer r:embed="rId10">
+                        <a14:imgEffect>
+                          <a14:backgroundRemoval t="10000" b="90000" l="10000" r="90000">
+                            <a14:foregroundMark x1="41880" y1="50091" x2="41880" y2="50091"/>
+                            <a14:foregroundMark x1="54680" y1="52899" x2="54680" y2="52899"/>
+                            <a14:foregroundMark x1="54520" y1="38225" x2="54520" y2="38225"/>
+                            <a14:foregroundMark x1="58880" y1="41757" x2="58880" y2="41757"/>
+                            <a14:foregroundMark x1="65560" y1="45743" x2="65560" y2="45743"/>
+                            <a14:foregroundMark x1="79120" y1="52446" x2="79120" y2="52446"/>
+                            <a14:foregroundMark x1="83240" y1="46558" x2="83240" y2="46558"/>
+                          </a14:backgroundRemoval>
+                        </a14:imgEffect>
+                      </a14:imgLayer>
+                    </a14:imgProps>
+                  </a:ext>
+                  <a:ext uri="{28A0092B-C50C-407E-A947-70E740481C1C}">
+                    <a14:useLocalDpi xmlns:a14="http://schemas.microsoft.com/office/drawing/2010/main" val="0"/>
+                  </a:ext>
+                </a:extLst>
+              </a:blip>
+              <a:srcRect l="7998" t="19745" r="7793" b="13703"/>
+              <a:stretch/>
+            </p:blipFill>
+            <p:spPr>
+              <a:xfrm>
+                <a:off x="10854325" y="4305959"/>
+                <a:ext cx="4000708" cy="1396269"/>
+              </a:xfrm>
+              <a:prstGeom prst="rect">
+                <a:avLst/>
+              </a:prstGeom>
+            </p:spPr>
+          </p:pic>
+          <p:pic>
+            <p:nvPicPr>
+              <p:cNvPr id="71" name="P8" descr="Icon&#10;&#10;Description automatically generated">
+                <a:extLst>
+                  <a:ext uri="{FF2B5EF4-FFF2-40B4-BE49-F238E27FC236}">
+                    <a16:creationId xmlns:a16="http://schemas.microsoft.com/office/drawing/2014/main" id="{E249C3E4-8EBA-4244-92CE-EEF2B7361521}"/>
+                  </a:ext>
+                </a:extLst>
+              </p:cNvPr>
+              <p:cNvPicPr>
+                <a:picLocks noChangeAspect="1"/>
+              </p:cNvPicPr>
+              <p:nvPr/>
+            </p:nvPicPr>
+            <p:blipFill>
+              <a:blip r:embed="rId11">
+                <a:extLst>
+                  <a:ext uri="{28A0092B-C50C-407E-A947-70E740481C1C}">
+                    <a14:useLocalDpi xmlns:a14="http://schemas.microsoft.com/office/drawing/2010/main" val="0"/>
+                  </a:ext>
+                </a:extLst>
+              </a:blip>
+              <a:stretch>
+                <a:fillRect/>
+              </a:stretch>
+            </p:blipFill>
+            <p:spPr>
+              <a:xfrm>
+                <a:off x="10801031" y="5829667"/>
+                <a:ext cx="4031056" cy="1580807"/>
+              </a:xfrm>
+              <a:prstGeom prst="rect">
+                <a:avLst/>
+              </a:prstGeom>
+            </p:spPr>
+          </p:pic>
+          <p:pic>
+            <p:nvPicPr>
+              <p:cNvPr id="72" name="P7" descr="A screenshot of a video game&#10;&#10;Description automatically generated with medium confidence">
+                <a:extLst>
+                  <a:ext uri="{FF2B5EF4-FFF2-40B4-BE49-F238E27FC236}">
+                    <a16:creationId xmlns:a16="http://schemas.microsoft.com/office/drawing/2014/main" id="{2DA70CA0-8192-47C7-A63D-63C7941DD62B}"/>
+                  </a:ext>
+                </a:extLst>
+              </p:cNvPr>
+              <p:cNvPicPr>
+                <a:picLocks noChangeAspect="1"/>
+              </p:cNvPicPr>
+              <p:nvPr/>
+            </p:nvPicPr>
+            <p:blipFill>
+              <a:blip r:embed="rId12">
+                <a:extLst>
+                  <a:ext uri="{28A0092B-C50C-407E-A947-70E740481C1C}">
+                    <a14:useLocalDpi xmlns:a14="http://schemas.microsoft.com/office/drawing/2010/main" val="0"/>
+                  </a:ext>
+                </a:extLst>
+              </a:blip>
+              <a:stretch>
+                <a:fillRect/>
+              </a:stretch>
+            </p:blipFill>
+            <p:spPr>
+              <a:xfrm>
+                <a:off x="10812385" y="11594110"/>
+                <a:ext cx="4084588" cy="1142408"/>
+              </a:xfrm>
+              <a:prstGeom prst="rect">
+                <a:avLst/>
+              </a:prstGeom>
+            </p:spPr>
+          </p:pic>
+          <p:pic>
+            <p:nvPicPr>
+              <p:cNvPr id="73" name="P6" descr="Logo&#10;&#10;Description automatically generated with low confidence">
+                <a:extLst>
+                  <a:ext uri="{FF2B5EF4-FFF2-40B4-BE49-F238E27FC236}">
+                    <a16:creationId xmlns:a16="http://schemas.microsoft.com/office/drawing/2014/main" id="{EE0C7809-C1CC-47FC-9450-B7836FBAA78A}"/>
+                  </a:ext>
+                </a:extLst>
+              </p:cNvPr>
+              <p:cNvPicPr>
+                <a:picLocks noChangeAspect="1"/>
+              </p:cNvPicPr>
+              <p:nvPr/>
+            </p:nvPicPr>
+            <p:blipFill>
+              <a:blip r:embed="rId13">
+                <a:extLst>
+                  <a:ext uri="{28A0092B-C50C-407E-A947-70E740481C1C}">
+                    <a14:useLocalDpi xmlns:a14="http://schemas.microsoft.com/office/drawing/2010/main" val="0"/>
+                  </a:ext>
+                </a:extLst>
+              </a:blip>
+              <a:stretch>
+                <a:fillRect/>
+              </a:stretch>
+            </p:blipFill>
+            <p:spPr>
+              <a:xfrm>
+                <a:off x="10826825" y="7537913"/>
+                <a:ext cx="3768976" cy="1089469"/>
+              </a:xfrm>
+              <a:prstGeom prst="rect">
+                <a:avLst/>
+              </a:prstGeom>
+            </p:spPr>
+          </p:pic>
+          <p:pic>
+            <p:nvPicPr>
+              <p:cNvPr id="74" name="P5" descr="Logo, icon&#10;&#10;Description automatically generated">
+                <a:extLst>
+                  <a:ext uri="{FF2B5EF4-FFF2-40B4-BE49-F238E27FC236}">
+                    <a16:creationId xmlns:a16="http://schemas.microsoft.com/office/drawing/2014/main" id="{8370A755-7EDD-4464-B418-BD1033BB2D72}"/>
+                  </a:ext>
+                </a:extLst>
+              </p:cNvPr>
+              <p:cNvPicPr>
+                <a:picLocks noChangeAspect="1"/>
+              </p:cNvPicPr>
+              <p:nvPr/>
+            </p:nvPicPr>
+            <p:blipFill>
+              <a:blip r:embed="rId14">
+                <a:extLst>
+                  <a:ext uri="{28A0092B-C50C-407E-A947-70E740481C1C}">
+                    <a14:useLocalDpi xmlns:a14="http://schemas.microsoft.com/office/drawing/2010/main" val="0"/>
+                  </a:ext>
+                </a:extLst>
+              </a:blip>
+              <a:stretch>
+                <a:fillRect/>
+              </a:stretch>
+            </p:blipFill>
+            <p:spPr>
+              <a:xfrm>
+                <a:off x="10966406" y="8904975"/>
+                <a:ext cx="3731563" cy="958525"/>
+              </a:xfrm>
+              <a:prstGeom prst="rect">
+                <a:avLst/>
+              </a:prstGeom>
+            </p:spPr>
+          </p:pic>
+          <p:pic>
+            <p:nvPicPr>
+              <p:cNvPr id="75" name="P4" descr="Shape&#10;&#10;Description automatically generated with low confidence">
+                <a:extLst>
+                  <a:ext uri="{FF2B5EF4-FFF2-40B4-BE49-F238E27FC236}">
+                    <a16:creationId xmlns:a16="http://schemas.microsoft.com/office/drawing/2014/main" id="{413D455E-3A6F-4EB5-966B-2DFF6C4C122D}"/>
+                  </a:ext>
+                </a:extLst>
+              </p:cNvPr>
+              <p:cNvPicPr>
+                <a:picLocks noChangeAspect="1"/>
+              </p:cNvPicPr>
+              <p:nvPr/>
+            </p:nvPicPr>
+            <p:blipFill>
+              <a:blip r:embed="rId15">
+                <a:extLst>
+                  <a:ext uri="{28A0092B-C50C-407E-A947-70E740481C1C}">
+                    <a14:useLocalDpi xmlns:a14="http://schemas.microsoft.com/office/drawing/2010/main" val="0"/>
+                  </a:ext>
+                </a:extLst>
+              </a:blip>
+              <a:stretch>
+                <a:fillRect/>
+              </a:stretch>
+            </p:blipFill>
+            <p:spPr>
+              <a:xfrm>
+                <a:off x="10903903" y="10076109"/>
+                <a:ext cx="4051412" cy="1281892"/>
+              </a:xfrm>
+              <a:prstGeom prst="rect">
+                <a:avLst/>
+              </a:prstGeom>
+            </p:spPr>
+          </p:pic>
+          <p:pic>
+            <p:nvPicPr>
+              <p:cNvPr id="76" name="P3" descr="A crescent moon in a black sky&#10;&#10;Description automatically generated with low confidence">
+                <a:extLst>
+                  <a:ext uri="{FF2B5EF4-FFF2-40B4-BE49-F238E27FC236}">
+                    <a16:creationId xmlns:a16="http://schemas.microsoft.com/office/drawing/2014/main" id="{28EAC677-5965-480D-9AA5-B30C90EF4C73}"/>
+                  </a:ext>
+                </a:extLst>
+              </p:cNvPr>
+              <p:cNvPicPr>
+                <a:picLocks noChangeAspect="1"/>
+              </p:cNvPicPr>
+              <p:nvPr/>
+            </p:nvPicPr>
+            <p:blipFill rotWithShape="1">
+              <a:blip r:embed="rId16">
+                <a:extLst>
+                  <a:ext uri="{28A0092B-C50C-407E-A947-70E740481C1C}">
+                    <a14:useLocalDpi xmlns:a14="http://schemas.microsoft.com/office/drawing/2010/main" val="0"/>
+                  </a:ext>
+                </a:extLst>
+              </a:blip>
+              <a:srcRect l="13692" t="28321" r="13071" b="27784"/>
+              <a:stretch/>
+            </p:blipFill>
+            <p:spPr>
+              <a:xfrm>
+                <a:off x="10756025" y="2884349"/>
+                <a:ext cx="4199290" cy="1289879"/>
+              </a:xfrm>
+              <a:prstGeom prst="rect">
+                <a:avLst/>
+              </a:prstGeom>
+            </p:spPr>
+          </p:pic>
+          <p:pic>
+            <p:nvPicPr>
+              <p:cNvPr id="77" name="P2" descr="Arrow&#10;&#10;Description automatically generated">
+                <a:extLst>
+                  <a:ext uri="{FF2B5EF4-FFF2-40B4-BE49-F238E27FC236}">
+                    <a16:creationId xmlns:a16="http://schemas.microsoft.com/office/drawing/2014/main" id="{8BF77BEC-D234-4A35-8681-1F3CB59FC350}"/>
+                  </a:ext>
+                </a:extLst>
+              </p:cNvPr>
+              <p:cNvPicPr>
+                <a:picLocks noChangeAspect="1"/>
+              </p:cNvPicPr>
+              <p:nvPr/>
+            </p:nvPicPr>
+            <p:blipFill rotWithShape="1">
+              <a:blip r:embed="rId17">
+                <a:extLst>
+                  <a:ext uri="{28A0092B-C50C-407E-A947-70E740481C1C}">
+                    <a14:useLocalDpi xmlns:a14="http://schemas.microsoft.com/office/drawing/2010/main" val="0"/>
+                  </a:ext>
+                </a:extLst>
+              </a:blip>
+              <a:srcRect t="21163" b="21728"/>
+              <a:stretch/>
+            </p:blipFill>
+            <p:spPr>
+              <a:xfrm>
+                <a:off x="10709060" y="1404142"/>
+                <a:ext cx="4214999" cy="1351635"/>
+              </a:xfrm>
+              <a:prstGeom prst="rect">
+                <a:avLst/>
+              </a:prstGeom>
+            </p:spPr>
+          </p:pic>
+          <p:pic>
+            <p:nvPicPr>
+              <p:cNvPr id="78" name="P1" descr="Shape&#10;&#10;Description automatically generated with medium confidence">
+                <a:extLst>
+                  <a:ext uri="{FF2B5EF4-FFF2-40B4-BE49-F238E27FC236}">
+                    <a16:creationId xmlns:a16="http://schemas.microsoft.com/office/drawing/2014/main" id="{8520E8D1-218D-4C54-8058-B89C1C6AB621}"/>
+                  </a:ext>
+                </a:extLst>
+              </p:cNvPr>
+              <p:cNvPicPr>
+                <a:picLocks noChangeAspect="1"/>
+              </p:cNvPicPr>
+              <p:nvPr/>
+            </p:nvPicPr>
+            <p:blipFill>
+              <a:blip r:embed="rId18">
+                <a:extLst>
+                  <a:ext uri="{28A0092B-C50C-407E-A947-70E740481C1C}">
+                    <a14:useLocalDpi xmlns:a14="http://schemas.microsoft.com/office/drawing/2010/main" val="0"/>
+                  </a:ext>
+                </a:extLst>
+              </a:blip>
+              <a:stretch>
+                <a:fillRect/>
+              </a:stretch>
+            </p:blipFill>
+            <p:spPr>
+              <a:xfrm>
+                <a:off x="10787314" y="84812"/>
+                <a:ext cx="4008939" cy="1143978"/>
+              </a:xfrm>
+              <a:prstGeom prst="rect">
+                <a:avLst/>
+              </a:prstGeom>
+            </p:spPr>
+          </p:pic>
+        </p:grpSp>
+      </p:grpSp>
+      <p:sp>
+        <p:nvSpPr>
+          <p:cNvPr id="21" name="Rectangle 20">
+            <a:extLst>
+              <a:ext uri="{FF2B5EF4-FFF2-40B4-BE49-F238E27FC236}">
+                <a16:creationId xmlns:a16="http://schemas.microsoft.com/office/drawing/2014/main" id="{873B54E8-874F-4728-8960-C46618EEE5E4}"/>
+              </a:ext>
+            </a:extLst>
+          </p:cNvPr>
+          <p:cNvSpPr/>
+          <p:nvPr/>
+        </p:nvSpPr>
+        <p:spPr bwMode="auto">
+          <a:xfrm>
+            <a:off x="10706152" y="1272498"/>
+            <a:ext cx="4232361" cy="1098794"/>
+          </a:xfrm>
+          <a:prstGeom prst="rect">
+            <a:avLst/>
+          </a:prstGeom>
+          <a:gradFill>
+            <a:gsLst>
+              <a:gs pos="100000">
+                <a:srgbClr val="CF3938"/>
+              </a:gs>
+              <a:gs pos="0">
+                <a:srgbClr val="CD3737"/>
+              </a:gs>
+            </a:gsLst>
+            <a:lin ang="16200000" scaled="1"/>
+          </a:gradFill>
+          <a:ln w="9525" cap="flat" cmpd="sng" algn="ctr">
+            <a:noFill/>
+            <a:prstDash val="solid"/>
+            <a:round/>
+            <a:headEnd type="none" w="med" len="med"/>
+            <a:tailEnd type="none" w="med" len="med"/>
+          </a:ln>
+          <a:effectLst/>
+        </p:spPr>
+        <p:txBody>
+          <a:bodyPr vert="horz" wrap="square" lIns="91440" tIns="45720" rIns="91440" bIns="45720" numCol="1" rtlCol="0" anchor="t" anchorCtr="0" compatLnSpc="1">
+            <a:prstTxWarp prst="textNoShape">
+              <a:avLst/>
+            </a:prstTxWarp>
+          </a:bodyPr>
+          <a:lstStyle/>
+          <a:p>
+            <a:pPr marL="0" marR="0" indent="0" algn="l" defTabSz="2859088" rtl="0" eaLnBrk="1" fontAlgn="base" latinLnBrk="0" hangingPunct="1">
+              <a:lnSpc>
+                <a:spcPct val="100000"/>
+              </a:lnSpc>
+              <a:spcBef>
+                <a:spcPct val="0"/>
+              </a:spcBef>
+              <a:spcAft>
+                <a:spcPct val="0"/>
+              </a:spcAft>
+              <a:buClrTx/>
+              <a:buSzTx/>
+              <a:buFontTx/>
+              <a:buNone/>
+              <a:tabLst/>
+            </a:pPr>
+            <a:endParaRPr kumimoji="0" lang="en-GB" sz="5600" b="0" i="0" u="none" strike="noStrike" cap="none" normalizeH="0" baseline="0">
+              <a:ln>
+                <a:noFill/>
+              </a:ln>
+              <a:solidFill>
+                <a:schemeClr val="tx1"/>
+              </a:solidFill>
+              <a:effectLst/>
+              <a:latin typeface="Arial" charset="0"/>
+            </a:endParaRPr>
+          </a:p>
+        </p:txBody>
+      </p:sp>
+      <p:pic>
+        <p:nvPicPr>
+          <p:cNvPr id="2053" name="Picture 5" descr="use RH modified.jpg"/>
+          <p:cNvPicPr>
+            <a:picLocks noChangeAspect="1"/>
+          </p:cNvPicPr>
+          <p:nvPr/>
+        </p:nvPicPr>
+        <p:blipFill>
+          <a:blip r:embed="rId19">
+            <a:extLst>
+              <a:ext uri="{28A0092B-C50C-407E-A947-70E740481C1C}">
+                <a14:useLocalDpi xmlns:a14="http://schemas.microsoft.com/office/drawing/2010/main" val="0"/>
+              </a:ext>
+            </a:extLst>
+          </a:blip>
+          <a:srcRect/>
+          <a:stretch>
+            <a:fillRect/>
+          </a:stretch>
+        </p:blipFill>
+        <p:spPr bwMode="auto">
+          <a:xfrm>
+            <a:off x="9459913" y="0"/>
+            <a:ext cx="5662612" cy="1363663"/>
+          </a:xfrm>
+          <a:prstGeom prst="rect">
+            <a:avLst/>
+          </a:prstGeom>
+          <a:noFill/>
+          <a:ln>
+            <a:noFill/>
+          </a:ln>
+          <a:extLst>
+            <a:ext uri="{909E8E84-426E-40DD-AFC4-6F175D3DCCD1}">
+              <a14:hiddenFill xmlns:a14="http://schemas.microsoft.com/office/drawing/2010/main">
+                <a:solidFill>
+                  <a:srgbClr val="FFFFFF"/>
+                </a:solidFill>
+              </a14:hiddenFill>
+            </a:ext>
+            <a:ext uri="{91240B29-F687-4F45-9708-019B960494DF}">
+              <a14:hiddenLine xmlns:a14="http://schemas.microsoft.com/office/drawing/2010/main" w="9525">
+                <a:solidFill>
+                  <a:srgbClr val="000000"/>
+                </a:solidFill>
+                <a:miter lim="800000"/>
+                <a:headEnd/>
+                <a:tailEnd/>
+              </a14:hiddenLine>
+            </a:ext>
+          </a:extLst>
+        </p:spPr>
+      </p:pic>
+      <p:sp>
+        <p:nvSpPr>
+          <p:cNvPr id="22" name="Rectangle 21">
+            <a:extLst>
+              <a:ext uri="{FF2B5EF4-FFF2-40B4-BE49-F238E27FC236}">
+                <a16:creationId xmlns:a16="http://schemas.microsoft.com/office/drawing/2014/main" id="{720674C1-A862-4433-A2AE-70CB657C66C6}"/>
+              </a:ext>
+            </a:extLst>
+          </p:cNvPr>
+          <p:cNvSpPr/>
+          <p:nvPr/>
+        </p:nvSpPr>
+        <p:spPr bwMode="auto">
+          <a:xfrm>
+            <a:off x="10713783" y="10338207"/>
+            <a:ext cx="4224730" cy="1283779"/>
+          </a:xfrm>
+          <a:prstGeom prst="rect">
+            <a:avLst/>
+          </a:prstGeom>
+          <a:gradFill>
+            <a:gsLst>
+              <a:gs pos="100000">
+                <a:srgbClr val="5E1B1B"/>
+              </a:gs>
+              <a:gs pos="0">
+                <a:srgbClr val="411313"/>
+              </a:gs>
+            </a:gsLst>
+            <a:lin ang="16200000" scaled="1"/>
+          </a:gradFill>
+          <a:ln w="9525" cap="flat" cmpd="sng" algn="ctr">
+            <a:noFill/>
+            <a:prstDash val="solid"/>
+            <a:round/>
+            <a:headEnd type="none" w="med" len="med"/>
+            <a:tailEnd type="none" w="med" len="med"/>
+          </a:ln>
+          <a:effectLst/>
+        </p:spPr>
+        <p:txBody>
+          <a:bodyPr vert="horz" wrap="square" lIns="91440" tIns="45720" rIns="91440" bIns="45720" numCol="1" rtlCol="0" anchor="t" anchorCtr="0" compatLnSpc="1">
+            <a:prstTxWarp prst="textNoShape">
+              <a:avLst/>
+            </a:prstTxWarp>
+          </a:bodyPr>
+          <a:lstStyle/>
+          <a:p>
+            <a:pPr marL="0" marR="0" indent="0" algn="l" defTabSz="2859088" rtl="0" eaLnBrk="1" fontAlgn="base" latinLnBrk="0" hangingPunct="1">
+              <a:lnSpc>
+                <a:spcPct val="100000"/>
+              </a:lnSpc>
+              <a:spcBef>
+                <a:spcPct val="0"/>
+              </a:spcBef>
+              <a:spcAft>
+                <a:spcPct val="0"/>
+              </a:spcAft>
+              <a:buClrTx/>
+              <a:buSzTx/>
+              <a:buFontTx/>
+              <a:buNone/>
+              <a:tabLst/>
+            </a:pPr>
+            <a:endParaRPr kumimoji="0" lang="en-GB" sz="5600" b="0" i="0" u="none" strike="noStrike" cap="none" normalizeH="0" baseline="0">
+              <a:ln>
+                <a:noFill/>
+              </a:ln>
+              <a:solidFill>
+                <a:schemeClr val="tx1"/>
+              </a:solidFill>
+              <a:effectLst/>
+              <a:latin typeface="Arial" charset="0"/>
+            </a:endParaRPr>
+          </a:p>
+        </p:txBody>
+      </p:sp>
     </p:spTree>
   </p:cSld>
   <p:clrMapOvr>
     <a:masterClrMapping/>
   </p:clrMapOvr>
+  <p:timing>
+    <p:tnLst>
+      <p:par>
+        <p:cTn id="1" dur="indefinite" restart="never" nodeType="tmRoot">
+          <p:childTnLst>
+            <p:seq concurrent="1" nextAc="seek">
+              <p:cTn id="2" dur="indefinite" nodeType="mainSeq">
+                <p:childTnLst>
+                  <p:par>
+                    <p:cTn id="3" fill="hold">
+                      <p:stCondLst>
+                        <p:cond delay="indefinite"/>
+                        <p:cond evt="onBegin" delay="0">
+                          <p:tn val="2"/>
+                        </p:cond>
+                      </p:stCondLst>
+                      <p:childTnLst>
+                        <p:par>
+                          <p:cTn id="4" fill="hold">
+                            <p:stCondLst>
+                              <p:cond delay="0"/>
+                            </p:stCondLst>
+                            <p:childTnLst>
+                              <p:par>
+                                <p:cTn id="5" presetID="42" presetClass="path" presetSubtype="0" repeatCount="indefinite" fill="hold" nodeType="afterEffect">
+                                  <p:stCondLst>
+                                    <p:cond delay="0"/>
+                                  </p:stCondLst>
+                                  <p:childTnLst>
+                                    <p:animMotion origin="layout" path="M 1.11274E-7 -2.87411E-6 L 1.11274E-7 1.18973 " pathEditMode="relative" rAng="0" ptsTypes="AA">
+                                      <p:cBhvr>
+                                        <p:cTn id="6" dur="20000" fill="hold"/>
+                                        <p:tgtEl>
+                                          <p:spTgt spid="32"/>
+                                        </p:tgtEl>
+                                        <p:attrNameLst>
+                                          <p:attrName>ppt_x</p:attrName>
+                                          <p:attrName>ppt_y</p:attrName>
+                                        </p:attrNameLst>
+                                      </p:cBhvr>
+                                      <p:rCtr x="0" y="59486"/>
+                                    </p:animMotion>
+                                  </p:childTnLst>
+                                </p:cTn>
+                              </p:par>
+                            </p:childTnLst>
+                          </p:cTn>
+                        </p:par>
+                      </p:childTnLst>
+                    </p:cTn>
+                  </p:par>
+                </p:childTnLst>
+              </p:cTn>
+              <p:prevCondLst>
+                <p:cond evt="onPrev" delay="0">
+                  <p:tgtEl>
+                    <p:sldTgt/>
+                  </p:tgtEl>
+                </p:cond>
+              </p:prevCondLst>
+              <p:nextCondLst>
+                <p:cond evt="onNext" delay="0">
+                  <p:tgtEl>
+                    <p:sldTgt/>
+                  </p:tgtEl>
+                </p:cond>
+              </p:nextCondLst>
+            </p:seq>
+          </p:childTnLst>
+        </p:cTn>
+      </p:par>
+    </p:tnLst>
+  </p:timing>
 </p:sld>
 </file>
 
@@ -9159,6 +10293,301 @@
 </a:theme>
 </file>
 
+<file path=ppt/theme/theme2.xml><?xml version="1.0" encoding="utf-8"?>
+<a:theme xmlns:a="http://schemas.openxmlformats.org/drawingml/2006/main" name="Office Theme">
+  <a:themeElements>
+    <a:clrScheme name="Office">
+      <a:dk1>
+        <a:sysClr val="windowText" lastClr="000000"/>
+      </a:dk1>
+      <a:lt1>
+        <a:sysClr val="window" lastClr="FFFFFF"/>
+      </a:lt1>
+      <a:dk2>
+        <a:srgbClr val="44546A"/>
+      </a:dk2>
+      <a:lt2>
+        <a:srgbClr val="E7E6E6"/>
+      </a:lt2>
+      <a:accent1>
+        <a:srgbClr val="4472C4"/>
+      </a:accent1>
+      <a:accent2>
+        <a:srgbClr val="ED7D31"/>
+      </a:accent2>
+      <a:accent3>
+        <a:srgbClr val="A5A5A5"/>
+      </a:accent3>
+      <a:accent4>
+        <a:srgbClr val="FFC000"/>
+      </a:accent4>
+      <a:accent5>
+        <a:srgbClr val="5B9BD5"/>
+      </a:accent5>
+      <a:accent6>
+        <a:srgbClr val="70AD47"/>
+      </a:accent6>
+      <a:hlink>
+        <a:srgbClr val="0563C1"/>
+      </a:hlink>
+      <a:folHlink>
+        <a:srgbClr val="954F72"/>
+      </a:folHlink>
+    </a:clrScheme>
+    <a:fontScheme name="Office">
+      <a:majorFont>
+        <a:latin typeface="Calibri Light" panose="020F0302020204030204"/>
+        <a:ea typeface=""/>
+        <a:cs typeface=""/>
+        <a:font script="Jpan" typeface="游ゴシック Light"/>
+        <a:font script="Hang" typeface="맑은 고딕"/>
+        <a:font script="Hans" typeface="等线 Light"/>
+        <a:font script="Hant" typeface="新細明體"/>
+        <a:font script="Arab" typeface="Times New Roman"/>
+        <a:font script="Hebr" typeface="Times New Roman"/>
+        <a:font script="Thai" typeface="Angsana New"/>
+        <a:font script="Ethi" typeface="Nyala"/>
+        <a:font script="Beng" typeface="Vrinda"/>
+        <a:font script="Gujr" typeface="Shruti"/>
+        <a:font script="Khmr" typeface="MoolBoran"/>
+        <a:font script="Knda" typeface="Tunga"/>
+        <a:font script="Guru" typeface="Raavi"/>
+        <a:font script="Cans" typeface="Euphemia"/>
+        <a:font script="Cher" typeface="Plantagenet Cherokee"/>
+        <a:font script="Yiii" typeface="Microsoft Yi Baiti"/>
+        <a:font script="Tibt" typeface="Microsoft Himalaya"/>
+        <a:font script="Thaa" typeface="MV Boli"/>
+        <a:font script="Deva" typeface="Mangal"/>
+        <a:font script="Telu" typeface="Gautami"/>
+        <a:font script="Taml" typeface="Latha"/>
+        <a:font script="Syrc" typeface="Estrangelo Edessa"/>
+        <a:font script="Orya" typeface="Kalinga"/>
+        <a:font script="Mlym" typeface="Kartika"/>
+        <a:font script="Laoo" typeface="DokChampa"/>
+        <a:font script="Sinh" typeface="Iskoola Pota"/>
+        <a:font script="Mong" typeface="Mongolian Baiti"/>
+        <a:font script="Viet" typeface="Times New Roman"/>
+        <a:font script="Uigh" typeface="Microsoft Uighur"/>
+        <a:font script="Geor" typeface="Sylfaen"/>
+        <a:font script="Armn" typeface="Arial"/>
+        <a:font script="Bugi" typeface="Leelawadee UI"/>
+        <a:font script="Bopo" typeface="Microsoft JhengHei"/>
+        <a:font script="Java" typeface="Javanese Text"/>
+        <a:font script="Lisu" typeface="Segoe UI"/>
+        <a:font script="Mymr" typeface="Myanmar Text"/>
+        <a:font script="Nkoo" typeface="Ebrima"/>
+        <a:font script="Olck" typeface="Nirmala UI"/>
+        <a:font script="Osma" typeface="Ebrima"/>
+        <a:font script="Phag" typeface="Phagspa"/>
+        <a:font script="Syrn" typeface="Estrangelo Edessa"/>
+        <a:font script="Syrj" typeface="Estrangelo Edessa"/>
+        <a:font script="Syre" typeface="Estrangelo Edessa"/>
+        <a:font script="Sora" typeface="Nirmala UI"/>
+        <a:font script="Tale" typeface="Microsoft Tai Le"/>
+        <a:font script="Talu" typeface="Microsoft New Tai Lue"/>
+        <a:font script="Tfng" typeface="Ebrima"/>
+      </a:majorFont>
+      <a:minorFont>
+        <a:latin typeface="Calibri" panose="020F0502020204030204"/>
+        <a:ea typeface=""/>
+        <a:cs typeface=""/>
+        <a:font script="Jpan" typeface="游ゴシック"/>
+        <a:font script="Hang" typeface="맑은 고딕"/>
+        <a:font script="Hans" typeface="等线"/>
+        <a:font script="Hant" typeface="新細明體"/>
+        <a:font script="Arab" typeface="Arial"/>
+        <a:font script="Hebr" typeface="Arial"/>
+        <a:font script="Thai" typeface="Cordia New"/>
+        <a:font script="Ethi" typeface="Nyala"/>
+        <a:font script="Beng" typeface="Vrinda"/>
+        <a:font script="Gujr" typeface="Shruti"/>
+        <a:font script="Khmr" typeface="DaunPenh"/>
+        <a:font script="Knda" typeface="Tunga"/>
+        <a:font script="Guru" typeface="Raavi"/>
+        <a:font script="Cans" typeface="Euphemia"/>
+        <a:font script="Cher" typeface="Plantagenet Cherokee"/>
+        <a:font script="Yiii" typeface="Microsoft Yi Baiti"/>
+        <a:font script="Tibt" typeface="Microsoft Himalaya"/>
+        <a:font script="Thaa" typeface="MV Boli"/>
+        <a:font script="Deva" typeface="Mangal"/>
+        <a:font script="Telu" typeface="Gautami"/>
+        <a:font script="Taml" typeface="Latha"/>
+        <a:font script="Syrc" typeface="Estrangelo Edessa"/>
+        <a:font script="Orya" typeface="Kalinga"/>
+        <a:font script="Mlym" typeface="Kartika"/>
+        <a:font script="Laoo" typeface="DokChampa"/>
+        <a:font script="Sinh" typeface="Iskoola Pota"/>
+        <a:font script="Mong" typeface="Mongolian Baiti"/>
+        <a:font script="Viet" typeface="Arial"/>
+        <a:font script="Uigh" typeface="Microsoft Uighur"/>
+        <a:font script="Geor" typeface="Sylfaen"/>
+        <a:font script="Armn" typeface="Arial"/>
+        <a:font script="Bugi" typeface="Leelawadee UI"/>
+        <a:font script="Bopo" typeface="Microsoft JhengHei"/>
+        <a:font script="Java" typeface="Javanese Text"/>
+        <a:font script="Lisu" typeface="Segoe UI"/>
+        <a:font script="Mymr" typeface="Myanmar Text"/>
+        <a:font script="Nkoo" typeface="Ebrima"/>
+        <a:font script="Olck" typeface="Nirmala UI"/>
+        <a:font script="Osma" typeface="Ebrima"/>
+        <a:font script="Phag" typeface="Phagspa"/>
+        <a:font script="Syrn" typeface="Estrangelo Edessa"/>
+        <a:font script="Syrj" typeface="Estrangelo Edessa"/>
+        <a:font script="Syre" typeface="Estrangelo Edessa"/>
+        <a:font script="Sora" typeface="Nirmala UI"/>
+        <a:font script="Tale" typeface="Microsoft Tai Le"/>
+        <a:font script="Talu" typeface="Microsoft New Tai Lue"/>
+        <a:font script="Tfng" typeface="Ebrima"/>
+      </a:minorFont>
+    </a:fontScheme>
+    <a:fmtScheme name="Office">
+      <a:fillStyleLst>
+        <a:solidFill>
+          <a:schemeClr val="phClr"/>
+        </a:solidFill>
+        <a:gradFill rotWithShape="1">
+          <a:gsLst>
+            <a:gs pos="0">
+              <a:schemeClr val="phClr">
+                <a:lumMod val="110000"/>
+                <a:satMod val="105000"/>
+                <a:tint val="67000"/>
+              </a:schemeClr>
+            </a:gs>
+            <a:gs pos="50000">
+              <a:schemeClr val="phClr">
+                <a:lumMod val="105000"/>
+                <a:satMod val="103000"/>
+                <a:tint val="73000"/>
+              </a:schemeClr>
+            </a:gs>
+            <a:gs pos="100000">
+              <a:schemeClr val="phClr">
+                <a:lumMod val="105000"/>
+                <a:satMod val="109000"/>
+                <a:tint val="81000"/>
+              </a:schemeClr>
+            </a:gs>
+          </a:gsLst>
+          <a:lin ang="5400000" scaled="0"/>
+        </a:gradFill>
+        <a:gradFill rotWithShape="1">
+          <a:gsLst>
+            <a:gs pos="0">
+              <a:schemeClr val="phClr">
+                <a:satMod val="103000"/>
+                <a:lumMod val="102000"/>
+                <a:tint val="94000"/>
+              </a:schemeClr>
+            </a:gs>
+            <a:gs pos="50000">
+              <a:schemeClr val="phClr">
+                <a:satMod val="110000"/>
+                <a:lumMod val="100000"/>
+                <a:shade val="100000"/>
+              </a:schemeClr>
+            </a:gs>
+            <a:gs pos="100000">
+              <a:schemeClr val="phClr">
+                <a:lumMod val="99000"/>
+                <a:satMod val="120000"/>
+                <a:shade val="78000"/>
+              </a:schemeClr>
+            </a:gs>
+          </a:gsLst>
+          <a:lin ang="5400000" scaled="0"/>
+        </a:gradFill>
+      </a:fillStyleLst>
+      <a:lnStyleLst>
+        <a:ln w="6350" cap="flat" cmpd="sng" algn="ctr">
+          <a:solidFill>
+            <a:schemeClr val="phClr"/>
+          </a:solidFill>
+          <a:prstDash val="solid"/>
+          <a:miter lim="800000"/>
+        </a:ln>
+        <a:ln w="12700" cap="flat" cmpd="sng" algn="ctr">
+          <a:solidFill>
+            <a:schemeClr val="phClr"/>
+          </a:solidFill>
+          <a:prstDash val="solid"/>
+          <a:miter lim="800000"/>
+        </a:ln>
+        <a:ln w="19050" cap="flat" cmpd="sng" algn="ctr">
+          <a:solidFill>
+            <a:schemeClr val="phClr"/>
+          </a:solidFill>
+          <a:prstDash val="solid"/>
+          <a:miter lim="800000"/>
+        </a:ln>
+      </a:lnStyleLst>
+      <a:effectStyleLst>
+        <a:effectStyle>
+          <a:effectLst/>
+        </a:effectStyle>
+        <a:effectStyle>
+          <a:effectLst/>
+        </a:effectStyle>
+        <a:effectStyle>
+          <a:effectLst>
+            <a:outerShdw blurRad="57150" dist="19050" dir="5400000" algn="ctr" rotWithShape="0">
+              <a:srgbClr val="000000">
+                <a:alpha val="63000"/>
+              </a:srgbClr>
+            </a:outerShdw>
+          </a:effectLst>
+        </a:effectStyle>
+      </a:effectStyleLst>
+      <a:bgFillStyleLst>
+        <a:solidFill>
+          <a:schemeClr val="phClr"/>
+        </a:solidFill>
+        <a:solidFill>
+          <a:schemeClr val="phClr">
+            <a:tint val="95000"/>
+            <a:satMod val="170000"/>
+          </a:schemeClr>
+        </a:solidFill>
+        <a:gradFill rotWithShape="1">
+          <a:gsLst>
+            <a:gs pos="0">
+              <a:schemeClr val="phClr">
+                <a:tint val="93000"/>
+                <a:satMod val="150000"/>
+                <a:shade val="98000"/>
+                <a:lumMod val="102000"/>
+              </a:schemeClr>
+            </a:gs>
+            <a:gs pos="50000">
+              <a:schemeClr val="phClr">
+                <a:tint val="98000"/>
+                <a:satMod val="130000"/>
+                <a:shade val="90000"/>
+                <a:lumMod val="103000"/>
+              </a:schemeClr>
+            </a:gs>
+            <a:gs pos="100000">
+              <a:schemeClr val="phClr">
+                <a:shade val="63000"/>
+                <a:satMod val="120000"/>
+              </a:schemeClr>
+            </a:gs>
+          </a:gsLst>
+          <a:lin ang="5400000" scaled="0"/>
+        </a:gradFill>
+      </a:bgFillStyleLst>
+    </a:fmtScheme>
+  </a:themeElements>
+  <a:objectDefaults/>
+  <a:extraClrSchemeLst/>
+  <a:extLst>
+    <a:ext uri="{05A4C25C-085E-4340-85A3-A5531E510DB2}">
+      <thm15:themeFamily xmlns:thm15="http://schemas.microsoft.com/office/thememl/2012/main" name="Office Theme" id="{62F939B6-93AF-4DB8-9C6B-D6C7DFDC589F}" vid="{4A3C46E8-61CC-4603-A589-7422A47A8E4A}"/>
+    </a:ext>
+  </a:extLst>
+</a:theme>
+</file>
+
 <file path=customXml/item1.xml><?xml version="1.0" encoding="utf-8"?>
 <ct:contentTypeSchema xmlns:ct="http://schemas.microsoft.com/office/2006/metadata/contentType" xmlns:ma="http://schemas.microsoft.com/office/2006/metadata/properties/metaAttributes" ct:_="" ma:_="" ma:contentTypeName="Document" ma:contentTypeID="0x01010097D40E6585C8784EB4F7A91A219ECB38" ma:contentTypeVersion="0" ma:contentTypeDescription="Create a new document." ma:contentTypeScope="" ma:versionID="225f1df7c0d1d866e72199d38b91779e">
   <xsd:schema xmlns:xsd="http://www.w3.org/2001/XMLSchema" xmlns:p="http://schemas.microsoft.com/office/2006/metadata/properties" targetNamespace="http://schemas.microsoft.com/office/2006/metadata/properties" ma:root="true" ma:fieldsID="4aeb20c0e3442673af7ee10786458764">

</xml_diff>

<commit_message>
updated abstract.md and CE301 Open Day Poster Template.pptx
</commit_message>
<xml_diff>
--- a/docs/open_day/CE301 Open Day Poster Template.pptx
+++ b/docs/open_day/CE301 Open Day Poster Template.pptx
@@ -3846,7 +3846,7 @@
           <a:p>
             <a:fld id="{6823682D-4EC1-4460-9FEF-F862992620B6}" type="datetimeFigureOut">
               <a:rPr lang="en-GB" smtClean="0"/>
-              <a:t>28/02/2022</a:t>
+              <a:t>03/03/2022</a:t>
             </a:fld>
             <a:endParaRPr lang="en-GB"/>
           </a:p>
@@ -6787,7 +6787,7 @@
               </a14:hiddenLine>
             </a:ext>
             <a:ext uri="{FAA26D3D-D897-4be2-8F04-BA451C77F1D7}">
-              <ma14:placeholderFlag xmlns="" xmlns:ma14="http://schemas.microsoft.com/office/mac/drawingml/2011/main" val="1"/>
+              <ma14:placeholderFlag xmlns:ma14="http://schemas.microsoft.com/office/mac/drawingml/2011/main" xmlns="" val="1"/>
             </a:ext>
           </a:extLst>
         </p:spPr>
@@ -6848,7 +6848,7 @@
               </a14:hiddenLine>
             </a:ext>
             <a:ext uri="{FAA26D3D-D897-4be2-8F04-BA451C77F1D7}">
-              <ma14:placeholderFlag xmlns="" xmlns:ma14="http://schemas.microsoft.com/office/mac/drawingml/2011/main" val="1"/>
+              <ma14:placeholderFlag xmlns:ma14="http://schemas.microsoft.com/office/mac/drawingml/2011/main" xmlns="" val="1"/>
             </a:ext>
           </a:extLst>
         </p:spPr>
@@ -8053,33 +8053,41 @@
           <a:p>
             <a:pPr eaLnBrk="1" hangingPunct="1"/>
             <a:r>
-              <a:rPr lang="en-GB" altLang="x-none" sz="2000" dirty="0"/>
-              <a:t>INSERT VIDEO HERE</a:t>
+              <a:rPr lang="en-GB" altLang="x-none" sz="2000" dirty="0">
+                <a:sym typeface="Wingdings" panose="05000000000000000000" pitchFamily="2" charset="2"/>
+              </a:rPr>
+              <a:t>Flowchart, Screenshots</a:t>
             </a:r>
           </a:p>
           <a:p>
             <a:pPr eaLnBrk="1" hangingPunct="1"/>
-            <a:r>
-              <a:rPr lang="en-GB" altLang="x-none" sz="2000" dirty="0"/>
-              <a:t>SAVING THIS UNTIL A BIT LATER</a:t>
-            </a:r>
-          </a:p>
-          <a:p>
-            <a:pPr eaLnBrk="1" hangingPunct="1"/>
-            <a:endParaRPr lang="en-GB" altLang="x-none" sz="2000" dirty="0"/>
-          </a:p>
-          <a:p>
-            <a:pPr eaLnBrk="1" hangingPunct="1"/>
-            <a:r>
-              <a:rPr lang="en-GB" altLang="x-none" sz="2000" dirty="0"/>
-              <a:t>SCROLLING VIEW OF TECHNOLOGIES?</a:t>
-            </a:r>
             <a:r>
               <a:rPr lang="en-GB" altLang="x-none" sz="2000" dirty="0">
                 <a:sym typeface="Wingdings" panose="05000000000000000000" pitchFamily="2" charset="2"/>
               </a:rPr>
-              <a:t>     </a:t>
+              <a:t>Show of how the product works using flowchart</a:t>
             </a:r>
+          </a:p>
+          <a:p>
+            <a:pPr eaLnBrk="1" hangingPunct="1"/>
+            <a:r>
+              <a:rPr lang="en-GB" altLang="x-none" sz="2000" dirty="0">
+                <a:sym typeface="Wingdings" panose="05000000000000000000" pitchFamily="2" charset="2"/>
+              </a:rPr>
+              <a:t>Tell the story of the product</a:t>
+            </a:r>
+          </a:p>
+          <a:p>
+            <a:pPr eaLnBrk="1" hangingPunct="1"/>
+            <a:r>
+              <a:rPr lang="en-GB" altLang="x-none" sz="2000" dirty="0">
+                <a:sym typeface="Wingdings" panose="05000000000000000000" pitchFamily="2" charset="2"/>
+              </a:rPr>
+              <a:t>Keep content big and easily visible</a:t>
+            </a:r>
+          </a:p>
+          <a:p>
+            <a:pPr eaLnBrk="1" hangingPunct="1"/>
             <a:endParaRPr lang="x-none" altLang="x-none" sz="2000" dirty="0"/>
           </a:p>
         </p:txBody>
@@ -8374,21 +8382,7 @@
             <a:pPr eaLnBrk="1" hangingPunct="1"/>
             <a:r>
               <a:rPr lang="en-GB" altLang="x-none" sz="2000" dirty="0"/>
-              <a:t>A piece of software aimed at replacing normal door signs with an interactive user interface that provides a range of functionalities.</a:t>
-            </a:r>
-            <a:br>
-              <a:rPr lang="en-GB" altLang="x-none" sz="2000" dirty="0"/>
-            </a:br>
-            <a:r>
-              <a:rPr lang="en-GB" altLang="x-none" sz="2000" dirty="0"/>
-              <a:t>The users are able to provide people at their door with availability, location, general information, messaging, calling and booking meetings.</a:t>
-            </a:r>
-            <a:br>
-              <a:rPr lang="en-GB" altLang="x-none" sz="2000" dirty="0"/>
-            </a:br>
-            <a:r>
-              <a:rPr lang="en-GB" altLang="x-none" sz="2000" dirty="0"/>
-              <a:t>It was initially design to be used in school setting, but can be used in most work spaces that has offices and needs a modern way to manage them.</a:t>
+              <a:t>Short points</a:t>
             </a:r>
             <a:endParaRPr lang="x-none" altLang="x-none" sz="2000" dirty="0"/>
           </a:p>
@@ -10589,6 +10583,15 @@
 </file>
 
 <file path=customXml/item1.xml><?xml version="1.0" encoding="utf-8"?>
+<?mso-contentType ?>
+<FormTemplates xmlns="http://schemas.microsoft.com/sharepoint/v3/contenttype/forms">
+  <Display>DocumentLibraryForm</Display>
+  <Edit>DocumentLibraryForm</Edit>
+  <New>DocumentLibraryForm</New>
+</FormTemplates>
+</file>
+
+<file path=customXml/item2.xml><?xml version="1.0" encoding="utf-8"?>
 <ct:contentTypeSchema xmlns:ct="http://schemas.microsoft.com/office/2006/metadata/contentType" xmlns:ma="http://schemas.microsoft.com/office/2006/metadata/properties/metaAttributes" ct:_="" ma:_="" ma:contentTypeName="Document" ma:contentTypeID="0x01010097D40E6585C8784EB4F7A91A219ECB38" ma:contentTypeVersion="0" ma:contentTypeDescription="Create a new document." ma:contentTypeScope="" ma:versionID="225f1df7c0d1d866e72199d38b91779e">
   <xsd:schema xmlns:xsd="http://www.w3.org/2001/XMLSchema" xmlns:p="http://schemas.microsoft.com/office/2006/metadata/properties" targetNamespace="http://schemas.microsoft.com/office/2006/metadata/properties" ma:root="true" ma:fieldsID="4aeb20c0e3442673af7ee10786458764">
     <xsd:element name="properties">
@@ -10637,16 +10640,15 @@
 </ct:contentTypeSchema>
 </file>
 
-<file path=customXml/item2.xml><?xml version="1.0" encoding="utf-8"?>
-<?mso-contentType ?>
-<FormTemplates xmlns="http://schemas.microsoft.com/sharepoint/v3/contenttype/forms">
-  <Display>DocumentLibraryForm</Display>
-  <Edit>DocumentLibraryForm</Edit>
-  <New>DocumentLibraryForm</New>
-</FormTemplates>
+<file path=customXml/itemProps1.xml><?xml version="1.0" encoding="utf-8"?>
+<ds:datastoreItem xmlns:ds="http://schemas.openxmlformats.org/officeDocument/2006/customXml" ds:itemID="{54D0D3C5-34E4-4C50-AEF0-1975AC22AD53}">
+  <ds:schemaRefs>
+    <ds:schemaRef ds:uri="http://schemas.microsoft.com/sharepoint/v3/contenttype/forms"/>
+  </ds:schemaRefs>
+</ds:datastoreItem>
 </file>
 
-<file path=customXml/itemProps1.xml><?xml version="1.0" encoding="utf-8"?>
+<file path=customXml/itemProps2.xml><?xml version="1.0" encoding="utf-8"?>
 <ds:datastoreItem xmlns:ds="http://schemas.openxmlformats.org/officeDocument/2006/customXml" ds:itemID="{069E428E-B4E8-4A06-9EB6-04820EC0F3C0}">
   <ds:schemaRefs>
     <ds:schemaRef ds:uri="http://schemas.microsoft.com/office/2006/metadata/contentType"/>
@@ -10659,12 +10661,4 @@
     <ds:schemaRef ds:uri="http://schemas.microsoft.com/office/internal/2005/internalDocumentation"/>
   </ds:schemaRefs>
 </ds:datastoreItem>
-</file>
-
-<file path=customXml/itemProps2.xml><?xml version="1.0" encoding="utf-8"?>
-<ds:datastoreItem xmlns:ds="http://schemas.openxmlformats.org/officeDocument/2006/customXml" ds:itemID="{54D0D3C5-34E4-4C50-AEF0-1975AC22AD53}">
-  <ds:schemaRefs>
-    <ds:schemaRef ds:uri="http://schemas.microsoft.com/sharepoint/v3/contenttype/forms"/>
-  </ds:schemaRefs>
-</ds:datastoreItem>
 </file>
</xml_diff>

<commit_message>
first draft of the abstract and the poster
</commit_message>
<xml_diff>
--- a/docs/open_day/CE301 Open Day Poster Template.pptx
+++ b/docs/open_day/CE301 Open Day Poster Template.pptx
@@ -3846,7 +3846,7 @@
           <a:p>
             <a:fld id="{6823682D-4EC1-4460-9FEF-F862992620B6}" type="datetimeFigureOut">
               <a:rPr lang="en-GB" smtClean="0"/>
-              <a:t>03/03/2022</a:t>
+              <a:t>04/03/2022</a:t>
             </a:fld>
             <a:endParaRPr lang="en-GB"/>
           </a:p>
@@ -6787,7 +6787,7 @@
               </a14:hiddenLine>
             </a:ext>
             <a:ext uri="{FAA26D3D-D897-4be2-8F04-BA451C77F1D7}">
-              <ma14:placeholderFlag xmlns:ma14="http://schemas.microsoft.com/office/mac/drawingml/2011/main" xmlns="" val="1"/>
+              <ma14:placeholderFlag xmlns="" xmlns:ma14="http://schemas.microsoft.com/office/mac/drawingml/2011/main" val="1"/>
             </a:ext>
           </a:extLst>
         </p:spPr>
@@ -6848,7 +6848,7 @@
               </a14:hiddenLine>
             </a:ext>
             <a:ext uri="{FAA26D3D-D897-4be2-8F04-BA451C77F1D7}">
-              <ma14:placeholderFlag xmlns:ma14="http://schemas.microsoft.com/office/mac/drawingml/2011/main" xmlns="" val="1"/>
+              <ma14:placeholderFlag xmlns="" xmlns:ma14="http://schemas.microsoft.com/office/mac/drawingml/2011/main" val="1"/>
             </a:ext>
           </a:extLst>
         </p:spPr>
@@ -7798,8 +7798,8 @@
         </p:nvSpPr>
         <p:spPr bwMode="auto">
           <a:xfrm>
-            <a:off x="10699887" y="2368886"/>
-            <a:ext cx="4252519" cy="7969322"/>
+            <a:off x="12065032" y="2368886"/>
+            <a:ext cx="2887374" cy="7969322"/>
           </a:xfrm>
           <a:prstGeom prst="rect">
             <a:avLst/>
@@ -7932,8 +7932,8 @@
         </p:nvSpPr>
         <p:spPr bwMode="auto">
           <a:xfrm>
-            <a:off x="168181" y="4414325"/>
-            <a:ext cx="10393253" cy="5923882"/>
+            <a:off x="168181" y="4255388"/>
+            <a:ext cx="11690763" cy="6082819"/>
           </a:xfrm>
           <a:prstGeom prst="rect">
             <a:avLst/>
@@ -8050,42 +8050,6 @@
               </a:defRPr>
             </a:lvl9pPr>
           </a:lstStyle>
-          <a:p>
-            <a:pPr eaLnBrk="1" hangingPunct="1"/>
-            <a:r>
-              <a:rPr lang="en-GB" altLang="x-none" sz="2000" dirty="0">
-                <a:sym typeface="Wingdings" panose="05000000000000000000" pitchFamily="2" charset="2"/>
-              </a:rPr>
-              <a:t>Flowchart, Screenshots</a:t>
-            </a:r>
-          </a:p>
-          <a:p>
-            <a:pPr eaLnBrk="1" hangingPunct="1"/>
-            <a:r>
-              <a:rPr lang="en-GB" altLang="x-none" sz="2000" dirty="0">
-                <a:sym typeface="Wingdings" panose="05000000000000000000" pitchFamily="2" charset="2"/>
-              </a:rPr>
-              <a:t>Show of how the product works using flowchart</a:t>
-            </a:r>
-          </a:p>
-          <a:p>
-            <a:pPr eaLnBrk="1" hangingPunct="1"/>
-            <a:r>
-              <a:rPr lang="en-GB" altLang="x-none" sz="2000" dirty="0">
-                <a:sym typeface="Wingdings" panose="05000000000000000000" pitchFamily="2" charset="2"/>
-              </a:rPr>
-              <a:t>Tell the story of the product</a:t>
-            </a:r>
-          </a:p>
-          <a:p>
-            <a:pPr eaLnBrk="1" hangingPunct="1"/>
-            <a:r>
-              <a:rPr lang="en-GB" altLang="x-none" sz="2000" dirty="0">
-                <a:sym typeface="Wingdings" panose="05000000000000000000" pitchFamily="2" charset="2"/>
-              </a:rPr>
-              <a:t>Keep content big and easily visible</a:t>
-            </a:r>
-          </a:p>
           <a:p>
             <a:pPr eaLnBrk="1" hangingPunct="1"/>
             <a:endParaRPr lang="x-none" altLang="x-none" sz="2000" dirty="0"/>
@@ -8260,8 +8224,8 @@
         </p:nvSpPr>
         <p:spPr bwMode="auto">
           <a:xfrm>
-            <a:off x="168181" y="2368885"/>
-            <a:ext cx="10393254" cy="1872000"/>
+            <a:off x="168181" y="2368884"/>
+            <a:ext cx="11698946" cy="1681187"/>
           </a:xfrm>
           <a:prstGeom prst="rect">
             <a:avLst/>
@@ -8379,12 +8343,31 @@
             </a:lvl9pPr>
           </a:lstStyle>
           <a:p>
-            <a:pPr eaLnBrk="1" hangingPunct="1"/>
+            <a:pPr algn="ctr" eaLnBrk="1" hangingPunct="1"/>
             <a:r>
-              <a:rPr lang="en-GB" altLang="x-none" sz="2000" dirty="0"/>
-              <a:t>Short points</a:t>
+              <a:rPr lang="en-GB" altLang="x-none" sz="4800" dirty="0"/>
+              <a:t>Innovative, Intelligent and Industry Ready</a:t>
             </a:r>
-            <a:endParaRPr lang="x-none" altLang="x-none" sz="2000" dirty="0"/>
+          </a:p>
+          <a:p>
+            <a:pPr algn="ctr" eaLnBrk="1" hangingPunct="1"/>
+            <a:r>
+              <a:rPr lang="en-GB" altLang="x-none" sz="3600" dirty="0"/>
+              <a:t>Not sure if </a:t>
+            </a:r>
+            <a:r>
+              <a:rPr lang="en-GB" altLang="x-none" sz="3600"/>
+              <a:t>I like </a:t>
+            </a:r>
+            <a:r>
+              <a:rPr lang="en-GB" altLang="x-none" sz="3600" dirty="0"/>
+              <a:t>this text, but unsure what to </a:t>
+            </a:r>
+            <a:r>
+              <a:rPr lang="en-GB" altLang="x-none" sz="3600"/>
+              <a:t>have here</a:t>
+            </a:r>
+            <a:endParaRPr lang="x-none" altLang="x-none" sz="3600" dirty="0"/>
           </a:p>
         </p:txBody>
       </p:sp>
@@ -8430,8 +8413,8 @@
         </p:nvGrpSpPr>
         <p:grpSpPr>
           <a:xfrm>
-            <a:off x="10706152" y="-12661982"/>
-            <a:ext cx="4246255" cy="25442208"/>
+            <a:off x="12065032" y="2395480"/>
+            <a:ext cx="2821056" cy="16902867"/>
             <a:chOff x="10706152" y="-12661982"/>
             <a:chExt cx="4246255" cy="25442208"/>
           </a:xfrm>
@@ -9169,8 +9152,8 @@
         </p:nvSpPr>
         <p:spPr bwMode="auto">
           <a:xfrm>
-            <a:off x="10706152" y="1272498"/>
-            <a:ext cx="4232361" cy="1098794"/>
+            <a:off x="12051139" y="1272498"/>
+            <a:ext cx="2887374" cy="1098794"/>
           </a:xfrm>
           <a:prstGeom prst="rect">
             <a:avLst/>
@@ -9300,8 +9283,8 @@
         </p:nvSpPr>
         <p:spPr bwMode="auto">
           <a:xfrm>
-            <a:off x="10713783" y="10338207"/>
-            <a:ext cx="4224730" cy="1283779"/>
+            <a:off x="12096233" y="10338208"/>
+            <a:ext cx="2842279" cy="1226010"/>
           </a:xfrm>
           <a:prstGeom prst="rect">
             <a:avLst/>
@@ -9363,6 +9346,42 @@
           </a:p>
         </p:txBody>
       </p:sp>
+      <p:pic>
+        <p:nvPicPr>
+          <p:cNvPr id="20" name="Picture 19" descr="Diagram&#10;&#10;Description automatically generated">
+            <a:extLst>
+              <a:ext uri="{FF2B5EF4-FFF2-40B4-BE49-F238E27FC236}">
+                <a16:creationId xmlns:a16="http://schemas.microsoft.com/office/drawing/2014/main" id="{676C64E8-61FE-4861-9715-5EA3ECEE2ACC}"/>
+              </a:ext>
+            </a:extLst>
+          </p:cNvPr>
+          <p:cNvPicPr>
+            <a:picLocks noChangeAspect="1"/>
+          </p:cNvPicPr>
+          <p:nvPr/>
+        </p:nvPicPr>
+        <p:blipFill>
+          <a:blip r:embed="rId20">
+            <a:extLst>
+              <a:ext uri="{28A0092B-C50C-407E-A947-70E740481C1C}">
+                <a14:useLocalDpi xmlns:a14="http://schemas.microsoft.com/office/drawing/2010/main" val="0"/>
+              </a:ext>
+            </a:extLst>
+          </a:blip>
+          <a:stretch>
+            <a:fillRect/>
+          </a:stretch>
+        </p:blipFill>
+        <p:spPr>
+          <a:xfrm>
+            <a:off x="-193524" y="3900427"/>
+            <a:ext cx="12334370" cy="6792973"/>
+          </a:xfrm>
+          <a:prstGeom prst="rect">
+            <a:avLst/>
+          </a:prstGeom>
+        </p:spPr>
+      </p:pic>
     </p:spTree>
   </p:cSld>
   <p:clrMapOvr>
@@ -9397,7 +9416,7 @@
                                     <p:cond delay="0"/>
                                   </p:stCondLst>
                                   <p:childTnLst>
-                                    <p:animMotion origin="layout" path="M 1.11274E-7 -2.87411E-6 L 1.11274E-7 1.18973 " pathEditMode="relative" rAng="0" ptsTypes="AA">
+                                    <p:animMotion origin="layout" path="M 4.93806E-6 -0.79275 L 4.93806E-6 4.53682E-6 " pathEditMode="relative" rAng="0" ptsTypes="AA">
                                       <p:cBhvr>
                                         <p:cTn id="6" dur="20000" fill="hold"/>
                                         <p:tgtEl>
@@ -9408,7 +9427,7 @@
                                           <p:attrName>ppt_y</p:attrName>
                                         </p:attrNameLst>
                                       </p:cBhvr>
-                                      <p:rCtr x="0" y="59486"/>
+                                      <p:rCtr x="0" y="39860"/>
                                     </p:animMotion>
                                   </p:childTnLst>
                                 </p:cTn>
@@ -10583,15 +10602,6 @@
 </file>
 
 <file path=customXml/item1.xml><?xml version="1.0" encoding="utf-8"?>
-<?mso-contentType ?>
-<FormTemplates xmlns="http://schemas.microsoft.com/sharepoint/v3/contenttype/forms">
-  <Display>DocumentLibraryForm</Display>
-  <Edit>DocumentLibraryForm</Edit>
-  <New>DocumentLibraryForm</New>
-</FormTemplates>
-</file>
-
-<file path=customXml/item2.xml><?xml version="1.0" encoding="utf-8"?>
 <ct:contentTypeSchema xmlns:ct="http://schemas.microsoft.com/office/2006/metadata/contentType" xmlns:ma="http://schemas.microsoft.com/office/2006/metadata/properties/metaAttributes" ct:_="" ma:_="" ma:contentTypeName="Document" ma:contentTypeID="0x01010097D40E6585C8784EB4F7A91A219ECB38" ma:contentTypeVersion="0" ma:contentTypeDescription="Create a new document." ma:contentTypeScope="" ma:versionID="225f1df7c0d1d866e72199d38b91779e">
   <xsd:schema xmlns:xsd="http://www.w3.org/2001/XMLSchema" xmlns:p="http://schemas.microsoft.com/office/2006/metadata/properties" targetNamespace="http://schemas.microsoft.com/office/2006/metadata/properties" ma:root="true" ma:fieldsID="4aeb20c0e3442673af7ee10786458764">
     <xsd:element name="properties">
@@ -10640,15 +10650,16 @@
 </ct:contentTypeSchema>
 </file>
 
-<file path=customXml/itemProps1.xml><?xml version="1.0" encoding="utf-8"?>
-<ds:datastoreItem xmlns:ds="http://schemas.openxmlformats.org/officeDocument/2006/customXml" ds:itemID="{54D0D3C5-34E4-4C50-AEF0-1975AC22AD53}">
-  <ds:schemaRefs>
-    <ds:schemaRef ds:uri="http://schemas.microsoft.com/sharepoint/v3/contenttype/forms"/>
-  </ds:schemaRefs>
-</ds:datastoreItem>
+<file path=customXml/item2.xml><?xml version="1.0" encoding="utf-8"?>
+<?mso-contentType ?>
+<FormTemplates xmlns="http://schemas.microsoft.com/sharepoint/v3/contenttype/forms">
+  <Display>DocumentLibraryForm</Display>
+  <Edit>DocumentLibraryForm</Edit>
+  <New>DocumentLibraryForm</New>
+</FormTemplates>
 </file>
 
-<file path=customXml/itemProps2.xml><?xml version="1.0" encoding="utf-8"?>
+<file path=customXml/itemProps1.xml><?xml version="1.0" encoding="utf-8"?>
 <ds:datastoreItem xmlns:ds="http://schemas.openxmlformats.org/officeDocument/2006/customXml" ds:itemID="{069E428E-B4E8-4A06-9EB6-04820EC0F3C0}">
   <ds:schemaRefs>
     <ds:schemaRef ds:uri="http://schemas.microsoft.com/office/2006/metadata/contentType"/>
@@ -10661,4 +10672,12 @@
     <ds:schemaRef ds:uri="http://schemas.microsoft.com/office/internal/2005/internalDocumentation"/>
   </ds:schemaRefs>
 </ds:datastoreItem>
+</file>
+
+<file path=customXml/itemProps2.xml><?xml version="1.0" encoding="utf-8"?>
+<ds:datastoreItem xmlns:ds="http://schemas.openxmlformats.org/officeDocument/2006/customXml" ds:itemID="{54D0D3C5-34E4-4C50-AEF0-1975AC22AD53}">
+  <ds:schemaRefs>
+    <ds:schemaRef ds:uri="http://schemas.microsoft.com/sharepoint/v3/contenttype/forms"/>
+  </ds:schemaRefs>
+</ds:datastoreItem>
 </file>
</xml_diff>

<commit_message>
second draft of the poster done
</commit_message>
<xml_diff>
--- a/docs/open_day/CE301 Open Day Poster Template.pptx
+++ b/docs/open_day/CE301 Open Day Poster Template.pptx
@@ -8,7 +8,7 @@
     <p:notesMasterId r:id="rId5"/>
   </p:notesMasterIdLst>
   <p:sldIdLst>
-    <p:sldId id="256" r:id="rId4"/>
+    <p:sldId id="257" r:id="rId4"/>
   </p:sldIdLst>
   <p:sldSz cx="15122525" cy="10693400"/>
   <p:notesSz cx="20929600" cy="29819600"/>
@@ -143,6 +143,18 @@
     </p:ext>
   </p:extLst>
 </p:presentation>
+</file>
+
+<file path=ppt/commentAuthors.xml><?xml version="1.0" encoding="utf-8"?>
+<p:cmAuthorLst xmlns:a="http://schemas.openxmlformats.org/drawingml/2006/main" xmlns:r="http://schemas.openxmlformats.org/officeDocument/2006/relationships" xmlns:p="http://schemas.openxmlformats.org/presentationml/2006/main">
+  <p:cmAuthor id="1" name="JAMEEL, Mohammad Shoaib" initials="JMS" lastIdx="2" clrIdx="0">
+    <p:extLst>
+      <p:ext uri="{19B8F6BF-5375-455C-9EA6-DF929625EA0E}">
+        <p15:presenceInfo xmlns:p15="http://schemas.microsoft.com/office/powerpoint/2012/main" userId="JAMEEL, Mohammad Shoaib" providerId="None"/>
+      </p:ext>
+    </p:extLst>
+  </p:cmAuthor>
+</p:cmAuthorLst>
 </file>
 
 <file path=ppt/revisionInfo.xml><?xml version="1.0" encoding="utf-8"?>
@@ -3846,7 +3858,7 @@
           <a:p>
             <a:fld id="{6823682D-4EC1-4460-9FEF-F862992620B6}" type="datetimeFigureOut">
               <a:rPr lang="en-GB" smtClean="0"/>
-              <a:t>04/03/2022</a:t>
+              <a:t>09/03/2022</a:t>
             </a:fld>
             <a:endParaRPr lang="en-GB"/>
           </a:p>
@@ -4188,7 +4200,7 @@
     </p:spTree>
     <p:extLst>
       <p:ext uri="{BB962C8B-B14F-4D97-AF65-F5344CB8AC3E}">
-        <p14:creationId xmlns:p14="http://schemas.microsoft.com/office/powerpoint/2010/main" val="3589135347"/>
+        <p14:creationId xmlns:p14="http://schemas.microsoft.com/office/powerpoint/2010/main" val="2466257972"/>
       </p:ext>
     </p:extLst>
   </p:cSld>
@@ -6787,7 +6799,7 @@
               </a14:hiddenLine>
             </a:ext>
             <a:ext uri="{FAA26D3D-D897-4be2-8F04-BA451C77F1D7}">
-              <ma14:placeholderFlag xmlns="" xmlns:ma14="http://schemas.microsoft.com/office/mac/drawingml/2011/main" val="1"/>
+              <ma14:placeholderFlag xmlns:ma14="http://schemas.microsoft.com/office/mac/drawingml/2011/main" xmlns="" val="1"/>
             </a:ext>
           </a:extLst>
         </p:spPr>
@@ -6848,7 +6860,7 @@
               </a14:hiddenLine>
             </a:ext>
             <a:ext uri="{FAA26D3D-D897-4be2-8F04-BA451C77F1D7}">
-              <ma14:placeholderFlag xmlns="" xmlns:ma14="http://schemas.microsoft.com/office/mac/drawingml/2011/main" val="1"/>
+              <ma14:placeholderFlag xmlns:ma14="http://schemas.microsoft.com/office/mac/drawingml/2011/main" xmlns="" val="1"/>
             </a:ext>
           </a:extLst>
         </p:spPr>
@@ -7639,7 +7651,7 @@
         </p:nvSpPr>
         <p:spPr bwMode="auto">
           <a:xfrm>
-            <a:off x="168181" y="1626045"/>
+            <a:off x="3496531" y="1421785"/>
             <a:ext cx="8116762" cy="493901"/>
           </a:xfrm>
           <a:prstGeom prst="rect">
@@ -7798,8 +7810,8 @@
         </p:nvSpPr>
         <p:spPr bwMode="auto">
           <a:xfrm>
-            <a:off x="12065032" y="2368886"/>
-            <a:ext cx="2887374" cy="7969322"/>
+            <a:off x="12065032" y="1943602"/>
+            <a:ext cx="2887374" cy="8394606"/>
           </a:xfrm>
           <a:prstGeom prst="rect">
             <a:avLst/>
@@ -7932,8 +7944,8 @@
         </p:nvSpPr>
         <p:spPr bwMode="auto">
           <a:xfrm>
-            <a:off x="168181" y="4255388"/>
-            <a:ext cx="11690763" cy="6082819"/>
+            <a:off x="168181" y="2812976"/>
+            <a:ext cx="11690763" cy="7525231"/>
           </a:xfrm>
           <a:prstGeom prst="rect">
             <a:avLst/>
@@ -8224,8 +8236,8 @@
         </p:nvSpPr>
         <p:spPr bwMode="auto">
           <a:xfrm>
-            <a:off x="168181" y="2368884"/>
-            <a:ext cx="11698946" cy="1681187"/>
+            <a:off x="159998" y="1942158"/>
+            <a:ext cx="11698946" cy="705654"/>
           </a:xfrm>
           <a:prstGeom prst="rect">
             <a:avLst/>
@@ -8345,29 +8357,9 @@
           <a:p>
             <a:pPr algn="ctr" eaLnBrk="1" hangingPunct="1"/>
             <a:r>
-              <a:rPr lang="en-GB" altLang="x-none" sz="4800" dirty="0"/>
-              <a:t>Innovative, Intelligent and Industry Ready</a:t>
+              <a:rPr lang="en-GB" altLang="x-none" sz="4000" dirty="0"/>
+              <a:t>Intelligent Industry Ready Conversational System</a:t>
             </a:r>
-          </a:p>
-          <a:p>
-            <a:pPr algn="ctr" eaLnBrk="1" hangingPunct="1"/>
-            <a:r>
-              <a:rPr lang="en-GB" altLang="x-none" sz="3600" dirty="0"/>
-              <a:t>Not sure if </a:t>
-            </a:r>
-            <a:r>
-              <a:rPr lang="en-GB" altLang="x-none" sz="3600"/>
-              <a:t>I like </a:t>
-            </a:r>
-            <a:r>
-              <a:rPr lang="en-GB" altLang="x-none" sz="3600" dirty="0"/>
-              <a:t>this text, but unsure what to </a:t>
-            </a:r>
-            <a:r>
-              <a:rPr lang="en-GB" altLang="x-none" sz="3600"/>
-              <a:t>have here</a:t>
-            </a:r>
-            <a:endParaRPr lang="x-none" altLang="x-none" sz="3600" dirty="0"/>
           </a:p>
         </p:txBody>
       </p:sp>
@@ -8381,13 +8373,7 @@
             </a:extLst>
           </p:cNvPr>
           <p:cNvGraphicFramePr/>
-          <p:nvPr>
-            <p:extLst>
-              <p:ext uri="{D42A27DB-BD31-4B8C-83A1-F6EECF244321}">
-                <p14:modId xmlns:p14="http://schemas.microsoft.com/office/powerpoint/2010/main" val="2510816496"/>
-              </p:ext>
-            </p:extLst>
-          </p:nvPr>
+          <p:nvPr/>
         </p:nvGraphicFramePr>
         <p:xfrm>
           <a:off x="7561262" y="128520"/>
@@ -8399,874 +8385,76 @@
           </a:graphicData>
         </a:graphic>
       </p:graphicFrame>
-      <p:grpSp>
-        <p:nvGrpSpPr>
-          <p:cNvPr id="32" name="Group 31">
+      <p:pic>
+        <p:nvPicPr>
+          <p:cNvPr id="6" name="Picture 5" descr="Graphical user interface, application&#10;&#10;Description automatically generated">
             <a:extLst>
               <a:ext uri="{FF2B5EF4-FFF2-40B4-BE49-F238E27FC236}">
-                <a16:creationId xmlns:a16="http://schemas.microsoft.com/office/drawing/2014/main" id="{C9BE2B4B-9AB6-452E-8963-924078F8E6E8}"/>
+                <a16:creationId xmlns:a16="http://schemas.microsoft.com/office/drawing/2014/main" id="{753CC53E-2CA1-4547-89C7-7AE5890A1E97}"/>
               </a:ext>
             </a:extLst>
           </p:cNvPr>
-          <p:cNvGrpSpPr/>
-          <p:nvPr/>
-        </p:nvGrpSpPr>
-        <p:grpSpPr>
-          <a:xfrm>
-            <a:off x="12065032" y="2395480"/>
-            <a:ext cx="2821056" cy="16902867"/>
-            <a:chOff x="10706152" y="-12661982"/>
-            <a:chExt cx="4246255" cy="25442208"/>
-          </a:xfrm>
-        </p:grpSpPr>
-        <p:grpSp>
-          <p:nvGrpSpPr>
-            <p:cNvPr id="23" name="Group 22">
-              <a:extLst>
-                <a:ext uri="{FF2B5EF4-FFF2-40B4-BE49-F238E27FC236}">
-                  <a16:creationId xmlns:a16="http://schemas.microsoft.com/office/drawing/2014/main" id="{40B8B565-CE10-4E3A-A285-11021B6DA95D}"/>
-                </a:ext>
-              </a:extLst>
-            </p:cNvPr>
-            <p:cNvGrpSpPr/>
-            <p:nvPr/>
-          </p:nvGrpSpPr>
-          <p:grpSpPr>
-            <a:xfrm>
-              <a:off x="10706152" y="128520"/>
-              <a:ext cx="4246255" cy="12651706"/>
-              <a:chOff x="10709060" y="84812"/>
-              <a:chExt cx="4246255" cy="12651706"/>
-            </a:xfrm>
-          </p:grpSpPr>
-          <p:pic>
-            <p:nvPicPr>
-              <p:cNvPr id="19" name="P9" descr="Logo, company name&#10;&#10;Description automatically generated">
-                <a:extLst>
-                  <a:ext uri="{FF2B5EF4-FFF2-40B4-BE49-F238E27FC236}">
-                    <a16:creationId xmlns:a16="http://schemas.microsoft.com/office/drawing/2014/main" id="{4A76A335-CBCB-4B4C-A702-75530B641BD6}"/>
-                  </a:ext>
-                </a:extLst>
-              </p:cNvPr>
-              <p:cNvPicPr>
-                <a:picLocks noChangeAspect="1"/>
-              </p:cNvPicPr>
-              <p:nvPr/>
-            </p:nvPicPr>
-            <p:blipFill rotWithShape="1">
-              <a:blip r:embed="rId9">
-                <a:extLst>
-                  <a:ext uri="{BEBA8EAE-BF5A-486C-A8C5-ECC9F3942E4B}">
-                    <a14:imgProps xmlns:a14="http://schemas.microsoft.com/office/drawing/2010/main">
-                      <a14:imgLayer r:embed="rId10">
-                        <a14:imgEffect>
-                          <a14:backgroundRemoval t="10000" b="90000" l="10000" r="90000">
-                            <a14:foregroundMark x1="41880" y1="50091" x2="41880" y2="50091"/>
-                            <a14:foregroundMark x1="54680" y1="52899" x2="54680" y2="52899"/>
-                            <a14:foregroundMark x1="54520" y1="38225" x2="54520" y2="38225"/>
-                            <a14:foregroundMark x1="58880" y1="41757" x2="58880" y2="41757"/>
-                            <a14:foregroundMark x1="65560" y1="45743" x2="65560" y2="45743"/>
-                            <a14:foregroundMark x1="79120" y1="52446" x2="79120" y2="52446"/>
-                            <a14:foregroundMark x1="83240" y1="46558" x2="83240" y2="46558"/>
-                          </a14:backgroundRemoval>
-                        </a14:imgEffect>
-                      </a14:imgLayer>
-                    </a14:imgProps>
-                  </a:ext>
-                  <a:ext uri="{28A0092B-C50C-407E-A947-70E740481C1C}">
-                    <a14:useLocalDpi xmlns:a14="http://schemas.microsoft.com/office/drawing/2010/main" val="0"/>
-                  </a:ext>
-                </a:extLst>
-              </a:blip>
-              <a:srcRect l="7998" t="19745" r="7793" b="13703"/>
-              <a:stretch/>
-            </p:blipFill>
-            <p:spPr>
-              <a:xfrm>
-                <a:off x="10854325" y="4305959"/>
-                <a:ext cx="4000708" cy="1396269"/>
-              </a:xfrm>
-              <a:prstGeom prst="rect">
-                <a:avLst/>
-              </a:prstGeom>
-            </p:spPr>
-          </p:pic>
-          <p:pic>
-            <p:nvPicPr>
-              <p:cNvPr id="5" name="P8" descr="Icon&#10;&#10;Description automatically generated">
-                <a:extLst>
-                  <a:ext uri="{FF2B5EF4-FFF2-40B4-BE49-F238E27FC236}">
-                    <a16:creationId xmlns:a16="http://schemas.microsoft.com/office/drawing/2014/main" id="{029BAEBB-00D4-4C14-BA21-1BDE60931E64}"/>
-                  </a:ext>
-                </a:extLst>
-              </p:cNvPr>
-              <p:cNvPicPr>
-                <a:picLocks noChangeAspect="1"/>
-              </p:cNvPicPr>
-              <p:nvPr/>
-            </p:nvPicPr>
-            <p:blipFill>
-              <a:blip r:embed="rId11">
-                <a:extLst>
-                  <a:ext uri="{28A0092B-C50C-407E-A947-70E740481C1C}">
-                    <a14:useLocalDpi xmlns:a14="http://schemas.microsoft.com/office/drawing/2010/main" val="0"/>
-                  </a:ext>
-                </a:extLst>
-              </a:blip>
-              <a:stretch>
-                <a:fillRect/>
-              </a:stretch>
-            </p:blipFill>
-            <p:spPr>
-              <a:xfrm>
-                <a:off x="10801031" y="5829667"/>
-                <a:ext cx="4031056" cy="1580807"/>
-              </a:xfrm>
-              <a:prstGeom prst="rect">
-                <a:avLst/>
-              </a:prstGeom>
-            </p:spPr>
-          </p:pic>
-          <p:pic>
-            <p:nvPicPr>
-              <p:cNvPr id="3" name="P7" descr="A screenshot of a video game&#10;&#10;Description automatically generated with medium confidence">
-                <a:extLst>
-                  <a:ext uri="{FF2B5EF4-FFF2-40B4-BE49-F238E27FC236}">
-                    <a16:creationId xmlns:a16="http://schemas.microsoft.com/office/drawing/2014/main" id="{DB1BC595-5E72-4DED-AD00-E070B0C815B4}"/>
-                  </a:ext>
-                </a:extLst>
-              </p:cNvPr>
-              <p:cNvPicPr>
-                <a:picLocks noChangeAspect="1"/>
-              </p:cNvPicPr>
-              <p:nvPr/>
-            </p:nvPicPr>
-            <p:blipFill>
-              <a:blip r:embed="rId12">
-                <a:extLst>
-                  <a:ext uri="{28A0092B-C50C-407E-A947-70E740481C1C}">
-                    <a14:useLocalDpi xmlns:a14="http://schemas.microsoft.com/office/drawing/2010/main" val="0"/>
-                  </a:ext>
-                </a:extLst>
-              </a:blip>
-              <a:stretch>
-                <a:fillRect/>
-              </a:stretch>
-            </p:blipFill>
-            <p:spPr>
-              <a:xfrm>
-                <a:off x="10812385" y="11594110"/>
-                <a:ext cx="4084588" cy="1142408"/>
-              </a:xfrm>
-              <a:prstGeom prst="rect">
-                <a:avLst/>
-              </a:prstGeom>
-            </p:spPr>
-          </p:pic>
-          <p:pic>
-            <p:nvPicPr>
-              <p:cNvPr id="14" name="P6" descr="Logo&#10;&#10;Description automatically generated with low confidence">
-                <a:extLst>
-                  <a:ext uri="{FF2B5EF4-FFF2-40B4-BE49-F238E27FC236}">
-                    <a16:creationId xmlns:a16="http://schemas.microsoft.com/office/drawing/2014/main" id="{0DBE5031-8AAF-47C8-BF1E-8AAFD29946AA}"/>
-                  </a:ext>
-                </a:extLst>
-              </p:cNvPr>
-              <p:cNvPicPr>
-                <a:picLocks noChangeAspect="1"/>
-              </p:cNvPicPr>
-              <p:nvPr/>
-            </p:nvPicPr>
-            <p:blipFill>
-              <a:blip r:embed="rId13">
-                <a:extLst>
-                  <a:ext uri="{28A0092B-C50C-407E-A947-70E740481C1C}">
-                    <a14:useLocalDpi xmlns:a14="http://schemas.microsoft.com/office/drawing/2010/main" val="0"/>
-                  </a:ext>
-                </a:extLst>
-              </a:blip>
-              <a:stretch>
-                <a:fillRect/>
-              </a:stretch>
-            </p:blipFill>
-            <p:spPr>
-              <a:xfrm>
-                <a:off x="10826825" y="7537913"/>
-                <a:ext cx="3768976" cy="1089469"/>
-              </a:xfrm>
-              <a:prstGeom prst="rect">
-                <a:avLst/>
-              </a:prstGeom>
-            </p:spPr>
-          </p:pic>
-          <p:pic>
-            <p:nvPicPr>
-              <p:cNvPr id="16" name="P5" descr="Logo, icon&#10;&#10;Description automatically generated">
-                <a:extLst>
-                  <a:ext uri="{FF2B5EF4-FFF2-40B4-BE49-F238E27FC236}">
-                    <a16:creationId xmlns:a16="http://schemas.microsoft.com/office/drawing/2014/main" id="{B5146A31-3B8A-401E-880D-76DD05AF67AA}"/>
-                  </a:ext>
-                </a:extLst>
-              </p:cNvPr>
-              <p:cNvPicPr>
-                <a:picLocks noChangeAspect="1"/>
-              </p:cNvPicPr>
-              <p:nvPr/>
-            </p:nvPicPr>
-            <p:blipFill>
-              <a:blip r:embed="rId14">
-                <a:extLst>
-                  <a:ext uri="{28A0092B-C50C-407E-A947-70E740481C1C}">
-                    <a14:useLocalDpi xmlns:a14="http://schemas.microsoft.com/office/drawing/2010/main" val="0"/>
-                  </a:ext>
-                </a:extLst>
-              </a:blip>
-              <a:stretch>
-                <a:fillRect/>
-              </a:stretch>
-            </p:blipFill>
-            <p:spPr>
-              <a:xfrm>
-                <a:off x="10966406" y="8904975"/>
-                <a:ext cx="3731563" cy="958525"/>
-              </a:xfrm>
-              <a:prstGeom prst="rect">
-                <a:avLst/>
-              </a:prstGeom>
-            </p:spPr>
-          </p:pic>
-          <p:pic>
-            <p:nvPicPr>
-              <p:cNvPr id="18" name="P4" descr="Shape&#10;&#10;Description automatically generated with low confidence">
-                <a:extLst>
-                  <a:ext uri="{FF2B5EF4-FFF2-40B4-BE49-F238E27FC236}">
-                    <a16:creationId xmlns:a16="http://schemas.microsoft.com/office/drawing/2014/main" id="{8FF677B0-CD78-40EC-965A-057A22352AC5}"/>
-                  </a:ext>
-                </a:extLst>
-              </p:cNvPr>
-              <p:cNvPicPr>
-                <a:picLocks noChangeAspect="1"/>
-              </p:cNvPicPr>
-              <p:nvPr/>
-            </p:nvPicPr>
-            <p:blipFill>
-              <a:blip r:embed="rId15">
-                <a:extLst>
-                  <a:ext uri="{28A0092B-C50C-407E-A947-70E740481C1C}">
-                    <a14:useLocalDpi xmlns:a14="http://schemas.microsoft.com/office/drawing/2010/main" val="0"/>
-                  </a:ext>
-                </a:extLst>
-              </a:blip>
-              <a:stretch>
-                <a:fillRect/>
-              </a:stretch>
-            </p:blipFill>
-            <p:spPr>
-              <a:xfrm>
-                <a:off x="10903903" y="10076109"/>
-                <a:ext cx="4051412" cy="1281892"/>
-              </a:xfrm>
-              <a:prstGeom prst="rect">
-                <a:avLst/>
-              </a:prstGeom>
-            </p:spPr>
-          </p:pic>
-          <p:pic>
-            <p:nvPicPr>
-              <p:cNvPr id="12" name="P3" descr="A crescent moon in a black sky&#10;&#10;Description automatically generated with low confidence">
-                <a:extLst>
-                  <a:ext uri="{FF2B5EF4-FFF2-40B4-BE49-F238E27FC236}">
-                    <a16:creationId xmlns:a16="http://schemas.microsoft.com/office/drawing/2014/main" id="{37BF2A03-A750-47A9-8C6F-FE7FEEF6B7E9}"/>
-                  </a:ext>
-                </a:extLst>
-              </p:cNvPr>
-              <p:cNvPicPr>
-                <a:picLocks noChangeAspect="1"/>
-              </p:cNvPicPr>
-              <p:nvPr/>
-            </p:nvPicPr>
-            <p:blipFill rotWithShape="1">
-              <a:blip r:embed="rId16">
-                <a:extLst>
-                  <a:ext uri="{28A0092B-C50C-407E-A947-70E740481C1C}">
-                    <a14:useLocalDpi xmlns:a14="http://schemas.microsoft.com/office/drawing/2010/main" val="0"/>
-                  </a:ext>
-                </a:extLst>
-              </a:blip>
-              <a:srcRect l="13692" t="28321" r="13071" b="27784"/>
-              <a:stretch/>
-            </p:blipFill>
-            <p:spPr>
-              <a:xfrm>
-                <a:off x="10756025" y="2884349"/>
-                <a:ext cx="4199290" cy="1289879"/>
-              </a:xfrm>
-              <a:prstGeom prst="rect">
-                <a:avLst/>
-              </a:prstGeom>
-            </p:spPr>
-          </p:pic>
-          <p:pic>
-            <p:nvPicPr>
-              <p:cNvPr id="10" name="P2" descr="Arrow&#10;&#10;Description automatically generated">
-                <a:extLst>
-                  <a:ext uri="{FF2B5EF4-FFF2-40B4-BE49-F238E27FC236}">
-                    <a16:creationId xmlns:a16="http://schemas.microsoft.com/office/drawing/2014/main" id="{C6D0B061-1E4F-4129-A2DB-0EC8A2B0ED6A}"/>
-                  </a:ext>
-                </a:extLst>
-              </p:cNvPr>
-              <p:cNvPicPr>
-                <a:picLocks noChangeAspect="1"/>
-              </p:cNvPicPr>
-              <p:nvPr/>
-            </p:nvPicPr>
-            <p:blipFill rotWithShape="1">
-              <a:blip r:embed="rId17">
-                <a:extLst>
-                  <a:ext uri="{28A0092B-C50C-407E-A947-70E740481C1C}">
-                    <a14:useLocalDpi xmlns:a14="http://schemas.microsoft.com/office/drawing/2010/main" val="0"/>
-                  </a:ext>
-                </a:extLst>
-              </a:blip>
-              <a:srcRect t="21163" b="21728"/>
-              <a:stretch/>
-            </p:blipFill>
-            <p:spPr>
-              <a:xfrm>
-                <a:off x="10709060" y="1404142"/>
-                <a:ext cx="4214999" cy="1351635"/>
-              </a:xfrm>
-              <a:prstGeom prst="rect">
-                <a:avLst/>
-              </a:prstGeom>
-            </p:spPr>
-          </p:pic>
-          <p:pic>
-            <p:nvPicPr>
-              <p:cNvPr id="29" name="P1" descr="Shape&#10;&#10;Description automatically generated with medium confidence">
-                <a:extLst>
-                  <a:ext uri="{FF2B5EF4-FFF2-40B4-BE49-F238E27FC236}">
-                    <a16:creationId xmlns:a16="http://schemas.microsoft.com/office/drawing/2014/main" id="{5350C8E9-E789-4D10-8BA4-3115FE88FB28}"/>
-                  </a:ext>
-                </a:extLst>
-              </p:cNvPr>
-              <p:cNvPicPr>
-                <a:picLocks noChangeAspect="1"/>
-              </p:cNvPicPr>
-              <p:nvPr/>
-            </p:nvPicPr>
-            <p:blipFill>
-              <a:blip r:embed="rId18">
-                <a:extLst>
-                  <a:ext uri="{28A0092B-C50C-407E-A947-70E740481C1C}">
-                    <a14:useLocalDpi xmlns:a14="http://schemas.microsoft.com/office/drawing/2010/main" val="0"/>
-                  </a:ext>
-                </a:extLst>
-              </a:blip>
-              <a:stretch>
-                <a:fillRect/>
-              </a:stretch>
-            </p:blipFill>
-            <p:spPr>
-              <a:xfrm>
-                <a:off x="10787314" y="84812"/>
-                <a:ext cx="4008939" cy="1143978"/>
-              </a:xfrm>
-              <a:prstGeom prst="rect">
-                <a:avLst/>
-              </a:prstGeom>
-            </p:spPr>
-          </p:pic>
-        </p:grpSp>
-        <p:grpSp>
-          <p:nvGrpSpPr>
-            <p:cNvPr id="69" name="Group 68">
-              <a:extLst>
-                <a:ext uri="{FF2B5EF4-FFF2-40B4-BE49-F238E27FC236}">
-                  <a16:creationId xmlns:a16="http://schemas.microsoft.com/office/drawing/2014/main" id="{3CFC14D0-2BC6-4990-9304-5E0484D44D60}"/>
-                </a:ext>
-              </a:extLst>
-            </p:cNvPr>
-            <p:cNvGrpSpPr/>
-            <p:nvPr/>
-          </p:nvGrpSpPr>
-          <p:grpSpPr>
-            <a:xfrm>
-              <a:off x="10706152" y="-12661982"/>
-              <a:ext cx="4246255" cy="12651706"/>
-              <a:chOff x="10709060" y="84812"/>
-              <a:chExt cx="4246255" cy="12651706"/>
-            </a:xfrm>
-          </p:grpSpPr>
-          <p:pic>
-            <p:nvPicPr>
-              <p:cNvPr id="70" name="P9" descr="Logo, company name&#10;&#10;Description automatically generated">
-                <a:extLst>
-                  <a:ext uri="{FF2B5EF4-FFF2-40B4-BE49-F238E27FC236}">
-                    <a16:creationId xmlns:a16="http://schemas.microsoft.com/office/drawing/2014/main" id="{227928DF-BD72-4962-AE21-9C2244DE831C}"/>
-                  </a:ext>
-                </a:extLst>
-              </p:cNvPr>
-              <p:cNvPicPr>
-                <a:picLocks noChangeAspect="1"/>
-              </p:cNvPicPr>
-              <p:nvPr/>
-            </p:nvPicPr>
-            <p:blipFill rotWithShape="1">
-              <a:blip r:embed="rId9">
-                <a:extLst>
-                  <a:ext uri="{BEBA8EAE-BF5A-486C-A8C5-ECC9F3942E4B}">
-                    <a14:imgProps xmlns:a14="http://schemas.microsoft.com/office/drawing/2010/main">
-                      <a14:imgLayer r:embed="rId10">
-                        <a14:imgEffect>
-                          <a14:backgroundRemoval t="10000" b="90000" l="10000" r="90000">
-                            <a14:foregroundMark x1="41880" y1="50091" x2="41880" y2="50091"/>
-                            <a14:foregroundMark x1="54680" y1="52899" x2="54680" y2="52899"/>
-                            <a14:foregroundMark x1="54520" y1="38225" x2="54520" y2="38225"/>
-                            <a14:foregroundMark x1="58880" y1="41757" x2="58880" y2="41757"/>
-                            <a14:foregroundMark x1="65560" y1="45743" x2="65560" y2="45743"/>
-                            <a14:foregroundMark x1="79120" y1="52446" x2="79120" y2="52446"/>
-                            <a14:foregroundMark x1="83240" y1="46558" x2="83240" y2="46558"/>
-                          </a14:backgroundRemoval>
-                        </a14:imgEffect>
-                      </a14:imgLayer>
-                    </a14:imgProps>
-                  </a:ext>
-                  <a:ext uri="{28A0092B-C50C-407E-A947-70E740481C1C}">
-                    <a14:useLocalDpi xmlns:a14="http://schemas.microsoft.com/office/drawing/2010/main" val="0"/>
-                  </a:ext>
-                </a:extLst>
-              </a:blip>
-              <a:srcRect l="7998" t="19745" r="7793" b="13703"/>
-              <a:stretch/>
-            </p:blipFill>
-            <p:spPr>
-              <a:xfrm>
-                <a:off x="10854325" y="4305959"/>
-                <a:ext cx="4000708" cy="1396269"/>
-              </a:xfrm>
-              <a:prstGeom prst="rect">
-                <a:avLst/>
-              </a:prstGeom>
-            </p:spPr>
-          </p:pic>
-          <p:pic>
-            <p:nvPicPr>
-              <p:cNvPr id="71" name="P8" descr="Icon&#10;&#10;Description automatically generated">
-                <a:extLst>
-                  <a:ext uri="{FF2B5EF4-FFF2-40B4-BE49-F238E27FC236}">
-                    <a16:creationId xmlns:a16="http://schemas.microsoft.com/office/drawing/2014/main" id="{E249C3E4-8EBA-4244-92CE-EEF2B7361521}"/>
-                  </a:ext>
-                </a:extLst>
-              </p:cNvPr>
-              <p:cNvPicPr>
-                <a:picLocks noChangeAspect="1"/>
-              </p:cNvPicPr>
-              <p:nvPr/>
-            </p:nvPicPr>
-            <p:blipFill>
-              <a:blip r:embed="rId11">
-                <a:extLst>
-                  <a:ext uri="{28A0092B-C50C-407E-A947-70E740481C1C}">
-                    <a14:useLocalDpi xmlns:a14="http://schemas.microsoft.com/office/drawing/2010/main" val="0"/>
-                  </a:ext>
-                </a:extLst>
-              </a:blip>
-              <a:stretch>
-                <a:fillRect/>
-              </a:stretch>
-            </p:blipFill>
-            <p:spPr>
-              <a:xfrm>
-                <a:off x="10801031" y="5829667"/>
-                <a:ext cx="4031056" cy="1580807"/>
-              </a:xfrm>
-              <a:prstGeom prst="rect">
-                <a:avLst/>
-              </a:prstGeom>
-            </p:spPr>
-          </p:pic>
-          <p:pic>
-            <p:nvPicPr>
-              <p:cNvPr id="72" name="P7" descr="A screenshot of a video game&#10;&#10;Description automatically generated with medium confidence">
-                <a:extLst>
-                  <a:ext uri="{FF2B5EF4-FFF2-40B4-BE49-F238E27FC236}">
-                    <a16:creationId xmlns:a16="http://schemas.microsoft.com/office/drawing/2014/main" id="{2DA70CA0-8192-47C7-A63D-63C7941DD62B}"/>
-                  </a:ext>
-                </a:extLst>
-              </p:cNvPr>
-              <p:cNvPicPr>
-                <a:picLocks noChangeAspect="1"/>
-              </p:cNvPicPr>
-              <p:nvPr/>
-            </p:nvPicPr>
-            <p:blipFill>
-              <a:blip r:embed="rId12">
-                <a:extLst>
-                  <a:ext uri="{28A0092B-C50C-407E-A947-70E740481C1C}">
-                    <a14:useLocalDpi xmlns:a14="http://schemas.microsoft.com/office/drawing/2010/main" val="0"/>
-                  </a:ext>
-                </a:extLst>
-              </a:blip>
-              <a:stretch>
-                <a:fillRect/>
-              </a:stretch>
-            </p:blipFill>
-            <p:spPr>
-              <a:xfrm>
-                <a:off x="10812385" y="11594110"/>
-                <a:ext cx="4084588" cy="1142408"/>
-              </a:xfrm>
-              <a:prstGeom prst="rect">
-                <a:avLst/>
-              </a:prstGeom>
-            </p:spPr>
-          </p:pic>
-          <p:pic>
-            <p:nvPicPr>
-              <p:cNvPr id="73" name="P6" descr="Logo&#10;&#10;Description automatically generated with low confidence">
-                <a:extLst>
-                  <a:ext uri="{FF2B5EF4-FFF2-40B4-BE49-F238E27FC236}">
-                    <a16:creationId xmlns:a16="http://schemas.microsoft.com/office/drawing/2014/main" id="{EE0C7809-C1CC-47FC-9450-B7836FBAA78A}"/>
-                  </a:ext>
-                </a:extLst>
-              </p:cNvPr>
-              <p:cNvPicPr>
-                <a:picLocks noChangeAspect="1"/>
-              </p:cNvPicPr>
-              <p:nvPr/>
-            </p:nvPicPr>
-            <p:blipFill>
-              <a:blip r:embed="rId13">
-                <a:extLst>
-                  <a:ext uri="{28A0092B-C50C-407E-A947-70E740481C1C}">
-                    <a14:useLocalDpi xmlns:a14="http://schemas.microsoft.com/office/drawing/2010/main" val="0"/>
-                  </a:ext>
-                </a:extLst>
-              </a:blip>
-              <a:stretch>
-                <a:fillRect/>
-              </a:stretch>
-            </p:blipFill>
-            <p:spPr>
-              <a:xfrm>
-                <a:off x="10826825" y="7537913"/>
-                <a:ext cx="3768976" cy="1089469"/>
-              </a:xfrm>
-              <a:prstGeom prst="rect">
-                <a:avLst/>
-              </a:prstGeom>
-            </p:spPr>
-          </p:pic>
-          <p:pic>
-            <p:nvPicPr>
-              <p:cNvPr id="74" name="P5" descr="Logo, icon&#10;&#10;Description automatically generated">
-                <a:extLst>
-                  <a:ext uri="{FF2B5EF4-FFF2-40B4-BE49-F238E27FC236}">
-                    <a16:creationId xmlns:a16="http://schemas.microsoft.com/office/drawing/2014/main" id="{8370A755-7EDD-4464-B418-BD1033BB2D72}"/>
-                  </a:ext>
-                </a:extLst>
-              </p:cNvPr>
-              <p:cNvPicPr>
-                <a:picLocks noChangeAspect="1"/>
-              </p:cNvPicPr>
-              <p:nvPr/>
-            </p:nvPicPr>
-            <p:blipFill>
-              <a:blip r:embed="rId14">
-                <a:extLst>
-                  <a:ext uri="{28A0092B-C50C-407E-A947-70E740481C1C}">
-                    <a14:useLocalDpi xmlns:a14="http://schemas.microsoft.com/office/drawing/2010/main" val="0"/>
-                  </a:ext>
-                </a:extLst>
-              </a:blip>
-              <a:stretch>
-                <a:fillRect/>
-              </a:stretch>
-            </p:blipFill>
-            <p:spPr>
-              <a:xfrm>
-                <a:off x="10966406" y="8904975"/>
-                <a:ext cx="3731563" cy="958525"/>
-              </a:xfrm>
-              <a:prstGeom prst="rect">
-                <a:avLst/>
-              </a:prstGeom>
-            </p:spPr>
-          </p:pic>
-          <p:pic>
-            <p:nvPicPr>
-              <p:cNvPr id="75" name="P4" descr="Shape&#10;&#10;Description automatically generated with low confidence">
-                <a:extLst>
-                  <a:ext uri="{FF2B5EF4-FFF2-40B4-BE49-F238E27FC236}">
-                    <a16:creationId xmlns:a16="http://schemas.microsoft.com/office/drawing/2014/main" id="{413D455E-3A6F-4EB5-966B-2DFF6C4C122D}"/>
-                  </a:ext>
-                </a:extLst>
-              </p:cNvPr>
-              <p:cNvPicPr>
-                <a:picLocks noChangeAspect="1"/>
-              </p:cNvPicPr>
-              <p:nvPr/>
-            </p:nvPicPr>
-            <p:blipFill>
-              <a:blip r:embed="rId15">
-                <a:extLst>
-                  <a:ext uri="{28A0092B-C50C-407E-A947-70E740481C1C}">
-                    <a14:useLocalDpi xmlns:a14="http://schemas.microsoft.com/office/drawing/2010/main" val="0"/>
-                  </a:ext>
-                </a:extLst>
-              </a:blip>
-              <a:stretch>
-                <a:fillRect/>
-              </a:stretch>
-            </p:blipFill>
-            <p:spPr>
-              <a:xfrm>
-                <a:off x="10903903" y="10076109"/>
-                <a:ext cx="4051412" cy="1281892"/>
-              </a:xfrm>
-              <a:prstGeom prst="rect">
-                <a:avLst/>
-              </a:prstGeom>
-            </p:spPr>
-          </p:pic>
-          <p:pic>
-            <p:nvPicPr>
-              <p:cNvPr id="76" name="P3" descr="A crescent moon in a black sky&#10;&#10;Description automatically generated with low confidence">
-                <a:extLst>
-                  <a:ext uri="{FF2B5EF4-FFF2-40B4-BE49-F238E27FC236}">
-                    <a16:creationId xmlns:a16="http://schemas.microsoft.com/office/drawing/2014/main" id="{28EAC677-5965-480D-9AA5-B30C90EF4C73}"/>
-                  </a:ext>
-                </a:extLst>
-              </p:cNvPr>
-              <p:cNvPicPr>
-                <a:picLocks noChangeAspect="1"/>
-              </p:cNvPicPr>
-              <p:nvPr/>
-            </p:nvPicPr>
-            <p:blipFill rotWithShape="1">
-              <a:blip r:embed="rId16">
-                <a:extLst>
-                  <a:ext uri="{28A0092B-C50C-407E-A947-70E740481C1C}">
-                    <a14:useLocalDpi xmlns:a14="http://schemas.microsoft.com/office/drawing/2010/main" val="0"/>
-                  </a:ext>
-                </a:extLst>
-              </a:blip>
-              <a:srcRect l="13692" t="28321" r="13071" b="27784"/>
-              <a:stretch/>
-            </p:blipFill>
-            <p:spPr>
-              <a:xfrm>
-                <a:off x="10756025" y="2884349"/>
-                <a:ext cx="4199290" cy="1289879"/>
-              </a:xfrm>
-              <a:prstGeom prst="rect">
-                <a:avLst/>
-              </a:prstGeom>
-            </p:spPr>
-          </p:pic>
-          <p:pic>
-            <p:nvPicPr>
-              <p:cNvPr id="77" name="P2" descr="Arrow&#10;&#10;Description automatically generated">
-                <a:extLst>
-                  <a:ext uri="{FF2B5EF4-FFF2-40B4-BE49-F238E27FC236}">
-                    <a16:creationId xmlns:a16="http://schemas.microsoft.com/office/drawing/2014/main" id="{8BF77BEC-D234-4A35-8681-1F3CB59FC350}"/>
-                  </a:ext>
-                </a:extLst>
-              </p:cNvPr>
-              <p:cNvPicPr>
-                <a:picLocks noChangeAspect="1"/>
-              </p:cNvPicPr>
-              <p:nvPr/>
-            </p:nvPicPr>
-            <p:blipFill rotWithShape="1">
-              <a:blip r:embed="rId17">
-                <a:extLst>
-                  <a:ext uri="{28A0092B-C50C-407E-A947-70E740481C1C}">
-                    <a14:useLocalDpi xmlns:a14="http://schemas.microsoft.com/office/drawing/2010/main" val="0"/>
-                  </a:ext>
-                </a:extLst>
-              </a:blip>
-              <a:srcRect t="21163" b="21728"/>
-              <a:stretch/>
-            </p:blipFill>
-            <p:spPr>
-              <a:xfrm>
-                <a:off x="10709060" y="1404142"/>
-                <a:ext cx="4214999" cy="1351635"/>
-              </a:xfrm>
-              <a:prstGeom prst="rect">
-                <a:avLst/>
-              </a:prstGeom>
-            </p:spPr>
-          </p:pic>
-          <p:pic>
-            <p:nvPicPr>
-              <p:cNvPr id="78" name="P1" descr="Shape&#10;&#10;Description automatically generated with medium confidence">
-                <a:extLst>
-                  <a:ext uri="{FF2B5EF4-FFF2-40B4-BE49-F238E27FC236}">
-                    <a16:creationId xmlns:a16="http://schemas.microsoft.com/office/drawing/2014/main" id="{8520E8D1-218D-4C54-8058-B89C1C6AB621}"/>
-                  </a:ext>
-                </a:extLst>
-              </p:cNvPr>
-              <p:cNvPicPr>
-                <a:picLocks noChangeAspect="1"/>
-              </p:cNvPicPr>
-              <p:nvPr/>
-            </p:nvPicPr>
-            <p:blipFill>
-              <a:blip r:embed="rId18">
-                <a:extLst>
-                  <a:ext uri="{28A0092B-C50C-407E-A947-70E740481C1C}">
-                    <a14:useLocalDpi xmlns:a14="http://schemas.microsoft.com/office/drawing/2010/main" val="0"/>
-                  </a:ext>
-                </a:extLst>
-              </a:blip>
-              <a:stretch>
-                <a:fillRect/>
-              </a:stretch>
-            </p:blipFill>
-            <p:spPr>
-              <a:xfrm>
-                <a:off x="10787314" y="84812"/>
-                <a:ext cx="4008939" cy="1143978"/>
-              </a:xfrm>
-              <a:prstGeom prst="rect">
-                <a:avLst/>
-              </a:prstGeom>
-            </p:spPr>
-          </p:pic>
-        </p:grpSp>
-      </p:grpSp>
-      <p:sp>
-        <p:nvSpPr>
-          <p:cNvPr id="21" name="Rectangle 20">
-            <a:extLst>
-              <a:ext uri="{FF2B5EF4-FFF2-40B4-BE49-F238E27FC236}">
-                <a16:creationId xmlns:a16="http://schemas.microsoft.com/office/drawing/2014/main" id="{873B54E8-874F-4728-8960-C46618EEE5E4}"/>
-              </a:ext>
-            </a:extLst>
-          </p:cNvPr>
-          <p:cNvSpPr/>
-          <p:nvPr/>
-        </p:nvSpPr>
-        <p:spPr bwMode="auto">
-          <a:xfrm>
-            <a:off x="12051139" y="1272498"/>
-            <a:ext cx="2887374" cy="1098794"/>
-          </a:xfrm>
-          <a:prstGeom prst="rect">
-            <a:avLst/>
-          </a:prstGeom>
-          <a:gradFill>
-            <a:gsLst>
-              <a:gs pos="100000">
-                <a:srgbClr val="CF3938"/>
-              </a:gs>
-              <a:gs pos="0">
-                <a:srgbClr val="CD3737"/>
-              </a:gs>
-            </a:gsLst>
-            <a:lin ang="16200000" scaled="1"/>
-          </a:gradFill>
-          <a:ln w="9525" cap="flat" cmpd="sng" algn="ctr">
-            <a:noFill/>
-            <a:prstDash val="solid"/>
-            <a:round/>
-            <a:headEnd type="none" w="med" len="med"/>
-            <a:tailEnd type="none" w="med" len="med"/>
-          </a:ln>
-          <a:effectLst/>
-        </p:spPr>
-        <p:txBody>
-          <a:bodyPr vert="horz" wrap="square" lIns="91440" tIns="45720" rIns="91440" bIns="45720" numCol="1" rtlCol="0" anchor="t" anchorCtr="0" compatLnSpc="1">
-            <a:prstTxWarp prst="textNoShape">
-              <a:avLst/>
-            </a:prstTxWarp>
-          </a:bodyPr>
-          <a:lstStyle/>
-          <a:p>
-            <a:pPr marL="0" marR="0" indent="0" algn="l" defTabSz="2859088" rtl="0" eaLnBrk="1" fontAlgn="base" latinLnBrk="0" hangingPunct="1">
-              <a:lnSpc>
-                <a:spcPct val="100000"/>
-              </a:lnSpc>
-              <a:spcBef>
-                <a:spcPct val="0"/>
-              </a:spcBef>
-              <a:spcAft>
-                <a:spcPct val="0"/>
-              </a:spcAft>
-              <a:buClrTx/>
-              <a:buSzTx/>
-              <a:buFontTx/>
-              <a:buNone/>
-              <a:tabLst/>
-            </a:pPr>
-            <a:endParaRPr kumimoji="0" lang="en-GB" sz="5600" b="0" i="0" u="none" strike="noStrike" cap="none" normalizeH="0" baseline="0">
-              <a:ln>
-                <a:noFill/>
-              </a:ln>
-              <a:solidFill>
-                <a:schemeClr val="tx1"/>
-              </a:solidFill>
-              <a:effectLst/>
-              <a:latin typeface="Arial" charset="0"/>
-            </a:endParaRPr>
-          </a:p>
-        </p:txBody>
-      </p:sp>
-      <p:pic>
-        <p:nvPicPr>
-          <p:cNvPr id="2053" name="Picture 5" descr="use RH modified.jpg"/>
           <p:cNvPicPr>
             <a:picLocks noChangeAspect="1"/>
           </p:cNvPicPr>
           <p:nvPr/>
         </p:nvPicPr>
         <p:blipFill>
-          <a:blip r:embed="rId19">
+          <a:blip r:embed="rId9">
             <a:extLst>
               <a:ext uri="{28A0092B-C50C-407E-A947-70E740481C1C}">
                 <a14:useLocalDpi xmlns:a14="http://schemas.microsoft.com/office/drawing/2010/main" val="0"/>
               </a:ext>
             </a:extLst>
           </a:blip>
-          <a:srcRect/>
           <a:stretch>
             <a:fillRect/>
           </a:stretch>
         </p:blipFill>
-        <p:spPr bwMode="auto">
+        <p:spPr>
           <a:xfrm>
-            <a:off x="9459913" y="0"/>
-            <a:ext cx="5662612" cy="1363663"/>
+            <a:off x="1008534" y="2522097"/>
+            <a:ext cx="10246374" cy="8042783"/>
           </a:xfrm>
           <a:prstGeom prst="rect">
             <a:avLst/>
           </a:prstGeom>
-          <a:noFill/>
-          <a:ln>
-            <a:noFill/>
-          </a:ln>
-          <a:extLst>
-            <a:ext uri="{909E8E84-426E-40DD-AFC4-6F175D3DCCD1}">
-              <a14:hiddenFill xmlns:a14="http://schemas.microsoft.com/office/drawing/2010/main">
-                <a:solidFill>
-                  <a:srgbClr val="FFFFFF"/>
-                </a:solidFill>
-              </a14:hiddenFill>
-            </a:ext>
-            <a:ext uri="{91240B29-F687-4F45-9708-019B960494DF}">
-              <a14:hiddenLine xmlns:a14="http://schemas.microsoft.com/office/drawing/2010/main" w="9525">
-                <a:solidFill>
-                  <a:srgbClr val="000000"/>
-                </a:solidFill>
-                <a:miter lim="800000"/>
-                <a:headEnd/>
-                <a:tailEnd/>
-              </a14:hiddenLine>
-            </a:ext>
-          </a:extLst>
+        </p:spPr>
+      </p:pic>
+      <p:pic>
+        <p:nvPicPr>
+          <p:cNvPr id="24" name="Picture 23" descr="A picture containing graphical user interface&#10;&#10;Description automatically generated">
+            <a:extLst>
+              <a:ext uri="{FF2B5EF4-FFF2-40B4-BE49-F238E27FC236}">
+                <a16:creationId xmlns:a16="http://schemas.microsoft.com/office/drawing/2014/main" id="{0838708A-152B-4C65-B1A1-4AC975AB4D22}"/>
+              </a:ext>
+            </a:extLst>
+          </p:cNvPr>
+          <p:cNvPicPr>
+            <a:picLocks noChangeAspect="1"/>
+          </p:cNvPicPr>
+          <p:nvPr/>
+        </p:nvPicPr>
+        <p:blipFill>
+          <a:blip r:embed="rId10">
+            <a:extLst>
+              <a:ext uri="{28A0092B-C50C-407E-A947-70E740481C1C}">
+                <a14:useLocalDpi xmlns:a14="http://schemas.microsoft.com/office/drawing/2010/main" val="0"/>
+              </a:ext>
+            </a:extLst>
+          </a:blip>
+          <a:stretch>
+            <a:fillRect/>
+          </a:stretch>
+        </p:blipFill>
+        <p:spPr>
+          <a:xfrm>
+            <a:off x="12135420" y="-6175776"/>
+            <a:ext cx="2743784" cy="16446548"/>
+          </a:xfrm>
+          <a:prstGeom prst="rect">
+            <a:avLst/>
+          </a:prstGeom>
         </p:spPr>
       </p:pic>
       <p:sp>
@@ -9346,43 +8534,143 @@
           </a:p>
         </p:txBody>
       </p:sp>
-      <p:pic>
-        <p:nvPicPr>
-          <p:cNvPr id="20" name="Picture 19" descr="Diagram&#10;&#10;Description automatically generated">
+      <p:sp>
+        <p:nvSpPr>
+          <p:cNvPr id="21" name="Rectangle 20">
             <a:extLst>
               <a:ext uri="{FF2B5EF4-FFF2-40B4-BE49-F238E27FC236}">
-                <a16:creationId xmlns:a16="http://schemas.microsoft.com/office/drawing/2014/main" id="{676C64E8-61FE-4861-9715-5EA3ECEE2ACC}"/>
+                <a16:creationId xmlns:a16="http://schemas.microsoft.com/office/drawing/2014/main" id="{873B54E8-874F-4728-8960-C46618EEE5E4}"/>
               </a:ext>
             </a:extLst>
           </p:cNvPr>
+          <p:cNvSpPr/>
+          <p:nvPr/>
+        </p:nvSpPr>
+        <p:spPr bwMode="auto">
+          <a:xfrm>
+            <a:off x="12051139" y="1272498"/>
+            <a:ext cx="2887374" cy="669746"/>
+          </a:xfrm>
+          <a:prstGeom prst="rect">
+            <a:avLst/>
+          </a:prstGeom>
+          <a:gradFill>
+            <a:gsLst>
+              <a:gs pos="100000">
+                <a:srgbClr val="CF3938"/>
+              </a:gs>
+              <a:gs pos="0">
+                <a:srgbClr val="CD3737"/>
+              </a:gs>
+            </a:gsLst>
+            <a:lin ang="16200000" scaled="1"/>
+          </a:gradFill>
+          <a:ln w="9525" cap="flat" cmpd="sng" algn="ctr">
+            <a:noFill/>
+            <a:prstDash val="solid"/>
+            <a:round/>
+            <a:headEnd type="none" w="med" len="med"/>
+            <a:tailEnd type="none" w="med" len="med"/>
+          </a:ln>
+          <a:effectLst/>
+        </p:spPr>
+        <p:txBody>
+          <a:bodyPr vert="horz" wrap="square" lIns="91440" tIns="45720" rIns="91440" bIns="45720" numCol="1" rtlCol="0" anchor="t" anchorCtr="0" compatLnSpc="1">
+            <a:prstTxWarp prst="textNoShape">
+              <a:avLst/>
+            </a:prstTxWarp>
+          </a:bodyPr>
+          <a:lstStyle/>
+          <a:p>
+            <a:pPr marL="0" marR="0" indent="0" algn="l" defTabSz="2859088" rtl="0" eaLnBrk="1" fontAlgn="base" latinLnBrk="0" hangingPunct="1">
+              <a:lnSpc>
+                <a:spcPct val="100000"/>
+              </a:lnSpc>
+              <a:spcBef>
+                <a:spcPct val="0"/>
+              </a:spcBef>
+              <a:spcAft>
+                <a:spcPct val="0"/>
+              </a:spcAft>
+              <a:buClrTx/>
+              <a:buSzTx/>
+              <a:buFontTx/>
+              <a:buNone/>
+              <a:tabLst/>
+            </a:pPr>
+            <a:endParaRPr kumimoji="0" lang="en-GB" sz="5600" b="0" i="0" u="none" strike="noStrike" cap="none" normalizeH="0" baseline="0">
+              <a:ln>
+                <a:noFill/>
+              </a:ln>
+              <a:solidFill>
+                <a:schemeClr val="tx1"/>
+              </a:solidFill>
+              <a:effectLst/>
+              <a:latin typeface="Arial" charset="0"/>
+            </a:endParaRPr>
+          </a:p>
+        </p:txBody>
+      </p:sp>
+      <p:pic>
+        <p:nvPicPr>
+          <p:cNvPr id="2053" name="Picture 5" descr="use RH modified.jpg"/>
           <p:cNvPicPr>
             <a:picLocks noChangeAspect="1"/>
           </p:cNvPicPr>
           <p:nvPr/>
         </p:nvPicPr>
         <p:blipFill>
-          <a:blip r:embed="rId20">
+          <a:blip r:embed="rId11">
             <a:extLst>
               <a:ext uri="{28A0092B-C50C-407E-A947-70E740481C1C}">
                 <a14:useLocalDpi xmlns:a14="http://schemas.microsoft.com/office/drawing/2010/main" val="0"/>
               </a:ext>
             </a:extLst>
           </a:blip>
+          <a:srcRect/>
           <a:stretch>
             <a:fillRect/>
           </a:stretch>
         </p:blipFill>
-        <p:spPr>
+        <p:spPr bwMode="auto">
           <a:xfrm>
-            <a:off x="-193524" y="3900427"/>
-            <a:ext cx="12334370" cy="6792973"/>
+            <a:off x="9459913" y="0"/>
+            <a:ext cx="5662612" cy="1363663"/>
           </a:xfrm>
           <a:prstGeom prst="rect">
             <a:avLst/>
           </a:prstGeom>
+          <a:noFill/>
+          <a:ln>
+            <a:noFill/>
+          </a:ln>
+          <a:extLst>
+            <a:ext uri="{909E8E84-426E-40DD-AFC4-6F175D3DCCD1}">
+              <a14:hiddenFill xmlns:a14="http://schemas.microsoft.com/office/drawing/2010/main">
+                <a:solidFill>
+                  <a:srgbClr val="FFFFFF"/>
+                </a:solidFill>
+              </a14:hiddenFill>
+            </a:ext>
+            <a:ext uri="{91240B29-F687-4F45-9708-019B960494DF}">
+              <a14:hiddenLine xmlns:a14="http://schemas.microsoft.com/office/drawing/2010/main" w="9525">
+                <a:solidFill>
+                  <a:srgbClr val="000000"/>
+                </a:solidFill>
+                <a:miter lim="800000"/>
+                <a:headEnd/>
+                <a:tailEnd/>
+              </a14:hiddenLine>
+            </a:ext>
+          </a:extLst>
         </p:spPr>
       </p:pic>
     </p:spTree>
+    <p:extLst>
+      <p:ext uri="{BB962C8B-B14F-4D97-AF65-F5344CB8AC3E}">
+        <p14:creationId xmlns:p14="http://schemas.microsoft.com/office/powerpoint/2010/main" val="2613421591"/>
+      </p:ext>
+    </p:extLst>
   </p:cSld>
   <p:clrMapOvr>
     <a:masterClrMapping/>
@@ -9416,18 +8704,18 @@
                                     <p:cond delay="0"/>
                                   </p:stCondLst>
                                   <p:childTnLst>
-                                    <p:animMotion origin="layout" path="M 4.93806E-6 -0.79275 L 4.93806E-6 4.53682E-6 " pathEditMode="relative" rAng="0" ptsTypes="AA">
+                                    <p:animMotion origin="layout" path="M -4.57905E-6 1.68646E-6 L -4.57905E-6 0.77524 " pathEditMode="relative" rAng="0" ptsTypes="AA">
                                       <p:cBhvr>
                                         <p:cTn id="6" dur="20000" fill="hold"/>
                                         <p:tgtEl>
-                                          <p:spTgt spid="32"/>
+                                          <p:spTgt spid="24"/>
                                         </p:tgtEl>
                                         <p:attrNameLst>
                                           <p:attrName>ppt_x</p:attrName>
                                           <p:attrName>ppt_y</p:attrName>
                                         </p:attrNameLst>
                                       </p:cBhvr>
-                                      <p:rCtr x="0" y="39860"/>
+                                      <p:rCtr x="0" y="38762"/>
                                     </p:animMotion>
                                   </p:childTnLst>
                                 </p:cTn>
@@ -10602,6 +9890,15 @@
 </file>
 
 <file path=customXml/item1.xml><?xml version="1.0" encoding="utf-8"?>
+<?mso-contentType ?>
+<FormTemplates xmlns="http://schemas.microsoft.com/sharepoint/v3/contenttype/forms">
+  <Display>DocumentLibraryForm</Display>
+  <Edit>DocumentLibraryForm</Edit>
+  <New>DocumentLibraryForm</New>
+</FormTemplates>
+</file>
+
+<file path=customXml/item2.xml><?xml version="1.0" encoding="utf-8"?>
 <ct:contentTypeSchema xmlns:ct="http://schemas.microsoft.com/office/2006/metadata/contentType" xmlns:ma="http://schemas.microsoft.com/office/2006/metadata/properties/metaAttributes" ct:_="" ma:_="" ma:contentTypeName="Document" ma:contentTypeID="0x01010097D40E6585C8784EB4F7A91A219ECB38" ma:contentTypeVersion="0" ma:contentTypeDescription="Create a new document." ma:contentTypeScope="" ma:versionID="225f1df7c0d1d866e72199d38b91779e">
   <xsd:schema xmlns:xsd="http://www.w3.org/2001/XMLSchema" xmlns:p="http://schemas.microsoft.com/office/2006/metadata/properties" targetNamespace="http://schemas.microsoft.com/office/2006/metadata/properties" ma:root="true" ma:fieldsID="4aeb20c0e3442673af7ee10786458764">
     <xsd:element name="properties">
@@ -10650,16 +9947,15 @@
 </ct:contentTypeSchema>
 </file>
 
-<file path=customXml/item2.xml><?xml version="1.0" encoding="utf-8"?>
-<?mso-contentType ?>
-<FormTemplates xmlns="http://schemas.microsoft.com/sharepoint/v3/contenttype/forms">
-  <Display>DocumentLibraryForm</Display>
-  <Edit>DocumentLibraryForm</Edit>
-  <New>DocumentLibraryForm</New>
-</FormTemplates>
+<file path=customXml/itemProps1.xml><?xml version="1.0" encoding="utf-8"?>
+<ds:datastoreItem xmlns:ds="http://schemas.openxmlformats.org/officeDocument/2006/customXml" ds:itemID="{54D0D3C5-34E4-4C50-AEF0-1975AC22AD53}">
+  <ds:schemaRefs>
+    <ds:schemaRef ds:uri="http://schemas.microsoft.com/sharepoint/v3/contenttype/forms"/>
+  </ds:schemaRefs>
+</ds:datastoreItem>
 </file>
 
-<file path=customXml/itemProps1.xml><?xml version="1.0" encoding="utf-8"?>
+<file path=customXml/itemProps2.xml><?xml version="1.0" encoding="utf-8"?>
 <ds:datastoreItem xmlns:ds="http://schemas.openxmlformats.org/officeDocument/2006/customXml" ds:itemID="{069E428E-B4E8-4A06-9EB6-04820EC0F3C0}">
   <ds:schemaRefs>
     <ds:schemaRef ds:uri="http://schemas.microsoft.com/office/2006/metadata/contentType"/>
@@ -10672,12 +9968,4 @@
     <ds:schemaRef ds:uri="http://schemas.microsoft.com/office/internal/2005/internalDocumentation"/>
   </ds:schemaRefs>
 </ds:datastoreItem>
-</file>
-
-<file path=customXml/itemProps2.xml><?xml version="1.0" encoding="utf-8"?>
-<ds:datastoreItem xmlns:ds="http://schemas.openxmlformats.org/officeDocument/2006/customXml" ds:itemID="{54D0D3C5-34E4-4C50-AEF0-1975AC22AD53}">
-  <ds:schemaRefs>
-    <ds:schemaRef ds:uri="http://schemas.microsoft.com/sharepoint/v3/contenttype/forms"/>
-  </ds:schemaRefs>
-</ds:datastoreItem>
 </file>
</xml_diff>